<commit_message>
Add W2_functiontest, assignments PP editted
</commit_message>
<xml_diff>
--- a/403_Programming/assignments/403IT_Understanding_PP.pptx
+++ b/403_Programming/assignments/403IT_Understanding_PP.pptx
@@ -4,12 +4,23 @@
   <p:sldMasterIdLst>
     <p:sldMasterId id="2147483648" r:id="rId1"/>
   </p:sldMasterIdLst>
+  <p:notesMasterIdLst>
+    <p:notesMasterId r:id="rId15"/>
+  </p:notesMasterIdLst>
   <p:sldIdLst>
     <p:sldId id="256" r:id="rId2"/>
     <p:sldId id="257" r:id="rId3"/>
     <p:sldId id="258" r:id="rId4"/>
     <p:sldId id="259" r:id="rId5"/>
     <p:sldId id="260" r:id="rId6"/>
+    <p:sldId id="261" r:id="rId7"/>
+    <p:sldId id="262" r:id="rId8"/>
+    <p:sldId id="263" r:id="rId9"/>
+    <p:sldId id="265" r:id="rId10"/>
+    <p:sldId id="264" r:id="rId11"/>
+    <p:sldId id="266" r:id="rId12"/>
+    <p:sldId id="267" r:id="rId13"/>
+    <p:sldId id="268" r:id="rId14"/>
   </p:sldIdLst>
   <p:sldSz cx="12192000" cy="6858000"/>
   <p:notesSz cx="6858000" cy="9144000"/>
@@ -108,13 +119,18 @@
       </a:defRPr>
     </a:lvl9pPr>
   </p:defaultTextStyle>
+  <p:extLst>
+    <p:ext uri="{EFAFB233-063F-42B5-8137-9DF3F51BA10A}">
+      <p15:sldGuideLst xmlns:p15="http://schemas.microsoft.com/office/powerpoint/2012/main"/>
+    </p:ext>
+  </p:extLst>
 </p:presentation>
 </file>
 
 <file path=ppt/revisionInfo.xml><?xml version="1.0" encoding="utf-8"?>
 <p1510:revInfo xmlns:a="http://schemas.openxmlformats.org/drawingml/2006/main" xmlns:r="http://schemas.openxmlformats.org/officeDocument/2006/relationships" xmlns:p1510="http://schemas.microsoft.com/office/powerpoint/2015/10/main">
   <p1510:revLst>
-    <p1510:client id="{C7DA60A2-EAD7-4DD0-9773-C83A5B1E6564}" v="32" dt="2025-02-03T11:09:58.913"/>
+    <p1510:client id="{C7DA60A2-EAD7-4DD0-9773-C83A5B1E6564}" v="66" dt="2025-02-04T12:17:09.844"/>
   </p1510:revLst>
 </p1510:revInfo>
 </file>
@@ -123,8 +139,8 @@
 <pc:chgInfo xmlns:a="http://schemas.openxmlformats.org/drawingml/2006/main" xmlns:r="http://schemas.openxmlformats.org/officeDocument/2006/relationships" xmlns:ac="http://schemas.microsoft.com/office/drawing/2013/main/command" xmlns:pc="http://schemas.microsoft.com/office/powerpoint/2013/main/command">
   <pc:docChgLst>
     <pc:chgData name="Ocean Graham" userId="c784d4c6-724f-4452-8baf-8c216b3c246d" providerId="ADAL" clId="{C7DA60A2-EAD7-4DD0-9773-C83A5B1E6564}"/>
-    <pc:docChg chg="undo custSel addSld delSld modSld">
-      <pc:chgData name="Ocean Graham" userId="c784d4c6-724f-4452-8baf-8c216b3c246d" providerId="ADAL" clId="{C7DA60A2-EAD7-4DD0-9773-C83A5B1E6564}" dt="2025-02-03T11:18:43.134" v="2226" actId="20577"/>
+    <pc:docChg chg="undo custSel addSld delSld modSld sldOrd">
+      <pc:chgData name="Ocean Graham" userId="c784d4c6-724f-4452-8baf-8c216b3c246d" providerId="ADAL" clId="{C7DA60A2-EAD7-4DD0-9773-C83A5B1E6564}" dt="2025-02-04T12:24:48.152" v="6067" actId="21"/>
       <pc:docMkLst>
         <pc:docMk/>
       </pc:docMkLst>
@@ -428,7 +444,7 @@
         </pc:picChg>
       </pc:sldChg>
       <pc:sldChg chg="addSp delSp modSp new mod">
-        <pc:chgData name="Ocean Graham" userId="c784d4c6-724f-4452-8baf-8c216b3c246d" providerId="ADAL" clId="{C7DA60A2-EAD7-4DD0-9773-C83A5B1E6564}" dt="2025-02-03T11:18:43.134" v="2226" actId="20577"/>
+        <pc:chgData name="Ocean Graham" userId="c784d4c6-724f-4452-8baf-8c216b3c246d" providerId="ADAL" clId="{C7DA60A2-EAD7-4DD0-9773-C83A5B1E6564}" dt="2025-02-04T09:39:33.739" v="2670" actId="1076"/>
         <pc:sldMkLst>
           <pc:docMk/>
           <pc:sldMk cId="1213792337" sldId="260"/>
@@ -441,6 +457,14 @@
             <ac:spMk id="2" creationId="{BB597771-B506-6B12-2A19-5E90A106E0D0}"/>
           </ac:spMkLst>
         </pc:spChg>
+        <pc:spChg chg="add mod">
+          <ac:chgData name="Ocean Graham" userId="c784d4c6-724f-4452-8baf-8c216b3c246d" providerId="ADAL" clId="{C7DA60A2-EAD7-4DD0-9773-C83A5B1E6564}" dt="2025-02-04T09:39:33.739" v="2670" actId="1076"/>
+          <ac:spMkLst>
+            <pc:docMk/>
+            <pc:sldMk cId="1213792337" sldId="260"/>
+            <ac:spMk id="3" creationId="{27EF820F-7C10-3AA1-765A-06288BCD64B1}"/>
+          </ac:spMkLst>
+        </pc:spChg>
         <pc:spChg chg="del">
           <ac:chgData name="Ocean Graham" userId="c784d4c6-724f-4452-8baf-8c216b3c246d" providerId="ADAL" clId="{C7DA60A2-EAD7-4DD0-9773-C83A5B1E6564}" dt="2025-02-03T11:05:22.462" v="2012" actId="21"/>
           <ac:spMkLst>
@@ -474,7 +498,7 @@
           </ac:spMkLst>
         </pc:spChg>
         <pc:spChg chg="add mod">
-          <ac:chgData name="Ocean Graham" userId="c784d4c6-724f-4452-8baf-8c216b3c246d" providerId="ADAL" clId="{C7DA60A2-EAD7-4DD0-9773-C83A5B1E6564}" dt="2025-02-03T11:18:43.134" v="2226" actId="20577"/>
+          <ac:chgData name="Ocean Graham" userId="c784d4c6-724f-4452-8baf-8c216b3c246d" providerId="ADAL" clId="{C7DA60A2-EAD7-4DD0-9773-C83A5B1E6564}" dt="2025-02-04T09:39:28.200" v="2669" actId="1076"/>
           <ac:spMkLst>
             <pc:docMk/>
             <pc:sldMk cId="1213792337" sldId="260"/>
@@ -506,9 +530,897 @@
           </ac:picMkLst>
         </pc:picChg>
       </pc:sldChg>
+      <pc:sldChg chg="addSp delSp modSp new mod">
+        <pc:chgData name="Ocean Graham" userId="c784d4c6-724f-4452-8baf-8c216b3c246d" providerId="ADAL" clId="{C7DA60A2-EAD7-4DD0-9773-C83A5B1E6564}" dt="2025-02-04T10:32:55.964" v="5038" actId="20577"/>
+        <pc:sldMkLst>
+          <pc:docMk/>
+          <pc:sldMk cId="383451321" sldId="261"/>
+        </pc:sldMkLst>
+        <pc:spChg chg="mod">
+          <ac:chgData name="Ocean Graham" userId="c784d4c6-724f-4452-8baf-8c216b3c246d" providerId="ADAL" clId="{C7DA60A2-EAD7-4DD0-9773-C83A5B1E6564}" dt="2025-02-04T10:32:55.964" v="5038" actId="20577"/>
+          <ac:spMkLst>
+            <pc:docMk/>
+            <pc:sldMk cId="383451321" sldId="261"/>
+            <ac:spMk id="2" creationId="{7982377F-8B0F-EAD2-C547-3CC7200CC123}"/>
+          </ac:spMkLst>
+        </pc:spChg>
+        <pc:spChg chg="del">
+          <ac:chgData name="Ocean Graham" userId="c784d4c6-724f-4452-8baf-8c216b3c246d" providerId="ADAL" clId="{C7DA60A2-EAD7-4DD0-9773-C83A5B1E6564}" dt="2025-02-04T09:40:25.379" v="2690" actId="21"/>
+          <ac:spMkLst>
+            <pc:docMk/>
+            <pc:sldMk cId="383451321" sldId="261"/>
+            <ac:spMk id="3" creationId="{D21E9E94-CFC2-3594-3591-998786830AE5}"/>
+          </ac:spMkLst>
+        </pc:spChg>
+        <pc:spChg chg="add mod">
+          <ac:chgData name="Ocean Graham" userId="c784d4c6-724f-4452-8baf-8c216b3c246d" providerId="ADAL" clId="{C7DA60A2-EAD7-4DD0-9773-C83A5B1E6564}" dt="2025-02-04T09:43:20.693" v="2716" actId="1076"/>
+          <ac:spMkLst>
+            <pc:docMk/>
+            <pc:sldMk cId="383451321" sldId="261"/>
+            <ac:spMk id="8" creationId="{11938871-3706-213A-6021-D6E8E08CE1D8}"/>
+          </ac:spMkLst>
+        </pc:spChg>
+        <pc:spChg chg="add mod">
+          <ac:chgData name="Ocean Graham" userId="c784d4c6-724f-4452-8baf-8c216b3c246d" providerId="ADAL" clId="{C7DA60A2-EAD7-4DD0-9773-C83A5B1E6564}" dt="2025-02-04T09:43:59.006" v="2728" actId="1076"/>
+          <ac:spMkLst>
+            <pc:docMk/>
+            <pc:sldMk cId="383451321" sldId="261"/>
+            <ac:spMk id="9" creationId="{DF8E4D54-412D-8414-B0A7-B21B65D8A8A8}"/>
+          </ac:spMkLst>
+        </pc:spChg>
+        <pc:spChg chg="add del mod">
+          <ac:chgData name="Ocean Graham" userId="c784d4c6-724f-4452-8baf-8c216b3c246d" providerId="ADAL" clId="{C7DA60A2-EAD7-4DD0-9773-C83A5B1E6564}" dt="2025-02-04T09:44:23.197" v="2733"/>
+          <ac:spMkLst>
+            <pc:docMk/>
+            <pc:sldMk cId="383451321" sldId="261"/>
+            <ac:spMk id="10" creationId="{CCB591AE-1131-CB49-7817-1C158309895E}"/>
+          </ac:spMkLst>
+        </pc:spChg>
+        <pc:spChg chg="add del mod">
+          <ac:chgData name="Ocean Graham" userId="c784d4c6-724f-4452-8baf-8c216b3c246d" providerId="ADAL" clId="{C7DA60A2-EAD7-4DD0-9773-C83A5B1E6564}" dt="2025-02-04T09:54:25.482" v="3260" actId="20577"/>
+          <ac:spMkLst>
+            <pc:docMk/>
+            <pc:sldMk cId="383451321" sldId="261"/>
+            <ac:spMk id="11" creationId="{12E25C13-2685-DF85-F4C4-9DB6AB27532B}"/>
+          </ac:spMkLst>
+        </pc:spChg>
+        <pc:picChg chg="add mod">
+          <ac:chgData name="Ocean Graham" userId="c784d4c6-724f-4452-8baf-8c216b3c246d" providerId="ADAL" clId="{C7DA60A2-EAD7-4DD0-9773-C83A5B1E6564}" dt="2025-02-04T09:43:32.603" v="2719" actId="14100"/>
+          <ac:picMkLst>
+            <pc:docMk/>
+            <pc:sldMk cId="383451321" sldId="261"/>
+            <ac:picMk id="5" creationId="{70500770-C32C-54A0-AEDF-9FF03451BE5D}"/>
+          </ac:picMkLst>
+        </pc:picChg>
+        <pc:picChg chg="add mod">
+          <ac:chgData name="Ocean Graham" userId="c784d4c6-724f-4452-8baf-8c216b3c246d" providerId="ADAL" clId="{C7DA60A2-EAD7-4DD0-9773-C83A5B1E6564}" dt="2025-02-04T09:44:10.518" v="2729" actId="1076"/>
+          <ac:picMkLst>
+            <pc:docMk/>
+            <pc:sldMk cId="383451321" sldId="261"/>
+            <ac:picMk id="7" creationId="{BE1B8F2B-D3C4-398B-2303-851FE5DBF0D0}"/>
+          </ac:picMkLst>
+        </pc:picChg>
+      </pc:sldChg>
+      <pc:sldChg chg="new del">
+        <pc:chgData name="Ocean Graham" userId="c784d4c6-724f-4452-8baf-8c216b3c246d" providerId="ADAL" clId="{C7DA60A2-EAD7-4DD0-9773-C83A5B1E6564}" dt="2025-02-04T09:39:50.264" v="2672" actId="2696"/>
+        <pc:sldMkLst>
+          <pc:docMk/>
+          <pc:sldMk cId="962780152" sldId="261"/>
+        </pc:sldMkLst>
+      </pc:sldChg>
+      <pc:sldChg chg="addSp delSp modSp new mod">
+        <pc:chgData name="Ocean Graham" userId="c784d4c6-724f-4452-8baf-8c216b3c246d" providerId="ADAL" clId="{C7DA60A2-EAD7-4DD0-9773-C83A5B1E6564}" dt="2025-02-04T10:34:38.053" v="5094" actId="20577"/>
+        <pc:sldMkLst>
+          <pc:docMk/>
+          <pc:sldMk cId="4033134947" sldId="262"/>
+        </pc:sldMkLst>
+        <pc:spChg chg="mod">
+          <ac:chgData name="Ocean Graham" userId="c784d4c6-724f-4452-8baf-8c216b3c246d" providerId="ADAL" clId="{C7DA60A2-EAD7-4DD0-9773-C83A5B1E6564}" dt="2025-02-04T10:03:58.673" v="3288" actId="1076"/>
+          <ac:spMkLst>
+            <pc:docMk/>
+            <pc:sldMk cId="4033134947" sldId="262"/>
+            <ac:spMk id="2" creationId="{0CDE9FA7-5A5D-A677-2007-131AE1373046}"/>
+          </ac:spMkLst>
+        </pc:spChg>
+        <pc:spChg chg="del">
+          <ac:chgData name="Ocean Graham" userId="c784d4c6-724f-4452-8baf-8c216b3c246d" providerId="ADAL" clId="{C7DA60A2-EAD7-4DD0-9773-C83A5B1E6564}" dt="2025-02-04T10:03:44.118" v="3284" actId="21"/>
+          <ac:spMkLst>
+            <pc:docMk/>
+            <pc:sldMk cId="4033134947" sldId="262"/>
+            <ac:spMk id="3" creationId="{DAF9FD0F-9953-6862-0EDF-4C22ABC333B8}"/>
+          </ac:spMkLst>
+        </pc:spChg>
+        <pc:spChg chg="add del mod">
+          <ac:chgData name="Ocean Graham" userId="c784d4c6-724f-4452-8baf-8c216b3c246d" providerId="ADAL" clId="{C7DA60A2-EAD7-4DD0-9773-C83A5B1E6564}" dt="2025-02-04T10:04:51.725" v="3312"/>
+          <ac:spMkLst>
+            <pc:docMk/>
+            <pc:sldMk cId="4033134947" sldId="262"/>
+            <ac:spMk id="4" creationId="{E1DC652B-2C31-73BF-630D-CE5CEA3DBFA7}"/>
+          </ac:spMkLst>
+        </pc:spChg>
+        <pc:spChg chg="add mod">
+          <ac:chgData name="Ocean Graham" userId="c784d4c6-724f-4452-8baf-8c216b3c246d" providerId="ADAL" clId="{C7DA60A2-EAD7-4DD0-9773-C83A5B1E6564}" dt="2025-02-04T10:34:36.862" v="5093" actId="20577"/>
+          <ac:spMkLst>
+            <pc:docMk/>
+            <pc:sldMk cId="4033134947" sldId="262"/>
+            <ac:spMk id="5" creationId="{6910A766-7FF0-64B6-BEE3-3636586AC07C}"/>
+          </ac:spMkLst>
+        </pc:spChg>
+        <pc:spChg chg="add mod">
+          <ac:chgData name="Ocean Graham" userId="c784d4c6-724f-4452-8baf-8c216b3c246d" providerId="ADAL" clId="{C7DA60A2-EAD7-4DD0-9773-C83A5B1E6564}" dt="2025-02-04T10:34:38.053" v="5094" actId="20577"/>
+          <ac:spMkLst>
+            <pc:docMk/>
+            <pc:sldMk cId="4033134947" sldId="262"/>
+            <ac:spMk id="6" creationId="{F632C60E-FCDF-E59F-6E7D-D0F83A7A4F6D}"/>
+          </ac:spMkLst>
+        </pc:spChg>
+        <pc:spChg chg="add mod">
+          <ac:chgData name="Ocean Graham" userId="c784d4c6-724f-4452-8baf-8c216b3c246d" providerId="ADAL" clId="{C7DA60A2-EAD7-4DD0-9773-C83A5B1E6564}" dt="2025-02-04T10:16:15.521" v="4142" actId="1076"/>
+          <ac:spMkLst>
+            <pc:docMk/>
+            <pc:sldMk cId="4033134947" sldId="262"/>
+            <ac:spMk id="15" creationId="{B851D597-7DCD-BBB1-EAE9-FD9A6537EBEC}"/>
+          </ac:spMkLst>
+        </pc:spChg>
+        <pc:picChg chg="add mod">
+          <ac:chgData name="Ocean Graham" userId="c784d4c6-724f-4452-8baf-8c216b3c246d" providerId="ADAL" clId="{C7DA60A2-EAD7-4DD0-9773-C83A5B1E6564}" dt="2025-02-04T10:16:05.741" v="4139" actId="1076"/>
+          <ac:picMkLst>
+            <pc:docMk/>
+            <pc:sldMk cId="4033134947" sldId="262"/>
+            <ac:picMk id="8" creationId="{398B05FD-5BFF-F64D-4DE3-76A23C1E600A}"/>
+          </ac:picMkLst>
+        </pc:picChg>
+        <pc:picChg chg="add mod">
+          <ac:chgData name="Ocean Graham" userId="c784d4c6-724f-4452-8baf-8c216b3c246d" providerId="ADAL" clId="{C7DA60A2-EAD7-4DD0-9773-C83A5B1E6564}" dt="2025-02-04T10:15:57.874" v="4136" actId="1076"/>
+          <ac:picMkLst>
+            <pc:docMk/>
+            <pc:sldMk cId="4033134947" sldId="262"/>
+            <ac:picMk id="10" creationId="{8FE755D1-84CB-EE48-FC50-C2E88256635D}"/>
+          </ac:picMkLst>
+        </pc:picChg>
+        <pc:picChg chg="add mod">
+          <ac:chgData name="Ocean Graham" userId="c784d4c6-724f-4452-8baf-8c216b3c246d" providerId="ADAL" clId="{C7DA60A2-EAD7-4DD0-9773-C83A5B1E6564}" dt="2025-02-04T10:16:01.816" v="4138" actId="1076"/>
+          <ac:picMkLst>
+            <pc:docMk/>
+            <pc:sldMk cId="4033134947" sldId="262"/>
+            <ac:picMk id="12" creationId="{12ED40C8-B480-201D-D7B5-8FF9490A3087}"/>
+          </ac:picMkLst>
+        </pc:picChg>
+        <pc:picChg chg="add mod">
+          <ac:chgData name="Ocean Graham" userId="c784d4c6-724f-4452-8baf-8c216b3c246d" providerId="ADAL" clId="{C7DA60A2-EAD7-4DD0-9773-C83A5B1E6564}" dt="2025-02-04T10:16:13.436" v="4141" actId="1076"/>
+          <ac:picMkLst>
+            <pc:docMk/>
+            <pc:sldMk cId="4033134947" sldId="262"/>
+            <ac:picMk id="14" creationId="{6912C5A1-6F27-1F4F-2F78-B27249666EFB}"/>
+          </ac:picMkLst>
+        </pc:picChg>
+      </pc:sldChg>
+      <pc:sldChg chg="addSp delSp modSp new mod">
+        <pc:chgData name="Ocean Graham" userId="c784d4c6-724f-4452-8baf-8c216b3c246d" providerId="ADAL" clId="{C7DA60A2-EAD7-4DD0-9773-C83A5B1E6564}" dt="2025-02-04T10:31:05.662" v="5014" actId="1076"/>
+        <pc:sldMkLst>
+          <pc:docMk/>
+          <pc:sldMk cId="2631398559" sldId="263"/>
+        </pc:sldMkLst>
+        <pc:spChg chg="mod">
+          <ac:chgData name="Ocean Graham" userId="c784d4c6-724f-4452-8baf-8c216b3c246d" providerId="ADAL" clId="{C7DA60A2-EAD7-4DD0-9773-C83A5B1E6564}" dt="2025-02-04T10:20:47.241" v="4198" actId="1076"/>
+          <ac:spMkLst>
+            <pc:docMk/>
+            <pc:sldMk cId="2631398559" sldId="263"/>
+            <ac:spMk id="2" creationId="{CF8F7ACA-02FD-8D8D-9AC2-E325F87CD6C8}"/>
+          </ac:spMkLst>
+        </pc:spChg>
+        <pc:spChg chg="del">
+          <ac:chgData name="Ocean Graham" userId="c784d4c6-724f-4452-8baf-8c216b3c246d" providerId="ADAL" clId="{C7DA60A2-EAD7-4DD0-9773-C83A5B1E6564}" dt="2025-02-04T10:21:50.437" v="4199" actId="21"/>
+          <ac:spMkLst>
+            <pc:docMk/>
+            <pc:sldMk cId="2631398559" sldId="263"/>
+            <ac:spMk id="3" creationId="{CC34802A-37D9-CD50-013D-E3A2760FFF5B}"/>
+          </ac:spMkLst>
+        </pc:spChg>
+        <pc:spChg chg="add mod">
+          <ac:chgData name="Ocean Graham" userId="c784d4c6-724f-4452-8baf-8c216b3c246d" providerId="ADAL" clId="{C7DA60A2-EAD7-4DD0-9773-C83A5B1E6564}" dt="2025-02-04T10:22:14.089" v="4212" actId="1076"/>
+          <ac:spMkLst>
+            <pc:docMk/>
+            <pc:sldMk cId="2631398559" sldId="263"/>
+            <ac:spMk id="4" creationId="{14A68D50-3B5C-E366-2ED2-E22DAE92EDCA}"/>
+          </ac:spMkLst>
+        </pc:spChg>
+        <pc:spChg chg="add mod">
+          <ac:chgData name="Ocean Graham" userId="c784d4c6-724f-4452-8baf-8c216b3c246d" providerId="ADAL" clId="{C7DA60A2-EAD7-4DD0-9773-C83A5B1E6564}" dt="2025-02-04T10:22:31.408" v="4221" actId="1076"/>
+          <ac:spMkLst>
+            <pc:docMk/>
+            <pc:sldMk cId="2631398559" sldId="263"/>
+            <ac:spMk id="5" creationId="{38D7B4F7-B690-D604-02BE-3AD3223CE50F}"/>
+          </ac:spMkLst>
+        </pc:spChg>
+        <pc:spChg chg="add mod">
+          <ac:chgData name="Ocean Graham" userId="c784d4c6-724f-4452-8baf-8c216b3c246d" providerId="ADAL" clId="{C7DA60A2-EAD7-4DD0-9773-C83A5B1E6564}" dt="2025-02-04T10:30:11.385" v="5006" actId="20577"/>
+          <ac:spMkLst>
+            <pc:docMk/>
+            <pc:sldMk cId="2631398559" sldId="263"/>
+            <ac:spMk id="10" creationId="{A17A02CA-D3B9-8E43-9106-1C9EB358F152}"/>
+          </ac:spMkLst>
+        </pc:spChg>
+        <pc:picChg chg="add mod">
+          <ac:chgData name="Ocean Graham" userId="c784d4c6-724f-4452-8baf-8c216b3c246d" providerId="ADAL" clId="{C7DA60A2-EAD7-4DD0-9773-C83A5B1E6564}" dt="2025-02-04T10:22:49.313" v="4225" actId="1076"/>
+          <ac:picMkLst>
+            <pc:docMk/>
+            <pc:sldMk cId="2631398559" sldId="263"/>
+            <ac:picMk id="7" creationId="{9EE7BAC1-9FCB-3EDE-74E2-D069CA242834}"/>
+          </ac:picMkLst>
+        </pc:picChg>
+        <pc:picChg chg="add mod">
+          <ac:chgData name="Ocean Graham" userId="c784d4c6-724f-4452-8baf-8c216b3c246d" providerId="ADAL" clId="{C7DA60A2-EAD7-4DD0-9773-C83A5B1E6564}" dt="2025-02-04T10:23:14.719" v="4228" actId="1076"/>
+          <ac:picMkLst>
+            <pc:docMk/>
+            <pc:sldMk cId="2631398559" sldId="263"/>
+            <ac:picMk id="9" creationId="{3BC4219B-287D-B11D-6CE3-64B447C46F99}"/>
+          </ac:picMkLst>
+        </pc:picChg>
+        <pc:picChg chg="add mod modCrop">
+          <ac:chgData name="Ocean Graham" userId="c784d4c6-724f-4452-8baf-8c216b3c246d" providerId="ADAL" clId="{C7DA60A2-EAD7-4DD0-9773-C83A5B1E6564}" dt="2025-02-04T10:31:05.662" v="5014" actId="1076"/>
+          <ac:picMkLst>
+            <pc:docMk/>
+            <pc:sldMk cId="2631398559" sldId="263"/>
+            <ac:picMk id="12" creationId="{FAD6AD5A-23D1-C1CA-5EE6-30E5E8330BED}"/>
+          </ac:picMkLst>
+        </pc:picChg>
+        <pc:picChg chg="add mod">
+          <ac:chgData name="Ocean Graham" userId="c784d4c6-724f-4452-8baf-8c216b3c246d" providerId="ADAL" clId="{C7DA60A2-EAD7-4DD0-9773-C83A5B1E6564}" dt="2025-02-04T10:31:02.557" v="5013" actId="1076"/>
+          <ac:picMkLst>
+            <pc:docMk/>
+            <pc:sldMk cId="2631398559" sldId="263"/>
+            <ac:picMk id="14" creationId="{B05A61EA-D090-731F-B829-D7D02CCF8564}"/>
+          </ac:picMkLst>
+        </pc:picChg>
+      </pc:sldChg>
+      <pc:sldChg chg="addSp delSp modSp new mod">
+        <pc:chgData name="Ocean Graham" userId="c784d4c6-724f-4452-8baf-8c216b3c246d" providerId="ADAL" clId="{C7DA60A2-EAD7-4DD0-9773-C83A5B1E6564}" dt="2025-02-04T12:22:09.364" v="6032" actId="20577"/>
+        <pc:sldMkLst>
+          <pc:docMk/>
+          <pc:sldMk cId="292458422" sldId="264"/>
+        </pc:sldMkLst>
+        <pc:spChg chg="mod">
+          <ac:chgData name="Ocean Graham" userId="c784d4c6-724f-4452-8baf-8c216b3c246d" providerId="ADAL" clId="{C7DA60A2-EAD7-4DD0-9773-C83A5B1E6564}" dt="2025-02-04T10:48:48.112" v="5141" actId="20577"/>
+          <ac:spMkLst>
+            <pc:docMk/>
+            <pc:sldMk cId="292458422" sldId="264"/>
+            <ac:spMk id="2" creationId="{66F611B0-10AE-C392-D95E-015081CD2662}"/>
+          </ac:spMkLst>
+        </pc:spChg>
+        <pc:spChg chg="del">
+          <ac:chgData name="Ocean Graham" userId="c784d4c6-724f-4452-8baf-8c216b3c246d" providerId="ADAL" clId="{C7DA60A2-EAD7-4DD0-9773-C83A5B1E6564}" dt="2025-02-04T10:33:04.439" v="5039" actId="21"/>
+          <ac:spMkLst>
+            <pc:docMk/>
+            <pc:sldMk cId="292458422" sldId="264"/>
+            <ac:spMk id="3" creationId="{6365E6BE-C909-9016-C61C-05EC8A7589AC}"/>
+          </ac:spMkLst>
+        </pc:spChg>
+        <pc:spChg chg="add mod">
+          <ac:chgData name="Ocean Graham" userId="c784d4c6-724f-4452-8baf-8c216b3c246d" providerId="ADAL" clId="{C7DA60A2-EAD7-4DD0-9773-C83A5B1E6564}" dt="2025-02-04T10:34:01.980" v="5075" actId="1076"/>
+          <ac:spMkLst>
+            <pc:docMk/>
+            <pc:sldMk cId="292458422" sldId="264"/>
+            <ac:spMk id="4" creationId="{344C945F-4504-76BE-DD9D-52FD433C6092}"/>
+          </ac:spMkLst>
+        </pc:spChg>
+        <pc:spChg chg="add mod">
+          <ac:chgData name="Ocean Graham" userId="c784d4c6-724f-4452-8baf-8c216b3c246d" providerId="ADAL" clId="{C7DA60A2-EAD7-4DD0-9773-C83A5B1E6564}" dt="2025-02-04T10:34:23.030" v="5084" actId="1076"/>
+          <ac:spMkLst>
+            <pc:docMk/>
+            <pc:sldMk cId="292458422" sldId="264"/>
+            <ac:spMk id="5" creationId="{74597ECA-2801-F899-3ED9-B92FF61948B1}"/>
+          </ac:spMkLst>
+        </pc:spChg>
+        <pc:spChg chg="add mod">
+          <ac:chgData name="Ocean Graham" userId="c784d4c6-724f-4452-8baf-8c216b3c246d" providerId="ADAL" clId="{C7DA60A2-EAD7-4DD0-9773-C83A5B1E6564}" dt="2025-02-04T12:22:09.364" v="6032" actId="20577"/>
+          <ac:spMkLst>
+            <pc:docMk/>
+            <pc:sldMk cId="292458422" sldId="264"/>
+            <ac:spMk id="10" creationId="{2D76A1BE-BE26-5FFB-3899-7287F9867EB6}"/>
+          </ac:spMkLst>
+        </pc:spChg>
+        <pc:picChg chg="add mod">
+          <ac:chgData name="Ocean Graham" userId="c784d4c6-724f-4452-8baf-8c216b3c246d" providerId="ADAL" clId="{C7DA60A2-EAD7-4DD0-9773-C83A5B1E6564}" dt="2025-02-04T12:16:23.530" v="5657" actId="1076"/>
+          <ac:picMkLst>
+            <pc:docMk/>
+            <pc:sldMk cId="292458422" sldId="264"/>
+            <ac:picMk id="7" creationId="{19D5864A-2488-1F2D-C6EB-121D11294562}"/>
+          </ac:picMkLst>
+        </pc:picChg>
+        <pc:picChg chg="add mod">
+          <ac:chgData name="Ocean Graham" userId="c784d4c6-724f-4452-8baf-8c216b3c246d" providerId="ADAL" clId="{C7DA60A2-EAD7-4DD0-9773-C83A5B1E6564}" dt="2025-02-04T12:17:00.190" v="5666" actId="14100"/>
+          <ac:picMkLst>
+            <pc:docMk/>
+            <pc:sldMk cId="292458422" sldId="264"/>
+            <ac:picMk id="9" creationId="{469590BE-9C6A-015D-F1BC-248F0393F51C}"/>
+          </ac:picMkLst>
+        </pc:picChg>
+      </pc:sldChg>
+      <pc:sldChg chg="addSp delSp modSp new mod ord">
+        <pc:chgData name="Ocean Graham" userId="c784d4c6-724f-4452-8baf-8c216b3c246d" providerId="ADAL" clId="{C7DA60A2-EAD7-4DD0-9773-C83A5B1E6564}" dt="2025-02-04T12:20:53.806" v="5996"/>
+        <pc:sldMkLst>
+          <pc:docMk/>
+          <pc:sldMk cId="3857672638" sldId="265"/>
+        </pc:sldMkLst>
+        <pc:spChg chg="mod">
+          <ac:chgData name="Ocean Graham" userId="c784d4c6-724f-4452-8baf-8c216b3c246d" providerId="ADAL" clId="{C7DA60A2-EAD7-4DD0-9773-C83A5B1E6564}" dt="2025-02-04T10:48:42.960" v="5129" actId="20577"/>
+          <ac:spMkLst>
+            <pc:docMk/>
+            <pc:sldMk cId="3857672638" sldId="265"/>
+            <ac:spMk id="2" creationId="{8FA3C04B-2F25-1EC5-1232-293F705AE012}"/>
+          </ac:spMkLst>
+        </pc:spChg>
+        <pc:spChg chg="del">
+          <ac:chgData name="Ocean Graham" userId="c784d4c6-724f-4452-8baf-8c216b3c246d" providerId="ADAL" clId="{C7DA60A2-EAD7-4DD0-9773-C83A5B1E6564}" dt="2025-02-04T10:33:35.464" v="5056" actId="21"/>
+          <ac:spMkLst>
+            <pc:docMk/>
+            <pc:sldMk cId="3857672638" sldId="265"/>
+            <ac:spMk id="3" creationId="{92D9AC57-9A6C-18F0-7360-E88C4CA2EE26}"/>
+          </ac:spMkLst>
+        </pc:spChg>
+        <pc:spChg chg="add mod">
+          <ac:chgData name="Ocean Graham" userId="c784d4c6-724f-4452-8baf-8c216b3c246d" providerId="ADAL" clId="{C7DA60A2-EAD7-4DD0-9773-C83A5B1E6564}" dt="2025-02-04T10:34:49.925" v="5095" actId="1076"/>
+          <ac:spMkLst>
+            <pc:docMk/>
+            <pc:sldMk cId="3857672638" sldId="265"/>
+            <ac:spMk id="4" creationId="{B48FD785-217E-8574-4CF3-8B32FF1F49EF}"/>
+          </ac:spMkLst>
+        </pc:spChg>
+        <pc:spChg chg="add mod">
+          <ac:chgData name="Ocean Graham" userId="c784d4c6-724f-4452-8baf-8c216b3c246d" providerId="ADAL" clId="{C7DA60A2-EAD7-4DD0-9773-C83A5B1E6564}" dt="2025-02-04T10:35:03.653" v="5104" actId="1076"/>
+          <ac:spMkLst>
+            <pc:docMk/>
+            <pc:sldMk cId="3857672638" sldId="265"/>
+            <ac:spMk id="5" creationId="{75AF856C-1BE0-FC33-AB24-12C12828BC0C}"/>
+          </ac:spMkLst>
+        </pc:spChg>
+        <pc:spChg chg="add del mod">
+          <ac:chgData name="Ocean Graham" userId="c784d4c6-724f-4452-8baf-8c216b3c246d" providerId="ADAL" clId="{C7DA60A2-EAD7-4DD0-9773-C83A5B1E6564}" dt="2025-02-04T10:48:44.160" v="5131"/>
+          <ac:spMkLst>
+            <pc:docMk/>
+            <pc:sldMk cId="3857672638" sldId="265"/>
+            <ac:spMk id="10" creationId="{40BCD022-8C0C-E4E6-0743-5F6D3649120A}"/>
+          </ac:spMkLst>
+        </pc:spChg>
+        <pc:spChg chg="add del mod">
+          <ac:chgData name="Ocean Graham" userId="c784d4c6-724f-4452-8baf-8c216b3c246d" providerId="ADAL" clId="{C7DA60A2-EAD7-4DD0-9773-C83A5B1E6564}" dt="2025-02-04T10:51:09.482" v="5146"/>
+          <ac:spMkLst>
+            <pc:docMk/>
+            <pc:sldMk cId="3857672638" sldId="265"/>
+            <ac:spMk id="11" creationId="{DBE1EB07-B273-7B8E-2B3C-1425049F732E}"/>
+          </ac:spMkLst>
+        </pc:spChg>
+        <pc:spChg chg="add mod">
+          <ac:chgData name="Ocean Graham" userId="c784d4c6-724f-4452-8baf-8c216b3c246d" providerId="ADAL" clId="{C7DA60A2-EAD7-4DD0-9773-C83A5B1E6564}" dt="2025-02-04T12:20:47.604" v="5994" actId="20577"/>
+          <ac:spMkLst>
+            <pc:docMk/>
+            <pc:sldMk cId="3857672638" sldId="265"/>
+            <ac:spMk id="12" creationId="{BF053147-C543-EA24-A5E7-4BD9D66C1BF9}"/>
+          </ac:spMkLst>
+        </pc:spChg>
+        <pc:picChg chg="add mod">
+          <ac:chgData name="Ocean Graham" userId="c784d4c6-724f-4452-8baf-8c216b3c246d" providerId="ADAL" clId="{C7DA60A2-EAD7-4DD0-9773-C83A5B1E6564}" dt="2025-02-04T10:48:15.872" v="5114" actId="14100"/>
+          <ac:picMkLst>
+            <pc:docMk/>
+            <pc:sldMk cId="3857672638" sldId="265"/>
+            <ac:picMk id="7" creationId="{48DC38B2-4CB5-53AB-14DB-754ACD164C3F}"/>
+          </ac:picMkLst>
+        </pc:picChg>
+        <pc:picChg chg="add mod">
+          <ac:chgData name="Ocean Graham" userId="c784d4c6-724f-4452-8baf-8c216b3c246d" providerId="ADAL" clId="{C7DA60A2-EAD7-4DD0-9773-C83A5B1E6564}" dt="2025-02-04T10:48:06.201" v="5111" actId="1076"/>
+          <ac:picMkLst>
+            <pc:docMk/>
+            <pc:sldMk cId="3857672638" sldId="265"/>
+            <ac:picMk id="9" creationId="{053B210B-F634-A326-958E-50DF6DF6EEA4}"/>
+          </ac:picMkLst>
+        </pc:picChg>
+      </pc:sldChg>
+      <pc:sldChg chg="delSp modSp new mod">
+        <pc:chgData name="Ocean Graham" userId="c784d4c6-724f-4452-8baf-8c216b3c246d" providerId="ADAL" clId="{C7DA60A2-EAD7-4DD0-9773-C83A5B1E6564}" dt="2025-02-04T12:24:48.152" v="6067" actId="21"/>
+        <pc:sldMkLst>
+          <pc:docMk/>
+          <pc:sldMk cId="3358884233" sldId="266"/>
+        </pc:sldMkLst>
+        <pc:spChg chg="mod">
+          <ac:chgData name="Ocean Graham" userId="c784d4c6-724f-4452-8baf-8c216b3c246d" providerId="ADAL" clId="{C7DA60A2-EAD7-4DD0-9773-C83A5B1E6564}" dt="2025-02-04T12:23:39.380" v="6044" actId="1076"/>
+          <ac:spMkLst>
+            <pc:docMk/>
+            <pc:sldMk cId="3358884233" sldId="266"/>
+            <ac:spMk id="2" creationId="{AABEED34-0D67-EF02-A22D-B1B98282E92F}"/>
+          </ac:spMkLst>
+        </pc:spChg>
+        <pc:spChg chg="del">
+          <ac:chgData name="Ocean Graham" userId="c784d4c6-724f-4452-8baf-8c216b3c246d" providerId="ADAL" clId="{C7DA60A2-EAD7-4DD0-9773-C83A5B1E6564}" dt="2025-02-04T12:24:48.152" v="6067" actId="21"/>
+          <ac:spMkLst>
+            <pc:docMk/>
+            <pc:sldMk cId="3358884233" sldId="266"/>
+            <ac:spMk id="3" creationId="{058E6F45-6057-CD72-B13C-8322367B83D1}"/>
+          </ac:spMkLst>
+        </pc:spChg>
+      </pc:sldChg>
+      <pc:sldChg chg="delSp modSp new mod">
+        <pc:chgData name="Ocean Graham" userId="c784d4c6-724f-4452-8baf-8c216b3c246d" providerId="ADAL" clId="{C7DA60A2-EAD7-4DD0-9773-C83A5B1E6564}" dt="2025-02-04T12:24:45.810" v="6066" actId="21"/>
+        <pc:sldMkLst>
+          <pc:docMk/>
+          <pc:sldMk cId="2499244716" sldId="267"/>
+        </pc:sldMkLst>
+        <pc:spChg chg="mod">
+          <ac:chgData name="Ocean Graham" userId="c784d4c6-724f-4452-8baf-8c216b3c246d" providerId="ADAL" clId="{C7DA60A2-EAD7-4DD0-9773-C83A5B1E6564}" dt="2025-02-04T12:24:05.204" v="6050" actId="1076"/>
+          <ac:spMkLst>
+            <pc:docMk/>
+            <pc:sldMk cId="2499244716" sldId="267"/>
+            <ac:spMk id="2" creationId="{13D60BB3-0713-D28C-F3A7-508B1F0B273C}"/>
+          </ac:spMkLst>
+        </pc:spChg>
+        <pc:spChg chg="del">
+          <ac:chgData name="Ocean Graham" userId="c784d4c6-724f-4452-8baf-8c216b3c246d" providerId="ADAL" clId="{C7DA60A2-EAD7-4DD0-9773-C83A5B1E6564}" dt="2025-02-04T12:24:45.810" v="6066" actId="21"/>
+          <ac:spMkLst>
+            <pc:docMk/>
+            <pc:sldMk cId="2499244716" sldId="267"/>
+            <ac:spMk id="3" creationId="{D40C4666-1C40-854F-670E-CE57C3CDA52F}"/>
+          </ac:spMkLst>
+        </pc:spChg>
+      </pc:sldChg>
+      <pc:sldChg chg="delSp modSp new mod">
+        <pc:chgData name="Ocean Graham" userId="c784d4c6-724f-4452-8baf-8c216b3c246d" providerId="ADAL" clId="{C7DA60A2-EAD7-4DD0-9773-C83A5B1E6564}" dt="2025-02-04T12:24:42.751" v="6065" actId="21"/>
+        <pc:sldMkLst>
+          <pc:docMk/>
+          <pc:sldMk cId="3942598934" sldId="268"/>
+        </pc:sldMkLst>
+        <pc:spChg chg="mod">
+          <ac:chgData name="Ocean Graham" userId="c784d4c6-724f-4452-8baf-8c216b3c246d" providerId="ADAL" clId="{C7DA60A2-EAD7-4DD0-9773-C83A5B1E6564}" dt="2025-02-04T12:24:33.275" v="6064" actId="1076"/>
+          <ac:spMkLst>
+            <pc:docMk/>
+            <pc:sldMk cId="3942598934" sldId="268"/>
+            <ac:spMk id="2" creationId="{26E06AB0-37BC-95D4-F6CD-D462531CFF3D}"/>
+          </ac:spMkLst>
+        </pc:spChg>
+        <pc:spChg chg="del">
+          <ac:chgData name="Ocean Graham" userId="c784d4c6-724f-4452-8baf-8c216b3c246d" providerId="ADAL" clId="{C7DA60A2-EAD7-4DD0-9773-C83A5B1E6564}" dt="2025-02-04T12:24:42.751" v="6065" actId="21"/>
+          <ac:spMkLst>
+            <pc:docMk/>
+            <pc:sldMk cId="3942598934" sldId="268"/>
+            <ac:spMk id="3" creationId="{BC10C015-19BE-BBF6-DB7A-C036579B7DE7}"/>
+          </ac:spMkLst>
+        </pc:spChg>
+      </pc:sldChg>
     </pc:docChg>
   </pc:docChgLst>
 </pc:chgInfo>
+</file>
+
+<file path=ppt/notesMasters/notesMaster1.xml><?xml version="1.0" encoding="utf-8"?>
+<p:notesMaster xmlns:a="http://schemas.openxmlformats.org/drawingml/2006/main" xmlns:r="http://schemas.openxmlformats.org/officeDocument/2006/relationships" xmlns:p="http://schemas.openxmlformats.org/presentationml/2006/main">
+  <p:cSld>
+    <p:bg>
+      <p:bgRef idx="1001">
+        <a:schemeClr val="bg1"/>
+      </p:bgRef>
+    </p:bg>
+    <p:spTree>
+      <p:nvGrpSpPr>
+        <p:cNvPr id="1" name=""/>
+        <p:cNvGrpSpPr/>
+        <p:nvPr/>
+      </p:nvGrpSpPr>
+      <p:grpSpPr>
+        <a:xfrm>
+          <a:off x="0" y="0"/>
+          <a:ext cx="0" cy="0"/>
+          <a:chOff x="0" y="0"/>
+          <a:chExt cx="0" cy="0"/>
+        </a:xfrm>
+      </p:grpSpPr>
+      <p:sp>
+        <p:nvSpPr>
+          <p:cNvPr id="2" name="Header Placeholder 1"/>
+          <p:cNvSpPr>
+            <a:spLocks noGrp="1"/>
+          </p:cNvSpPr>
+          <p:nvPr>
+            <p:ph type="hdr" sz="quarter"/>
+          </p:nvPr>
+        </p:nvSpPr>
+        <p:spPr>
+          <a:xfrm>
+            <a:off x="0" y="0"/>
+            <a:ext cx="2971800" cy="458788"/>
+          </a:xfrm>
+          <a:prstGeom prst="rect">
+            <a:avLst/>
+          </a:prstGeom>
+        </p:spPr>
+        <p:txBody>
+          <a:bodyPr vert="horz" lIns="91440" tIns="45720" rIns="91440" bIns="45720" rtlCol="0"/>
+          <a:lstStyle>
+            <a:lvl1pPr algn="l">
+              <a:defRPr sz="1200"/>
+            </a:lvl1pPr>
+          </a:lstStyle>
+          <a:p>
+            <a:endParaRPr lang="en-GB"/>
+          </a:p>
+        </p:txBody>
+      </p:sp>
+      <p:sp>
+        <p:nvSpPr>
+          <p:cNvPr id="3" name="Date Placeholder 2"/>
+          <p:cNvSpPr>
+            <a:spLocks noGrp="1"/>
+          </p:cNvSpPr>
+          <p:nvPr>
+            <p:ph type="dt" idx="1"/>
+          </p:nvPr>
+        </p:nvSpPr>
+        <p:spPr>
+          <a:xfrm>
+            <a:off x="3884613" y="0"/>
+            <a:ext cx="2971800" cy="458788"/>
+          </a:xfrm>
+          <a:prstGeom prst="rect">
+            <a:avLst/>
+          </a:prstGeom>
+        </p:spPr>
+        <p:txBody>
+          <a:bodyPr vert="horz" lIns="91440" tIns="45720" rIns="91440" bIns="45720" rtlCol="0"/>
+          <a:lstStyle>
+            <a:lvl1pPr algn="r">
+              <a:defRPr sz="1200"/>
+            </a:lvl1pPr>
+          </a:lstStyle>
+          <a:p>
+            <a:fld id="{116C4C18-9B89-4B9A-B59A-E7B597238EE5}" type="datetimeFigureOut">
+              <a:rPr lang="en-GB" smtClean="0"/>
+              <a:t>04/02/2025</a:t>
+            </a:fld>
+            <a:endParaRPr lang="en-GB"/>
+          </a:p>
+        </p:txBody>
+      </p:sp>
+      <p:sp>
+        <p:nvSpPr>
+          <p:cNvPr id="4" name="Slide Image Placeholder 3"/>
+          <p:cNvSpPr>
+            <a:spLocks noGrp="1" noRot="1" noChangeAspect="1"/>
+          </p:cNvSpPr>
+          <p:nvPr>
+            <p:ph type="sldImg" idx="2"/>
+          </p:nvPr>
+        </p:nvSpPr>
+        <p:spPr>
+          <a:xfrm>
+            <a:off x="685800" y="1143000"/>
+            <a:ext cx="5486400" cy="3086100"/>
+          </a:xfrm>
+          <a:prstGeom prst="rect">
+            <a:avLst/>
+          </a:prstGeom>
+          <a:noFill/>
+          <a:ln w="12700">
+            <a:solidFill>
+              <a:prstClr val="black"/>
+            </a:solidFill>
+          </a:ln>
+        </p:spPr>
+        <p:txBody>
+          <a:bodyPr vert="horz" lIns="91440" tIns="45720" rIns="91440" bIns="45720" rtlCol="0" anchor="ctr"/>
+          <a:lstStyle/>
+          <a:p>
+            <a:endParaRPr lang="en-GB"/>
+          </a:p>
+        </p:txBody>
+      </p:sp>
+      <p:sp>
+        <p:nvSpPr>
+          <p:cNvPr id="5" name="Notes Placeholder 4"/>
+          <p:cNvSpPr>
+            <a:spLocks noGrp="1"/>
+          </p:cNvSpPr>
+          <p:nvPr>
+            <p:ph type="body" sz="quarter" idx="3"/>
+          </p:nvPr>
+        </p:nvSpPr>
+        <p:spPr>
+          <a:xfrm>
+            <a:off x="685800" y="4400550"/>
+            <a:ext cx="5486400" cy="3600450"/>
+          </a:xfrm>
+          <a:prstGeom prst="rect">
+            <a:avLst/>
+          </a:prstGeom>
+        </p:spPr>
+        <p:txBody>
+          <a:bodyPr vert="horz" lIns="91440" tIns="45720" rIns="91440" bIns="45720" rtlCol="0"/>
+          <a:lstStyle/>
+          <a:p>
+            <a:pPr lvl="0"/>
+            <a:r>
+              <a:rPr lang="en-GB"/>
+              <a:t>Click to edit Master text styles</a:t>
+            </a:r>
+          </a:p>
+          <a:p>
+            <a:pPr lvl="1"/>
+            <a:r>
+              <a:rPr lang="en-GB"/>
+              <a:t>Second level</a:t>
+            </a:r>
+          </a:p>
+          <a:p>
+            <a:pPr lvl="2"/>
+            <a:r>
+              <a:rPr lang="en-GB"/>
+              <a:t>Third level</a:t>
+            </a:r>
+          </a:p>
+          <a:p>
+            <a:pPr lvl="3"/>
+            <a:r>
+              <a:rPr lang="en-GB"/>
+              <a:t>Fourth level</a:t>
+            </a:r>
+          </a:p>
+          <a:p>
+            <a:pPr lvl="4"/>
+            <a:r>
+              <a:rPr lang="en-GB"/>
+              <a:t>Fifth level</a:t>
+            </a:r>
+          </a:p>
+        </p:txBody>
+      </p:sp>
+      <p:sp>
+        <p:nvSpPr>
+          <p:cNvPr id="6" name="Footer Placeholder 5"/>
+          <p:cNvSpPr>
+            <a:spLocks noGrp="1"/>
+          </p:cNvSpPr>
+          <p:nvPr>
+            <p:ph type="ftr" sz="quarter" idx="4"/>
+          </p:nvPr>
+        </p:nvSpPr>
+        <p:spPr>
+          <a:xfrm>
+            <a:off x="0" y="8685213"/>
+            <a:ext cx="2971800" cy="458787"/>
+          </a:xfrm>
+          <a:prstGeom prst="rect">
+            <a:avLst/>
+          </a:prstGeom>
+        </p:spPr>
+        <p:txBody>
+          <a:bodyPr vert="horz" lIns="91440" tIns="45720" rIns="91440" bIns="45720" rtlCol="0" anchor="b"/>
+          <a:lstStyle>
+            <a:lvl1pPr algn="l">
+              <a:defRPr sz="1200"/>
+            </a:lvl1pPr>
+          </a:lstStyle>
+          <a:p>
+            <a:endParaRPr lang="en-GB"/>
+          </a:p>
+        </p:txBody>
+      </p:sp>
+      <p:sp>
+        <p:nvSpPr>
+          <p:cNvPr id="7" name="Slide Number Placeholder 6"/>
+          <p:cNvSpPr>
+            <a:spLocks noGrp="1"/>
+          </p:cNvSpPr>
+          <p:nvPr>
+            <p:ph type="sldNum" sz="quarter" idx="5"/>
+          </p:nvPr>
+        </p:nvSpPr>
+        <p:spPr>
+          <a:xfrm>
+            <a:off x="3884613" y="8685213"/>
+            <a:ext cx="2971800" cy="458787"/>
+          </a:xfrm>
+          <a:prstGeom prst="rect">
+            <a:avLst/>
+          </a:prstGeom>
+        </p:spPr>
+        <p:txBody>
+          <a:bodyPr vert="horz" lIns="91440" tIns="45720" rIns="91440" bIns="45720" rtlCol="0" anchor="b"/>
+          <a:lstStyle>
+            <a:lvl1pPr algn="r">
+              <a:defRPr sz="1200"/>
+            </a:lvl1pPr>
+          </a:lstStyle>
+          <a:p>
+            <a:fld id="{255DFA00-2D90-4E7A-BDDF-75055399B282}" type="slidenum">
+              <a:rPr lang="en-GB" smtClean="0"/>
+              <a:t>‹#›</a:t>
+            </a:fld>
+            <a:endParaRPr lang="en-GB"/>
+          </a:p>
+        </p:txBody>
+      </p:sp>
+    </p:spTree>
+    <p:extLst>
+      <p:ext uri="{BB962C8B-B14F-4D97-AF65-F5344CB8AC3E}">
+        <p14:creationId xmlns:p14="http://schemas.microsoft.com/office/powerpoint/2010/main" val="3561531215"/>
+      </p:ext>
+    </p:extLst>
+  </p:cSld>
+  <p:clrMap bg1="lt1" tx1="dk1" bg2="lt2" tx2="dk2" accent1="accent1" accent2="accent2" accent3="accent3" accent4="accent4" accent5="accent5" accent6="accent6" hlink="hlink" folHlink="folHlink"/>
+  <p:notesStyle>
+    <a:lvl1pPr marL="0" algn="l" defTabSz="914400" rtl="0" eaLnBrk="1" latinLnBrk="0" hangingPunct="1">
+      <a:defRPr sz="1200" kern="1200">
+        <a:solidFill>
+          <a:schemeClr val="tx1"/>
+        </a:solidFill>
+        <a:latin typeface="+mn-lt"/>
+        <a:ea typeface="+mn-ea"/>
+        <a:cs typeface="+mn-cs"/>
+      </a:defRPr>
+    </a:lvl1pPr>
+    <a:lvl2pPr marL="457200" algn="l" defTabSz="914400" rtl="0" eaLnBrk="1" latinLnBrk="0" hangingPunct="1">
+      <a:defRPr sz="1200" kern="1200">
+        <a:solidFill>
+          <a:schemeClr val="tx1"/>
+        </a:solidFill>
+        <a:latin typeface="+mn-lt"/>
+        <a:ea typeface="+mn-ea"/>
+        <a:cs typeface="+mn-cs"/>
+      </a:defRPr>
+    </a:lvl2pPr>
+    <a:lvl3pPr marL="914400" algn="l" defTabSz="914400" rtl="0" eaLnBrk="1" latinLnBrk="0" hangingPunct="1">
+      <a:defRPr sz="1200" kern="1200">
+        <a:solidFill>
+          <a:schemeClr val="tx1"/>
+        </a:solidFill>
+        <a:latin typeface="+mn-lt"/>
+        <a:ea typeface="+mn-ea"/>
+        <a:cs typeface="+mn-cs"/>
+      </a:defRPr>
+    </a:lvl3pPr>
+    <a:lvl4pPr marL="1371600" algn="l" defTabSz="914400" rtl="0" eaLnBrk="1" latinLnBrk="0" hangingPunct="1">
+      <a:defRPr sz="1200" kern="1200">
+        <a:solidFill>
+          <a:schemeClr val="tx1"/>
+        </a:solidFill>
+        <a:latin typeface="+mn-lt"/>
+        <a:ea typeface="+mn-ea"/>
+        <a:cs typeface="+mn-cs"/>
+      </a:defRPr>
+    </a:lvl4pPr>
+    <a:lvl5pPr marL="1828800" algn="l" defTabSz="914400" rtl="0" eaLnBrk="1" latinLnBrk="0" hangingPunct="1">
+      <a:defRPr sz="1200" kern="1200">
+        <a:solidFill>
+          <a:schemeClr val="tx1"/>
+        </a:solidFill>
+        <a:latin typeface="+mn-lt"/>
+        <a:ea typeface="+mn-ea"/>
+        <a:cs typeface="+mn-cs"/>
+      </a:defRPr>
+    </a:lvl5pPr>
+    <a:lvl6pPr marL="2286000" algn="l" defTabSz="914400" rtl="0" eaLnBrk="1" latinLnBrk="0" hangingPunct="1">
+      <a:defRPr sz="1200" kern="1200">
+        <a:solidFill>
+          <a:schemeClr val="tx1"/>
+        </a:solidFill>
+        <a:latin typeface="+mn-lt"/>
+        <a:ea typeface="+mn-ea"/>
+        <a:cs typeface="+mn-cs"/>
+      </a:defRPr>
+    </a:lvl6pPr>
+    <a:lvl7pPr marL="2743200" algn="l" defTabSz="914400" rtl="0" eaLnBrk="1" latinLnBrk="0" hangingPunct="1">
+      <a:defRPr sz="1200" kern="1200">
+        <a:solidFill>
+          <a:schemeClr val="tx1"/>
+        </a:solidFill>
+        <a:latin typeface="+mn-lt"/>
+        <a:ea typeface="+mn-ea"/>
+        <a:cs typeface="+mn-cs"/>
+      </a:defRPr>
+    </a:lvl7pPr>
+    <a:lvl8pPr marL="3200400" algn="l" defTabSz="914400" rtl="0" eaLnBrk="1" latinLnBrk="0" hangingPunct="1">
+      <a:defRPr sz="1200" kern="1200">
+        <a:solidFill>
+          <a:schemeClr val="tx1"/>
+        </a:solidFill>
+        <a:latin typeface="+mn-lt"/>
+        <a:ea typeface="+mn-ea"/>
+        <a:cs typeface="+mn-cs"/>
+      </a:defRPr>
+    </a:lvl8pPr>
+    <a:lvl9pPr marL="3657600" algn="l" defTabSz="914400" rtl="0" eaLnBrk="1" latinLnBrk="0" hangingPunct="1">
+      <a:defRPr sz="1200" kern="1200">
+        <a:solidFill>
+          <a:schemeClr val="tx1"/>
+        </a:solidFill>
+        <a:latin typeface="+mn-lt"/>
+        <a:ea typeface="+mn-ea"/>
+        <a:cs typeface="+mn-cs"/>
+      </a:defRPr>
+    </a:lvl9pPr>
+  </p:notesStyle>
+</p:notesMaster>
+</file>
+
+<file path=ppt/notesSlides/notesSlide1.xml><?xml version="1.0" encoding="utf-8"?>
+<p:notes xmlns:a="http://schemas.openxmlformats.org/drawingml/2006/main" xmlns:r="http://schemas.openxmlformats.org/officeDocument/2006/relationships" xmlns:p="http://schemas.openxmlformats.org/presentationml/2006/main">
+  <p:cSld>
+    <p:spTree>
+      <p:nvGrpSpPr>
+        <p:cNvPr id="1" name=""/>
+        <p:cNvGrpSpPr/>
+        <p:nvPr/>
+      </p:nvGrpSpPr>
+      <p:grpSpPr>
+        <a:xfrm>
+          <a:off x="0" y="0"/>
+          <a:ext cx="0" cy="0"/>
+          <a:chOff x="0" y="0"/>
+          <a:chExt cx="0" cy="0"/>
+        </a:xfrm>
+      </p:grpSpPr>
+      <p:sp>
+        <p:nvSpPr>
+          <p:cNvPr id="2" name="Slide Image Placeholder 1"/>
+          <p:cNvSpPr>
+            <a:spLocks noGrp="1" noRot="1" noChangeAspect="1"/>
+          </p:cNvSpPr>
+          <p:nvPr>
+            <p:ph type="sldImg"/>
+          </p:nvPr>
+        </p:nvSpPr>
+        <p:spPr/>
+      </p:sp>
+      <p:sp>
+        <p:nvSpPr>
+          <p:cNvPr id="3" name="Notes Placeholder 2"/>
+          <p:cNvSpPr>
+            <a:spLocks noGrp="1"/>
+          </p:cNvSpPr>
+          <p:nvPr>
+            <p:ph type="body" idx="1"/>
+          </p:nvPr>
+        </p:nvSpPr>
+        <p:spPr/>
+        <p:txBody>
+          <a:bodyPr/>
+          <a:lstStyle/>
+          <a:p>
+            <a:endParaRPr lang="en-GB" dirty="0"/>
+          </a:p>
+        </p:txBody>
+      </p:sp>
+      <p:sp>
+        <p:nvSpPr>
+          <p:cNvPr id="4" name="Slide Number Placeholder 3"/>
+          <p:cNvSpPr>
+            <a:spLocks noGrp="1"/>
+          </p:cNvSpPr>
+          <p:nvPr>
+            <p:ph type="sldNum" sz="quarter" idx="5"/>
+          </p:nvPr>
+        </p:nvSpPr>
+        <p:spPr/>
+        <p:txBody>
+          <a:bodyPr/>
+          <a:lstStyle/>
+          <a:p>
+            <a:fld id="{255DFA00-2D90-4E7A-BDDF-75055399B282}" type="slidenum">
+              <a:rPr lang="en-GB" smtClean="0"/>
+              <a:t>7</a:t>
+            </a:fld>
+            <a:endParaRPr lang="en-GB"/>
+          </a:p>
+        </p:txBody>
+      </p:sp>
+    </p:spTree>
+    <p:extLst>
+      <p:ext uri="{BB962C8B-B14F-4D97-AF65-F5344CB8AC3E}">
+        <p14:creationId xmlns:p14="http://schemas.microsoft.com/office/powerpoint/2010/main" val="1144335511"/>
+      </p:ext>
+    </p:extLst>
+  </p:cSld>
+  <p:clrMapOvr>
+    <a:masterClrMapping/>
+  </p:clrMapOvr>
+</p:notes>
 </file>
 
 <file path=ppt/slideLayouts/slideLayout1.xml><?xml version="1.0" encoding="utf-8"?>
@@ -658,7 +1570,7 @@
           <a:p>
             <a:fld id="{A0236FAB-00C9-42EF-951A-8214ABE11C79}" type="datetimeFigureOut">
               <a:rPr lang="en-GB" smtClean="0"/>
-              <a:t>03/02/2025</a:t>
+              <a:t>04/02/2025</a:t>
             </a:fld>
             <a:endParaRPr lang="en-GB"/>
           </a:p>
@@ -856,7 +1768,7 @@
           <a:p>
             <a:fld id="{A0236FAB-00C9-42EF-951A-8214ABE11C79}" type="datetimeFigureOut">
               <a:rPr lang="en-GB" smtClean="0"/>
-              <a:t>03/02/2025</a:t>
+              <a:t>04/02/2025</a:t>
             </a:fld>
             <a:endParaRPr lang="en-GB"/>
           </a:p>
@@ -1064,7 +1976,7 @@
           <a:p>
             <a:fld id="{A0236FAB-00C9-42EF-951A-8214ABE11C79}" type="datetimeFigureOut">
               <a:rPr lang="en-GB" smtClean="0"/>
-              <a:t>03/02/2025</a:t>
+              <a:t>04/02/2025</a:t>
             </a:fld>
             <a:endParaRPr lang="en-GB"/>
           </a:p>
@@ -1262,7 +2174,7 @@
           <a:p>
             <a:fld id="{A0236FAB-00C9-42EF-951A-8214ABE11C79}" type="datetimeFigureOut">
               <a:rPr lang="en-GB" smtClean="0"/>
-              <a:t>03/02/2025</a:t>
+              <a:t>04/02/2025</a:t>
             </a:fld>
             <a:endParaRPr lang="en-GB"/>
           </a:p>
@@ -1537,7 +2449,7 @@
           <a:p>
             <a:fld id="{A0236FAB-00C9-42EF-951A-8214ABE11C79}" type="datetimeFigureOut">
               <a:rPr lang="en-GB" smtClean="0"/>
-              <a:t>03/02/2025</a:t>
+              <a:t>04/02/2025</a:t>
             </a:fld>
             <a:endParaRPr lang="en-GB"/>
           </a:p>
@@ -1802,7 +2714,7 @@
           <a:p>
             <a:fld id="{A0236FAB-00C9-42EF-951A-8214ABE11C79}" type="datetimeFigureOut">
               <a:rPr lang="en-GB" smtClean="0"/>
-              <a:t>03/02/2025</a:t>
+              <a:t>04/02/2025</a:t>
             </a:fld>
             <a:endParaRPr lang="en-GB"/>
           </a:p>
@@ -2214,7 +3126,7 @@
           <a:p>
             <a:fld id="{A0236FAB-00C9-42EF-951A-8214ABE11C79}" type="datetimeFigureOut">
               <a:rPr lang="en-GB" smtClean="0"/>
-              <a:t>03/02/2025</a:t>
+              <a:t>04/02/2025</a:t>
             </a:fld>
             <a:endParaRPr lang="en-GB"/>
           </a:p>
@@ -2355,7 +3267,7 @@
           <a:p>
             <a:fld id="{A0236FAB-00C9-42EF-951A-8214ABE11C79}" type="datetimeFigureOut">
               <a:rPr lang="en-GB" smtClean="0"/>
-              <a:t>03/02/2025</a:t>
+              <a:t>04/02/2025</a:t>
             </a:fld>
             <a:endParaRPr lang="en-GB"/>
           </a:p>
@@ -2468,7 +3380,7 @@
           <a:p>
             <a:fld id="{A0236FAB-00C9-42EF-951A-8214ABE11C79}" type="datetimeFigureOut">
               <a:rPr lang="en-GB" smtClean="0"/>
-              <a:t>03/02/2025</a:t>
+              <a:t>04/02/2025</a:t>
             </a:fld>
             <a:endParaRPr lang="en-GB"/>
           </a:p>
@@ -2779,7 +3691,7 @@
           <a:p>
             <a:fld id="{A0236FAB-00C9-42EF-951A-8214ABE11C79}" type="datetimeFigureOut">
               <a:rPr lang="en-GB" smtClean="0"/>
-              <a:t>03/02/2025</a:t>
+              <a:t>04/02/2025</a:t>
             </a:fld>
             <a:endParaRPr lang="en-GB"/>
           </a:p>
@@ -3067,7 +3979,7 @@
           <a:p>
             <a:fld id="{A0236FAB-00C9-42EF-951A-8214ABE11C79}" type="datetimeFigureOut">
               <a:rPr lang="en-GB" smtClean="0"/>
-              <a:t>03/02/2025</a:t>
+              <a:t>04/02/2025</a:t>
             </a:fld>
             <a:endParaRPr lang="en-GB"/>
           </a:p>
@@ -3308,7 +4220,7 @@
           <a:p>
             <a:fld id="{A0236FAB-00C9-42EF-951A-8214ABE11C79}" type="datetimeFigureOut">
               <a:rPr lang="en-GB" smtClean="0"/>
-              <a:t>03/02/2025</a:t>
+              <a:t>04/02/2025</a:t>
             </a:fld>
             <a:endParaRPr lang="en-GB"/>
           </a:p>
@@ -3833,6 +4745,461 @@
 </p:sld>
 </file>
 
+<file path=ppt/slides/slide10.xml><?xml version="1.0" encoding="utf-8"?>
+<p:sld xmlns:a="http://schemas.openxmlformats.org/drawingml/2006/main" xmlns:r="http://schemas.openxmlformats.org/officeDocument/2006/relationships" xmlns:p="http://schemas.openxmlformats.org/presentationml/2006/main">
+  <p:cSld>
+    <p:spTree>
+      <p:nvGrpSpPr>
+        <p:cNvPr id="1" name=""/>
+        <p:cNvGrpSpPr/>
+        <p:nvPr/>
+      </p:nvGrpSpPr>
+      <p:grpSpPr>
+        <a:xfrm>
+          <a:off x="0" y="0"/>
+          <a:ext cx="0" cy="0"/>
+          <a:chOff x="0" y="0"/>
+          <a:chExt cx="0" cy="0"/>
+        </a:xfrm>
+      </p:grpSpPr>
+      <p:sp>
+        <p:nvSpPr>
+          <p:cNvPr id="2" name="Title 1">
+            <a:extLst>
+              <a:ext uri="{FF2B5EF4-FFF2-40B4-BE49-F238E27FC236}">
+                <a16:creationId xmlns:a16="http://schemas.microsoft.com/office/drawing/2014/main" id="{66F611B0-10AE-C392-D95E-015081CD2662}"/>
+              </a:ext>
+            </a:extLst>
+          </p:cNvPr>
+          <p:cNvSpPr>
+            <a:spLocks noGrp="1"/>
+          </p:cNvSpPr>
+          <p:nvPr>
+            <p:ph type="title"/>
+          </p:nvPr>
+        </p:nvSpPr>
+        <p:spPr>
+          <a:xfrm>
+            <a:off x="838200" y="292419"/>
+            <a:ext cx="10515600" cy="786574"/>
+          </a:xfrm>
+        </p:spPr>
+        <p:txBody>
+          <a:bodyPr>
+            <a:normAutofit/>
+          </a:bodyPr>
+          <a:lstStyle/>
+          <a:p>
+            <a:r>
+              <a:rPr lang="en-GB" sz="4300" dirty="0"/>
+              <a:t>Lists</a:t>
+            </a:r>
+          </a:p>
+        </p:txBody>
+      </p:sp>
+      <p:sp>
+        <p:nvSpPr>
+          <p:cNvPr id="4" name="TextBox 3">
+            <a:extLst>
+              <a:ext uri="{FF2B5EF4-FFF2-40B4-BE49-F238E27FC236}">
+                <a16:creationId xmlns:a16="http://schemas.microsoft.com/office/drawing/2014/main" id="{344C945F-4504-76BE-DD9D-52FD433C6092}"/>
+              </a:ext>
+            </a:extLst>
+          </p:cNvPr>
+          <p:cNvSpPr txBox="1"/>
+          <p:nvPr/>
+        </p:nvSpPr>
+        <p:spPr>
+          <a:xfrm>
+            <a:off x="838200" y="1298448"/>
+            <a:ext cx="3337560" cy="523220"/>
+          </a:xfrm>
+          <a:prstGeom prst="rect">
+            <a:avLst/>
+          </a:prstGeom>
+          <a:noFill/>
+        </p:spPr>
+        <p:txBody>
+          <a:bodyPr wrap="square" rtlCol="0">
+            <a:spAutoFit/>
+          </a:bodyPr>
+          <a:lstStyle/>
+          <a:p>
+            <a:r>
+              <a:rPr lang="en-GB" sz="2800" dirty="0"/>
+              <a:t>Script</a:t>
+            </a:r>
+          </a:p>
+        </p:txBody>
+      </p:sp>
+      <p:sp>
+        <p:nvSpPr>
+          <p:cNvPr id="5" name="TextBox 4">
+            <a:extLst>
+              <a:ext uri="{FF2B5EF4-FFF2-40B4-BE49-F238E27FC236}">
+                <a16:creationId xmlns:a16="http://schemas.microsoft.com/office/drawing/2014/main" id="{74597ECA-2801-F899-3ED9-B92FF61948B1}"/>
+              </a:ext>
+            </a:extLst>
+          </p:cNvPr>
+          <p:cNvSpPr txBox="1"/>
+          <p:nvPr/>
+        </p:nvSpPr>
+        <p:spPr>
+          <a:xfrm>
+            <a:off x="6096000" y="1298448"/>
+            <a:ext cx="5605272" cy="523220"/>
+          </a:xfrm>
+          <a:prstGeom prst="rect">
+            <a:avLst/>
+          </a:prstGeom>
+          <a:noFill/>
+        </p:spPr>
+        <p:txBody>
+          <a:bodyPr wrap="square" rtlCol="0">
+            <a:spAutoFit/>
+          </a:bodyPr>
+          <a:lstStyle/>
+          <a:p>
+            <a:r>
+              <a:rPr lang="en-GB" sz="2800" dirty="0"/>
+              <a:t>Output</a:t>
+            </a:r>
+          </a:p>
+        </p:txBody>
+      </p:sp>
+      <p:pic>
+        <p:nvPicPr>
+          <p:cNvPr id="7" name="Picture 6" descr="A white background with blue text&#10;&#10;Description automatically generated">
+            <a:extLst>
+              <a:ext uri="{FF2B5EF4-FFF2-40B4-BE49-F238E27FC236}">
+                <a16:creationId xmlns:a16="http://schemas.microsoft.com/office/drawing/2014/main" id="{19D5864A-2488-1F2D-C6EB-121D11294562}"/>
+              </a:ext>
+            </a:extLst>
+          </p:cNvPr>
+          <p:cNvPicPr>
+            <a:picLocks noChangeAspect="1"/>
+          </p:cNvPicPr>
+          <p:nvPr/>
+        </p:nvPicPr>
+        <p:blipFill>
+          <a:blip r:embed="rId2">
+            <a:extLst>
+              <a:ext uri="{28A0092B-C50C-407E-A947-70E740481C1C}">
+                <a14:useLocalDpi xmlns:a14="http://schemas.microsoft.com/office/drawing/2010/main" val="0"/>
+              </a:ext>
+            </a:extLst>
+          </a:blip>
+          <a:stretch>
+            <a:fillRect/>
+          </a:stretch>
+        </p:blipFill>
+        <p:spPr>
+          <a:xfrm>
+            <a:off x="6096000" y="2041123"/>
+            <a:ext cx="3829584" cy="1657581"/>
+          </a:xfrm>
+          <a:prstGeom prst="rect">
+            <a:avLst/>
+          </a:prstGeom>
+        </p:spPr>
+      </p:pic>
+      <p:pic>
+        <p:nvPicPr>
+          <p:cNvPr id="9" name="Picture 8" descr="A screenshot of a computer&#10;&#10;Description automatically generated">
+            <a:extLst>
+              <a:ext uri="{FF2B5EF4-FFF2-40B4-BE49-F238E27FC236}">
+                <a16:creationId xmlns:a16="http://schemas.microsoft.com/office/drawing/2014/main" id="{469590BE-9C6A-015D-F1BC-248F0393F51C}"/>
+              </a:ext>
+            </a:extLst>
+          </p:cNvPr>
+          <p:cNvPicPr>
+            <a:picLocks noChangeAspect="1"/>
+          </p:cNvPicPr>
+          <p:nvPr/>
+        </p:nvPicPr>
+        <p:blipFill>
+          <a:blip r:embed="rId3">
+            <a:extLst>
+              <a:ext uri="{28A0092B-C50C-407E-A947-70E740481C1C}">
+                <a14:useLocalDpi xmlns:a14="http://schemas.microsoft.com/office/drawing/2010/main" val="0"/>
+              </a:ext>
+            </a:extLst>
+          </a:blip>
+          <a:stretch>
+            <a:fillRect/>
+          </a:stretch>
+        </p:blipFill>
+        <p:spPr>
+          <a:xfrm>
+            <a:off x="435863" y="2041123"/>
+            <a:ext cx="5419904" cy="2995210"/>
+          </a:xfrm>
+          <a:prstGeom prst="rect">
+            <a:avLst/>
+          </a:prstGeom>
+        </p:spPr>
+      </p:pic>
+      <p:sp>
+        <p:nvSpPr>
+          <p:cNvPr id="10" name="TextBox 9">
+            <a:extLst>
+              <a:ext uri="{FF2B5EF4-FFF2-40B4-BE49-F238E27FC236}">
+                <a16:creationId xmlns:a16="http://schemas.microsoft.com/office/drawing/2014/main" id="{2D76A1BE-BE26-5FFB-3899-7287F9867EB6}"/>
+              </a:ext>
+            </a:extLst>
+          </p:cNvPr>
+          <p:cNvSpPr txBox="1"/>
+          <p:nvPr/>
+        </p:nvSpPr>
+        <p:spPr>
+          <a:xfrm>
+            <a:off x="2503932" y="4240125"/>
+            <a:ext cx="8622792" cy="1323439"/>
+          </a:xfrm>
+          <a:prstGeom prst="rect">
+            <a:avLst/>
+          </a:prstGeom>
+          <a:noFill/>
+        </p:spPr>
+        <p:txBody>
+          <a:bodyPr wrap="square" rtlCol="0">
+            <a:spAutoFit/>
+          </a:bodyPr>
+          <a:lstStyle/>
+          <a:p>
+            <a:r>
+              <a:rPr lang="en-GB" sz="2000" dirty="0"/>
+              <a:t>Lists are one of the 4 ways to store data. </a:t>
+            </a:r>
+          </a:p>
+          <a:p>
+            <a:r>
+              <a:rPr lang="en-GB" sz="2000" dirty="0"/>
+              <a:t>Lists are used to store multiple items in 1 variable.</a:t>
+            </a:r>
+          </a:p>
+          <a:p>
+            <a:r>
+              <a:rPr lang="en-GB" sz="2000" dirty="0"/>
+              <a:t>They are used as opposed to others as they are changeable and indexed.</a:t>
+            </a:r>
+          </a:p>
+          <a:p>
+            <a:r>
+              <a:rPr lang="en-GB" sz="2000" dirty="0"/>
+              <a:t>Lists use square brackets [ ] </a:t>
+            </a:r>
+          </a:p>
+        </p:txBody>
+      </p:sp>
+    </p:spTree>
+    <p:extLst>
+      <p:ext uri="{BB962C8B-B14F-4D97-AF65-F5344CB8AC3E}">
+        <p14:creationId xmlns:p14="http://schemas.microsoft.com/office/powerpoint/2010/main" val="292458422"/>
+      </p:ext>
+    </p:extLst>
+  </p:cSld>
+  <p:clrMapOvr>
+    <a:masterClrMapping/>
+  </p:clrMapOvr>
+</p:sld>
+</file>
+
+<file path=ppt/slides/slide11.xml><?xml version="1.0" encoding="utf-8"?>
+<p:sld xmlns:a="http://schemas.openxmlformats.org/drawingml/2006/main" xmlns:r="http://schemas.openxmlformats.org/officeDocument/2006/relationships" xmlns:p="http://schemas.openxmlformats.org/presentationml/2006/main">
+  <p:cSld>
+    <p:spTree>
+      <p:nvGrpSpPr>
+        <p:cNvPr id="1" name=""/>
+        <p:cNvGrpSpPr/>
+        <p:nvPr/>
+      </p:nvGrpSpPr>
+      <p:grpSpPr>
+        <a:xfrm>
+          <a:off x="0" y="0"/>
+          <a:ext cx="0" cy="0"/>
+          <a:chOff x="0" y="0"/>
+          <a:chExt cx="0" cy="0"/>
+        </a:xfrm>
+      </p:grpSpPr>
+      <p:sp>
+        <p:nvSpPr>
+          <p:cNvPr id="2" name="Title 1">
+            <a:extLst>
+              <a:ext uri="{FF2B5EF4-FFF2-40B4-BE49-F238E27FC236}">
+                <a16:creationId xmlns:a16="http://schemas.microsoft.com/office/drawing/2014/main" id="{AABEED34-0D67-EF02-A22D-B1B98282E92F}"/>
+              </a:ext>
+            </a:extLst>
+          </p:cNvPr>
+          <p:cNvSpPr>
+            <a:spLocks noGrp="1"/>
+          </p:cNvSpPr>
+          <p:nvPr>
+            <p:ph type="title"/>
+          </p:nvPr>
+        </p:nvSpPr>
+        <p:spPr>
+          <a:xfrm>
+            <a:off x="831850" y="219456"/>
+            <a:ext cx="10515600" cy="914019"/>
+          </a:xfrm>
+        </p:spPr>
+        <p:txBody>
+          <a:bodyPr>
+            <a:normAutofit/>
+          </a:bodyPr>
+          <a:lstStyle/>
+          <a:p>
+            <a:r>
+              <a:rPr lang="en-GB" sz="4300" dirty="0"/>
+              <a:t>Tuples</a:t>
+            </a:r>
+          </a:p>
+        </p:txBody>
+      </p:sp>
+    </p:spTree>
+    <p:extLst>
+      <p:ext uri="{BB962C8B-B14F-4D97-AF65-F5344CB8AC3E}">
+        <p14:creationId xmlns:p14="http://schemas.microsoft.com/office/powerpoint/2010/main" val="3358884233"/>
+      </p:ext>
+    </p:extLst>
+  </p:cSld>
+  <p:clrMapOvr>
+    <a:masterClrMapping/>
+  </p:clrMapOvr>
+</p:sld>
+</file>
+
+<file path=ppt/slides/slide12.xml><?xml version="1.0" encoding="utf-8"?>
+<p:sld xmlns:a="http://schemas.openxmlformats.org/drawingml/2006/main" xmlns:r="http://schemas.openxmlformats.org/officeDocument/2006/relationships" xmlns:p="http://schemas.openxmlformats.org/presentationml/2006/main">
+  <p:cSld>
+    <p:spTree>
+      <p:nvGrpSpPr>
+        <p:cNvPr id="1" name=""/>
+        <p:cNvGrpSpPr/>
+        <p:nvPr/>
+      </p:nvGrpSpPr>
+      <p:grpSpPr>
+        <a:xfrm>
+          <a:off x="0" y="0"/>
+          <a:ext cx="0" cy="0"/>
+          <a:chOff x="0" y="0"/>
+          <a:chExt cx="0" cy="0"/>
+        </a:xfrm>
+      </p:grpSpPr>
+      <p:sp>
+        <p:nvSpPr>
+          <p:cNvPr id="2" name="Title 1">
+            <a:extLst>
+              <a:ext uri="{FF2B5EF4-FFF2-40B4-BE49-F238E27FC236}">
+                <a16:creationId xmlns:a16="http://schemas.microsoft.com/office/drawing/2014/main" id="{13D60BB3-0713-D28C-F3A7-508B1F0B273C}"/>
+              </a:ext>
+            </a:extLst>
+          </p:cNvPr>
+          <p:cNvSpPr>
+            <a:spLocks noGrp="1"/>
+          </p:cNvSpPr>
+          <p:nvPr>
+            <p:ph type="title"/>
+          </p:nvPr>
+        </p:nvSpPr>
+        <p:spPr>
+          <a:xfrm>
+            <a:off x="831850" y="0"/>
+            <a:ext cx="10515600" cy="1215771"/>
+          </a:xfrm>
+        </p:spPr>
+        <p:txBody>
+          <a:bodyPr>
+            <a:normAutofit/>
+          </a:bodyPr>
+          <a:lstStyle/>
+          <a:p>
+            <a:r>
+              <a:rPr lang="en-GB" sz="4300" dirty="0"/>
+              <a:t>Set</a:t>
+            </a:r>
+          </a:p>
+        </p:txBody>
+      </p:sp>
+    </p:spTree>
+    <p:extLst>
+      <p:ext uri="{BB962C8B-B14F-4D97-AF65-F5344CB8AC3E}">
+        <p14:creationId xmlns:p14="http://schemas.microsoft.com/office/powerpoint/2010/main" val="2499244716"/>
+      </p:ext>
+    </p:extLst>
+  </p:cSld>
+  <p:clrMapOvr>
+    <a:masterClrMapping/>
+  </p:clrMapOvr>
+</p:sld>
+</file>
+
+<file path=ppt/slides/slide13.xml><?xml version="1.0" encoding="utf-8"?>
+<p:sld xmlns:a="http://schemas.openxmlformats.org/drawingml/2006/main" xmlns:r="http://schemas.openxmlformats.org/officeDocument/2006/relationships" xmlns:p="http://schemas.openxmlformats.org/presentationml/2006/main">
+  <p:cSld>
+    <p:spTree>
+      <p:nvGrpSpPr>
+        <p:cNvPr id="1" name=""/>
+        <p:cNvGrpSpPr/>
+        <p:nvPr/>
+      </p:nvGrpSpPr>
+      <p:grpSpPr>
+        <a:xfrm>
+          <a:off x="0" y="0"/>
+          <a:ext cx="0" cy="0"/>
+          <a:chOff x="0" y="0"/>
+          <a:chExt cx="0" cy="0"/>
+        </a:xfrm>
+      </p:grpSpPr>
+      <p:sp>
+        <p:nvSpPr>
+          <p:cNvPr id="2" name="Title 1">
+            <a:extLst>
+              <a:ext uri="{FF2B5EF4-FFF2-40B4-BE49-F238E27FC236}">
+                <a16:creationId xmlns:a16="http://schemas.microsoft.com/office/drawing/2014/main" id="{26E06AB0-37BC-95D4-F6CD-D462531CFF3D}"/>
+              </a:ext>
+            </a:extLst>
+          </p:cNvPr>
+          <p:cNvSpPr>
+            <a:spLocks noGrp="1"/>
+          </p:cNvSpPr>
+          <p:nvPr>
+            <p:ph type="title"/>
+          </p:nvPr>
+        </p:nvSpPr>
+        <p:spPr>
+          <a:xfrm>
+            <a:off x="831850" y="302196"/>
+            <a:ext cx="10515600" cy="932307"/>
+          </a:xfrm>
+        </p:spPr>
+        <p:txBody>
+          <a:bodyPr>
+            <a:normAutofit/>
+          </a:bodyPr>
+          <a:lstStyle/>
+          <a:p>
+            <a:r>
+              <a:rPr lang="en-GB" sz="4300" dirty="0"/>
+              <a:t>Dictionary</a:t>
+            </a:r>
+          </a:p>
+        </p:txBody>
+      </p:sp>
+    </p:spTree>
+    <p:extLst>
+      <p:ext uri="{BB962C8B-B14F-4D97-AF65-F5344CB8AC3E}">
+        <p14:creationId xmlns:p14="http://schemas.microsoft.com/office/powerpoint/2010/main" val="3942598934"/>
+      </p:ext>
+    </p:extLst>
+  </p:cSld>
+  <p:clrMapOvr>
+    <a:masterClrMapping/>
+  </p:clrMapOvr>
+</p:sld>
+</file>
+
 <file path=ppt/slides/slide2.xml><?xml version="1.0" encoding="utf-8"?>
 <p:sld xmlns:a="http://schemas.openxmlformats.org/drawingml/2006/main" xmlns:r="http://schemas.openxmlformats.org/officeDocument/2006/relationships" xmlns:p="http://schemas.openxmlformats.org/presentationml/2006/main">
   <p:cSld>
@@ -4865,8 +6232,8 @@
         </p:nvSpPr>
         <p:spPr>
           <a:xfrm>
-            <a:off x="704088" y="3725968"/>
-            <a:ext cx="5391912" cy="707886"/>
+            <a:off x="704088" y="3679588"/>
+            <a:ext cx="5391912" cy="1631216"/>
           </a:xfrm>
           <a:prstGeom prst="rect">
             <a:avLst/>
@@ -4881,13 +6248,54 @@
           <a:p>
             <a:r>
               <a:rPr lang="en-GB" sz="2000" dirty="0"/>
-              <a:t>While Loops are a way to create a repeating cycle, these continue </a:t>
-            </a:r>
-            <a:r>
-              <a:rPr lang="en-GB" sz="2000"/>
-              <a:t>endlessly </a:t>
-            </a:r>
-            <a:endParaRPr lang="en-GB" sz="2000" dirty="0"/>
+              <a:t>While Loops are a way to create a repeating cycle, these execute a block of code until a certain condition is met. They are favoured when you are uncertain with the length of repetition.</a:t>
+            </a:r>
+          </a:p>
+        </p:txBody>
+      </p:sp>
+      <p:sp>
+        <p:nvSpPr>
+          <p:cNvPr id="3" name="TextBox 2">
+            <a:extLst>
+              <a:ext uri="{FF2B5EF4-FFF2-40B4-BE49-F238E27FC236}">
+                <a16:creationId xmlns:a16="http://schemas.microsoft.com/office/drawing/2014/main" id="{27EF820F-7C10-3AA1-765A-06288BCD64B1}"/>
+              </a:ext>
+            </a:extLst>
+          </p:cNvPr>
+          <p:cNvSpPr txBox="1"/>
+          <p:nvPr/>
+        </p:nvSpPr>
+        <p:spPr>
+          <a:xfrm>
+            <a:off x="694944" y="5230620"/>
+            <a:ext cx="10360152" cy="984885"/>
+          </a:xfrm>
+          <a:prstGeom prst="rect">
+            <a:avLst/>
+          </a:prstGeom>
+          <a:noFill/>
+        </p:spPr>
+        <p:txBody>
+          <a:bodyPr wrap="square" rtlCol="0">
+            <a:spAutoFit/>
+          </a:bodyPr>
+          <a:lstStyle/>
+          <a:p>
+            <a:r>
+              <a:rPr lang="en-GB" sz="2000" dirty="0"/>
+              <a:t>In this example, it repeats until ‘</a:t>
+            </a:r>
+            <a:r>
+              <a:rPr lang="en-GB" sz="2000" dirty="0" err="1"/>
+              <a:t>i</a:t>
+            </a:r>
+            <a:r>
+              <a:rPr lang="en-GB" sz="2000" dirty="0"/>
+              <a:t>’ reaches 10 then stops. However, if done incorrectly it may endlessly repeat, and the program must be closed to end it.</a:t>
+            </a:r>
+          </a:p>
+          <a:p>
+            <a:endParaRPr lang="en-GB" dirty="0"/>
           </a:p>
         </p:txBody>
       </p:sp>
@@ -4895,6 +6303,1232 @@
     <p:extLst>
       <p:ext uri="{BB962C8B-B14F-4D97-AF65-F5344CB8AC3E}">
         <p14:creationId xmlns:p14="http://schemas.microsoft.com/office/powerpoint/2010/main" val="1213792337"/>
+      </p:ext>
+    </p:extLst>
+  </p:cSld>
+  <p:clrMapOvr>
+    <a:masterClrMapping/>
+  </p:clrMapOvr>
+</p:sld>
+</file>
+
+<file path=ppt/slides/slide6.xml><?xml version="1.0" encoding="utf-8"?>
+<p:sld xmlns:a="http://schemas.openxmlformats.org/drawingml/2006/main" xmlns:r="http://schemas.openxmlformats.org/officeDocument/2006/relationships" xmlns:p="http://schemas.openxmlformats.org/presentationml/2006/main">
+  <p:cSld>
+    <p:spTree>
+      <p:nvGrpSpPr>
+        <p:cNvPr id="1" name=""/>
+        <p:cNvGrpSpPr/>
+        <p:nvPr/>
+      </p:nvGrpSpPr>
+      <p:grpSpPr>
+        <a:xfrm>
+          <a:off x="0" y="0"/>
+          <a:ext cx="0" cy="0"/>
+          <a:chOff x="0" y="0"/>
+          <a:chExt cx="0" cy="0"/>
+        </a:xfrm>
+      </p:grpSpPr>
+      <p:sp>
+        <p:nvSpPr>
+          <p:cNvPr id="2" name="Title 1">
+            <a:extLst>
+              <a:ext uri="{FF2B5EF4-FFF2-40B4-BE49-F238E27FC236}">
+                <a16:creationId xmlns:a16="http://schemas.microsoft.com/office/drawing/2014/main" id="{7982377F-8B0F-EAD2-C547-3CC7200CC123}"/>
+              </a:ext>
+            </a:extLst>
+          </p:cNvPr>
+          <p:cNvSpPr>
+            <a:spLocks noGrp="1"/>
+          </p:cNvSpPr>
+          <p:nvPr>
+            <p:ph type="title"/>
+          </p:nvPr>
+        </p:nvSpPr>
+        <p:spPr>
+          <a:xfrm>
+            <a:off x="838200" y="361346"/>
+            <a:ext cx="10515600" cy="708501"/>
+          </a:xfrm>
+        </p:spPr>
+        <p:txBody>
+          <a:bodyPr>
+            <a:normAutofit/>
+          </a:bodyPr>
+          <a:lstStyle/>
+          <a:p>
+            <a:r>
+              <a:rPr lang="en-GB" sz="4300" dirty="0"/>
+              <a:t>For Loop</a:t>
+            </a:r>
+          </a:p>
+        </p:txBody>
+      </p:sp>
+      <p:pic>
+        <p:nvPicPr>
+          <p:cNvPr id="5" name="Picture 4" descr="A white background with black text&#10;&#10;Description automatically generated">
+            <a:extLst>
+              <a:ext uri="{FF2B5EF4-FFF2-40B4-BE49-F238E27FC236}">
+                <a16:creationId xmlns:a16="http://schemas.microsoft.com/office/drawing/2014/main" id="{70500770-C32C-54A0-AEDF-9FF03451BE5D}"/>
+              </a:ext>
+            </a:extLst>
+          </p:cNvPr>
+          <p:cNvPicPr>
+            <a:picLocks noChangeAspect="1"/>
+          </p:cNvPicPr>
+          <p:nvPr/>
+        </p:nvPicPr>
+        <p:blipFill>
+          <a:blip r:embed="rId2">
+            <a:extLst>
+              <a:ext uri="{28A0092B-C50C-407E-A947-70E740481C1C}">
+                <a14:useLocalDpi xmlns:a14="http://schemas.microsoft.com/office/drawing/2010/main" val="0"/>
+              </a:ext>
+            </a:extLst>
+          </a:blip>
+          <a:stretch>
+            <a:fillRect/>
+          </a:stretch>
+        </p:blipFill>
+        <p:spPr>
+          <a:xfrm>
+            <a:off x="838200" y="2239956"/>
+            <a:ext cx="5993491" cy="914724"/>
+          </a:xfrm>
+          <a:prstGeom prst="rect">
+            <a:avLst/>
+          </a:prstGeom>
+        </p:spPr>
+      </p:pic>
+      <p:pic>
+        <p:nvPicPr>
+          <p:cNvPr id="7" name="Picture 6" descr="A group of blue text&#10;&#10;Description automatically generated">
+            <a:extLst>
+              <a:ext uri="{FF2B5EF4-FFF2-40B4-BE49-F238E27FC236}">
+                <a16:creationId xmlns:a16="http://schemas.microsoft.com/office/drawing/2014/main" id="{BE1B8F2B-D3C4-398B-2303-851FE5DBF0D0}"/>
+              </a:ext>
+            </a:extLst>
+          </p:cNvPr>
+          <p:cNvPicPr>
+            <a:picLocks noChangeAspect="1"/>
+          </p:cNvPicPr>
+          <p:nvPr/>
+        </p:nvPicPr>
+        <p:blipFill>
+          <a:blip r:embed="rId3">
+            <a:extLst>
+              <a:ext uri="{28A0092B-C50C-407E-A947-70E740481C1C}">
+                <a14:useLocalDpi xmlns:a14="http://schemas.microsoft.com/office/drawing/2010/main" val="0"/>
+              </a:ext>
+            </a:extLst>
+          </a:blip>
+          <a:stretch>
+            <a:fillRect/>
+          </a:stretch>
+        </p:blipFill>
+        <p:spPr>
+          <a:xfrm>
+            <a:off x="7171743" y="2237293"/>
+            <a:ext cx="2058984" cy="1362780"/>
+          </a:xfrm>
+          <a:prstGeom prst="rect">
+            <a:avLst/>
+          </a:prstGeom>
+        </p:spPr>
+      </p:pic>
+      <p:sp>
+        <p:nvSpPr>
+          <p:cNvPr id="8" name="TextBox 7">
+            <a:extLst>
+              <a:ext uri="{FF2B5EF4-FFF2-40B4-BE49-F238E27FC236}">
+                <a16:creationId xmlns:a16="http://schemas.microsoft.com/office/drawing/2014/main" id="{11938871-3706-213A-6021-D6E8E08CE1D8}"/>
+              </a:ext>
+            </a:extLst>
+          </p:cNvPr>
+          <p:cNvSpPr txBox="1"/>
+          <p:nvPr/>
+        </p:nvSpPr>
+        <p:spPr>
+          <a:xfrm>
+            <a:off x="838200" y="1388719"/>
+            <a:ext cx="2847975" cy="523220"/>
+          </a:xfrm>
+          <a:prstGeom prst="rect">
+            <a:avLst/>
+          </a:prstGeom>
+          <a:noFill/>
+        </p:spPr>
+        <p:txBody>
+          <a:bodyPr wrap="square" rtlCol="0">
+            <a:spAutoFit/>
+          </a:bodyPr>
+          <a:lstStyle/>
+          <a:p>
+            <a:r>
+              <a:rPr lang="en-GB" sz="2800" dirty="0"/>
+              <a:t>Script</a:t>
+            </a:r>
+          </a:p>
+        </p:txBody>
+      </p:sp>
+      <p:sp>
+        <p:nvSpPr>
+          <p:cNvPr id="9" name="TextBox 8">
+            <a:extLst>
+              <a:ext uri="{FF2B5EF4-FFF2-40B4-BE49-F238E27FC236}">
+                <a16:creationId xmlns:a16="http://schemas.microsoft.com/office/drawing/2014/main" id="{DF8E4D54-412D-8414-B0A7-B21B65D8A8A8}"/>
+              </a:ext>
+            </a:extLst>
+          </p:cNvPr>
+          <p:cNvSpPr txBox="1"/>
+          <p:nvPr/>
+        </p:nvSpPr>
+        <p:spPr>
+          <a:xfrm>
+            <a:off x="7171743" y="1396694"/>
+            <a:ext cx="4245864" cy="523220"/>
+          </a:xfrm>
+          <a:prstGeom prst="rect">
+            <a:avLst/>
+          </a:prstGeom>
+          <a:noFill/>
+        </p:spPr>
+        <p:txBody>
+          <a:bodyPr wrap="square" rtlCol="0">
+            <a:spAutoFit/>
+          </a:bodyPr>
+          <a:lstStyle/>
+          <a:p>
+            <a:r>
+              <a:rPr lang="en-GB" sz="2800" dirty="0"/>
+              <a:t>Output</a:t>
+            </a:r>
+          </a:p>
+        </p:txBody>
+      </p:sp>
+      <p:sp>
+        <p:nvSpPr>
+          <p:cNvPr id="11" name="TextBox 10">
+            <a:extLst>
+              <a:ext uri="{FF2B5EF4-FFF2-40B4-BE49-F238E27FC236}">
+                <a16:creationId xmlns:a16="http://schemas.microsoft.com/office/drawing/2014/main" id="{12E25C13-2685-DF85-F4C4-9DB6AB27532B}"/>
+              </a:ext>
+            </a:extLst>
+          </p:cNvPr>
+          <p:cNvSpPr txBox="1"/>
+          <p:nvPr/>
+        </p:nvSpPr>
+        <p:spPr>
+          <a:xfrm>
+            <a:off x="838200" y="3917452"/>
+            <a:ext cx="10607040" cy="1631216"/>
+          </a:xfrm>
+          <a:prstGeom prst="rect">
+            <a:avLst/>
+          </a:prstGeom>
+          <a:noFill/>
+        </p:spPr>
+        <p:txBody>
+          <a:bodyPr wrap="square" rtlCol="0">
+            <a:spAutoFit/>
+          </a:bodyPr>
+          <a:lstStyle/>
+          <a:p>
+            <a:r>
+              <a:rPr lang="en-GB" sz="2000" dirty="0"/>
+              <a:t>For Loops are a 2</a:t>
+            </a:r>
+            <a:r>
+              <a:rPr lang="en-GB" sz="2000" baseline="30000" dirty="0"/>
+              <a:t>nd</a:t>
+            </a:r>
+            <a:r>
+              <a:rPr lang="en-GB" sz="2000" dirty="0"/>
+              <a:t> way to create a loop, this loop is used for iterating a sequence, for items in range (start, end);</a:t>
+            </a:r>
+          </a:p>
+          <a:p>
+            <a:r>
+              <a:rPr lang="en-GB" sz="2000" dirty="0"/>
+              <a:t>In this case a list (of names). </a:t>
+            </a:r>
+          </a:p>
+          <a:p>
+            <a:r>
+              <a:rPr lang="en-GB" sz="2000" dirty="0"/>
+              <a:t>This works by the variable (name), taking each item in the list (each name in ‘names’) and outputting it.</a:t>
+            </a:r>
+          </a:p>
+        </p:txBody>
+      </p:sp>
+    </p:spTree>
+    <p:extLst>
+      <p:ext uri="{BB962C8B-B14F-4D97-AF65-F5344CB8AC3E}">
+        <p14:creationId xmlns:p14="http://schemas.microsoft.com/office/powerpoint/2010/main" val="383451321"/>
+      </p:ext>
+    </p:extLst>
+  </p:cSld>
+  <p:clrMapOvr>
+    <a:masterClrMapping/>
+  </p:clrMapOvr>
+</p:sld>
+</file>
+
+<file path=ppt/slides/slide7.xml><?xml version="1.0" encoding="utf-8"?>
+<p:sld xmlns:a="http://schemas.openxmlformats.org/drawingml/2006/main" xmlns:r="http://schemas.openxmlformats.org/officeDocument/2006/relationships" xmlns:p="http://schemas.openxmlformats.org/presentationml/2006/main">
+  <p:cSld>
+    <p:spTree>
+      <p:nvGrpSpPr>
+        <p:cNvPr id="1" name=""/>
+        <p:cNvGrpSpPr/>
+        <p:nvPr/>
+      </p:nvGrpSpPr>
+      <p:grpSpPr>
+        <a:xfrm>
+          <a:off x="0" y="0"/>
+          <a:ext cx="0" cy="0"/>
+          <a:chOff x="0" y="0"/>
+          <a:chExt cx="0" cy="0"/>
+        </a:xfrm>
+      </p:grpSpPr>
+      <p:sp>
+        <p:nvSpPr>
+          <p:cNvPr id="2" name="Title 1">
+            <a:extLst>
+              <a:ext uri="{FF2B5EF4-FFF2-40B4-BE49-F238E27FC236}">
+                <a16:creationId xmlns:a16="http://schemas.microsoft.com/office/drawing/2014/main" id="{0CDE9FA7-5A5D-A677-2007-131AE1373046}"/>
+              </a:ext>
+            </a:extLst>
+          </p:cNvPr>
+          <p:cNvSpPr>
+            <a:spLocks noGrp="1"/>
+          </p:cNvSpPr>
+          <p:nvPr>
+            <p:ph type="title"/>
+          </p:nvPr>
+        </p:nvSpPr>
+        <p:spPr>
+          <a:xfrm>
+            <a:off x="838200" y="320039"/>
+            <a:ext cx="10515600" cy="809593"/>
+          </a:xfrm>
+        </p:spPr>
+        <p:txBody>
+          <a:bodyPr>
+            <a:normAutofit/>
+          </a:bodyPr>
+          <a:lstStyle/>
+          <a:p>
+            <a:r>
+              <a:rPr lang="en-GB" sz="4300" dirty="0"/>
+              <a:t>Functions (def)</a:t>
+            </a:r>
+          </a:p>
+        </p:txBody>
+      </p:sp>
+      <p:sp>
+        <p:nvSpPr>
+          <p:cNvPr id="5" name="TextBox 4">
+            <a:extLst>
+              <a:ext uri="{FF2B5EF4-FFF2-40B4-BE49-F238E27FC236}">
+                <a16:creationId xmlns:a16="http://schemas.microsoft.com/office/drawing/2014/main" id="{6910A766-7FF0-64B6-BEE3-3636586AC07C}"/>
+              </a:ext>
+            </a:extLst>
+          </p:cNvPr>
+          <p:cNvSpPr txBox="1"/>
+          <p:nvPr/>
+        </p:nvSpPr>
+        <p:spPr>
+          <a:xfrm>
+            <a:off x="838200" y="1094817"/>
+            <a:ext cx="4315968" cy="523220"/>
+          </a:xfrm>
+          <a:prstGeom prst="rect">
+            <a:avLst/>
+          </a:prstGeom>
+          <a:noFill/>
+        </p:spPr>
+        <p:txBody>
+          <a:bodyPr wrap="square" rtlCol="0">
+            <a:spAutoFit/>
+          </a:bodyPr>
+          <a:lstStyle/>
+          <a:p>
+            <a:r>
+              <a:rPr lang="en-GB" sz="2800" dirty="0"/>
+              <a:t>Scripts</a:t>
+            </a:r>
+          </a:p>
+        </p:txBody>
+      </p:sp>
+      <p:sp>
+        <p:nvSpPr>
+          <p:cNvPr id="6" name="TextBox 5">
+            <a:extLst>
+              <a:ext uri="{FF2B5EF4-FFF2-40B4-BE49-F238E27FC236}">
+                <a16:creationId xmlns:a16="http://schemas.microsoft.com/office/drawing/2014/main" id="{F632C60E-FCDF-E59F-6E7D-D0F83A7A4F6D}"/>
+              </a:ext>
+            </a:extLst>
+          </p:cNvPr>
+          <p:cNvSpPr txBox="1"/>
+          <p:nvPr/>
+        </p:nvSpPr>
+        <p:spPr>
+          <a:xfrm>
+            <a:off x="6096000" y="1094817"/>
+            <a:ext cx="4599432" cy="523220"/>
+          </a:xfrm>
+          <a:prstGeom prst="rect">
+            <a:avLst/>
+          </a:prstGeom>
+          <a:noFill/>
+        </p:spPr>
+        <p:txBody>
+          <a:bodyPr wrap="square" rtlCol="0">
+            <a:spAutoFit/>
+          </a:bodyPr>
+          <a:lstStyle/>
+          <a:p>
+            <a:r>
+              <a:rPr lang="en-GB" sz="2800" dirty="0"/>
+              <a:t>Outputs</a:t>
+            </a:r>
+          </a:p>
+        </p:txBody>
+      </p:sp>
+      <p:pic>
+        <p:nvPicPr>
+          <p:cNvPr id="8" name="Picture 7">
+            <a:extLst>
+              <a:ext uri="{FF2B5EF4-FFF2-40B4-BE49-F238E27FC236}">
+                <a16:creationId xmlns:a16="http://schemas.microsoft.com/office/drawing/2014/main" id="{398B05FD-5BFF-F64D-4DE3-76A23C1E600A}"/>
+              </a:ext>
+            </a:extLst>
+          </p:cNvPr>
+          <p:cNvPicPr>
+            <a:picLocks noChangeAspect="1"/>
+          </p:cNvPicPr>
+          <p:nvPr/>
+        </p:nvPicPr>
+        <p:blipFill>
+          <a:blip r:embed="rId3">
+            <a:extLst>
+              <a:ext uri="{28A0092B-C50C-407E-A947-70E740481C1C}">
+                <a14:useLocalDpi xmlns:a14="http://schemas.microsoft.com/office/drawing/2010/main" val="0"/>
+              </a:ext>
+            </a:extLst>
+          </a:blip>
+          <a:stretch>
+            <a:fillRect/>
+          </a:stretch>
+        </p:blipFill>
+        <p:spPr>
+          <a:xfrm>
+            <a:off x="6096000" y="1772886"/>
+            <a:ext cx="5257800" cy="392215"/>
+          </a:xfrm>
+          <a:prstGeom prst="rect">
+            <a:avLst/>
+          </a:prstGeom>
+        </p:spPr>
+      </p:pic>
+      <p:pic>
+        <p:nvPicPr>
+          <p:cNvPr id="10" name="Picture 9" descr="A white background with green text&#10;&#10;Description automatically generated">
+            <a:extLst>
+              <a:ext uri="{FF2B5EF4-FFF2-40B4-BE49-F238E27FC236}">
+                <a16:creationId xmlns:a16="http://schemas.microsoft.com/office/drawing/2014/main" id="{8FE755D1-84CB-EE48-FC50-C2E88256635D}"/>
+              </a:ext>
+            </a:extLst>
+          </p:cNvPr>
+          <p:cNvPicPr>
+            <a:picLocks noChangeAspect="1"/>
+          </p:cNvPicPr>
+          <p:nvPr/>
+        </p:nvPicPr>
+        <p:blipFill>
+          <a:blip r:embed="rId4">
+            <a:extLst>
+              <a:ext uri="{28A0092B-C50C-407E-A947-70E740481C1C}">
+                <a14:useLocalDpi xmlns:a14="http://schemas.microsoft.com/office/drawing/2010/main" val="0"/>
+              </a:ext>
+            </a:extLst>
+          </a:blip>
+          <a:stretch>
+            <a:fillRect/>
+          </a:stretch>
+        </p:blipFill>
+        <p:spPr>
+          <a:xfrm>
+            <a:off x="326508" y="1716440"/>
+            <a:ext cx="5194559" cy="676375"/>
+          </a:xfrm>
+          <a:prstGeom prst="rect">
+            <a:avLst/>
+          </a:prstGeom>
+        </p:spPr>
+      </p:pic>
+      <p:pic>
+        <p:nvPicPr>
+          <p:cNvPr id="12" name="Picture 11" descr="A screenshot of a computer program&#10;&#10;Description automatically generated">
+            <a:extLst>
+              <a:ext uri="{FF2B5EF4-FFF2-40B4-BE49-F238E27FC236}">
+                <a16:creationId xmlns:a16="http://schemas.microsoft.com/office/drawing/2014/main" id="{12ED40C8-B480-201D-D7B5-8FF9490A3087}"/>
+              </a:ext>
+            </a:extLst>
+          </p:cNvPr>
+          <p:cNvPicPr>
+            <a:picLocks noChangeAspect="1"/>
+          </p:cNvPicPr>
+          <p:nvPr/>
+        </p:nvPicPr>
+        <p:blipFill>
+          <a:blip r:embed="rId5">
+            <a:extLst>
+              <a:ext uri="{28A0092B-C50C-407E-A947-70E740481C1C}">
+                <a14:useLocalDpi xmlns:a14="http://schemas.microsoft.com/office/drawing/2010/main" val="0"/>
+              </a:ext>
+            </a:extLst>
+          </a:blip>
+          <a:stretch>
+            <a:fillRect/>
+          </a:stretch>
+        </p:blipFill>
+        <p:spPr>
+          <a:xfrm>
+            <a:off x="326508" y="2604124"/>
+            <a:ext cx="5276855" cy="3732775"/>
+          </a:xfrm>
+          <a:prstGeom prst="rect">
+            <a:avLst/>
+          </a:prstGeom>
+        </p:spPr>
+      </p:pic>
+      <p:pic>
+        <p:nvPicPr>
+          <p:cNvPr id="14" name="Picture 13" descr="A close-up of a white background&#10;&#10;Description automatically generated">
+            <a:extLst>
+              <a:ext uri="{FF2B5EF4-FFF2-40B4-BE49-F238E27FC236}">
+                <a16:creationId xmlns:a16="http://schemas.microsoft.com/office/drawing/2014/main" id="{6912C5A1-6F27-1F4F-2F78-B27249666EFB}"/>
+              </a:ext>
+            </a:extLst>
+          </p:cNvPr>
+          <p:cNvPicPr>
+            <a:picLocks noChangeAspect="1"/>
+          </p:cNvPicPr>
+          <p:nvPr/>
+        </p:nvPicPr>
+        <p:blipFill>
+          <a:blip r:embed="rId6">
+            <a:extLst>
+              <a:ext uri="{28A0092B-C50C-407E-A947-70E740481C1C}">
+                <a14:useLocalDpi xmlns:a14="http://schemas.microsoft.com/office/drawing/2010/main" val="0"/>
+              </a:ext>
+            </a:extLst>
+          </a:blip>
+          <a:stretch>
+            <a:fillRect/>
+          </a:stretch>
+        </p:blipFill>
+        <p:spPr>
+          <a:xfrm>
+            <a:off x="6031992" y="2319950"/>
+            <a:ext cx="4315427" cy="581106"/>
+          </a:xfrm>
+          <a:prstGeom prst="rect">
+            <a:avLst/>
+          </a:prstGeom>
+        </p:spPr>
+      </p:pic>
+      <p:sp>
+        <p:nvSpPr>
+          <p:cNvPr id="15" name="TextBox 14">
+            <a:extLst>
+              <a:ext uri="{FF2B5EF4-FFF2-40B4-BE49-F238E27FC236}">
+                <a16:creationId xmlns:a16="http://schemas.microsoft.com/office/drawing/2014/main" id="{B851D597-7DCD-BBB1-EAE9-FD9A6537EBEC}"/>
+              </a:ext>
+            </a:extLst>
+          </p:cNvPr>
+          <p:cNvSpPr txBox="1"/>
+          <p:nvPr/>
+        </p:nvSpPr>
+        <p:spPr>
+          <a:xfrm>
+            <a:off x="5798820" y="3055905"/>
+            <a:ext cx="5852160" cy="4093428"/>
+          </a:xfrm>
+          <a:prstGeom prst="rect">
+            <a:avLst/>
+          </a:prstGeom>
+          <a:noFill/>
+        </p:spPr>
+        <p:txBody>
+          <a:bodyPr wrap="square" rtlCol="0">
+            <a:spAutoFit/>
+          </a:bodyPr>
+          <a:lstStyle/>
+          <a:p>
+            <a:r>
+              <a:rPr lang="en-GB" sz="2000" dirty="0"/>
+              <a:t>Functions are a reuseable code block that perform a task. The first example shows this simply.</a:t>
+            </a:r>
+          </a:p>
+          <a:p>
+            <a:r>
+              <a:rPr lang="en-GB" sz="2000" dirty="0"/>
+              <a:t>The second example shows the further capabilities of the function element. </a:t>
+            </a:r>
+          </a:p>
+          <a:p>
+            <a:r>
+              <a:rPr lang="en-GB" sz="2000" dirty="0"/>
+              <a:t>There is an ‘if’ statement (selection) in here followed by __name__ == “__main”__:  checking if the script is not imported but directly in the script.</a:t>
+            </a:r>
+          </a:p>
+          <a:p>
+            <a:r>
+              <a:rPr lang="en-GB" sz="2000" dirty="0"/>
+              <a:t>While True: Is an endless loop which runs until directly stopped.</a:t>
+            </a:r>
+          </a:p>
+          <a:p>
+            <a:r>
+              <a:rPr lang="en-GB" sz="2000" dirty="0"/>
+              <a:t>Try: tries to run the command indented.</a:t>
+            </a:r>
+          </a:p>
+          <a:p>
+            <a:r>
+              <a:rPr lang="en-GB" sz="2000" dirty="0"/>
+              <a:t>If </a:t>
+            </a:r>
+            <a:r>
+              <a:rPr lang="en-GB" sz="2000" dirty="0" err="1"/>
+              <a:t>user_input.lower</a:t>
+            </a:r>
+            <a:r>
+              <a:rPr lang="en-GB" sz="2000" dirty="0"/>
+              <a:t> == “exit”: ends the process, breaking the ‘while’ ‘s infinite loop.</a:t>
+            </a:r>
+          </a:p>
+          <a:p>
+            <a:endParaRPr lang="en-GB" sz="2000" dirty="0"/>
+          </a:p>
+        </p:txBody>
+      </p:sp>
+    </p:spTree>
+    <p:extLst>
+      <p:ext uri="{BB962C8B-B14F-4D97-AF65-F5344CB8AC3E}">
+        <p14:creationId xmlns:p14="http://schemas.microsoft.com/office/powerpoint/2010/main" val="4033134947"/>
+      </p:ext>
+    </p:extLst>
+  </p:cSld>
+  <p:clrMapOvr>
+    <a:masterClrMapping/>
+  </p:clrMapOvr>
+</p:sld>
+</file>
+
+<file path=ppt/slides/slide8.xml><?xml version="1.0" encoding="utf-8"?>
+<p:sld xmlns:a="http://schemas.openxmlformats.org/drawingml/2006/main" xmlns:r="http://schemas.openxmlformats.org/officeDocument/2006/relationships" xmlns:p="http://schemas.openxmlformats.org/presentationml/2006/main">
+  <p:cSld>
+    <p:spTree>
+      <p:nvGrpSpPr>
+        <p:cNvPr id="1" name=""/>
+        <p:cNvGrpSpPr/>
+        <p:nvPr/>
+      </p:nvGrpSpPr>
+      <p:grpSpPr>
+        <a:xfrm>
+          <a:off x="0" y="0"/>
+          <a:ext cx="0" cy="0"/>
+          <a:chOff x="0" y="0"/>
+          <a:chExt cx="0" cy="0"/>
+        </a:xfrm>
+      </p:grpSpPr>
+      <p:sp>
+        <p:nvSpPr>
+          <p:cNvPr id="2" name="Title 1">
+            <a:extLst>
+              <a:ext uri="{FF2B5EF4-FFF2-40B4-BE49-F238E27FC236}">
+                <a16:creationId xmlns:a16="http://schemas.microsoft.com/office/drawing/2014/main" id="{CF8F7ACA-02FD-8D8D-9AC2-E325F87CD6C8}"/>
+              </a:ext>
+            </a:extLst>
+          </p:cNvPr>
+          <p:cNvSpPr>
+            <a:spLocks noGrp="1"/>
+          </p:cNvSpPr>
+          <p:nvPr>
+            <p:ph type="title"/>
+          </p:nvPr>
+        </p:nvSpPr>
+        <p:spPr>
+          <a:xfrm>
+            <a:off x="831850" y="328995"/>
+            <a:ext cx="10515600" cy="713421"/>
+          </a:xfrm>
+        </p:spPr>
+        <p:txBody>
+          <a:bodyPr>
+            <a:normAutofit/>
+          </a:bodyPr>
+          <a:lstStyle/>
+          <a:p>
+            <a:r>
+              <a:rPr lang="en-GB" sz="4300" dirty="0"/>
+              <a:t>Try-Except Block</a:t>
+            </a:r>
+          </a:p>
+        </p:txBody>
+      </p:sp>
+      <p:sp>
+        <p:nvSpPr>
+          <p:cNvPr id="4" name="TextBox 3">
+            <a:extLst>
+              <a:ext uri="{FF2B5EF4-FFF2-40B4-BE49-F238E27FC236}">
+                <a16:creationId xmlns:a16="http://schemas.microsoft.com/office/drawing/2014/main" id="{14A68D50-3B5C-E366-2ED2-E22DAE92EDCA}"/>
+              </a:ext>
+            </a:extLst>
+          </p:cNvPr>
+          <p:cNvSpPr txBox="1"/>
+          <p:nvPr/>
+        </p:nvSpPr>
+        <p:spPr>
+          <a:xfrm>
+            <a:off x="831850" y="1395466"/>
+            <a:ext cx="3182112" cy="523220"/>
+          </a:xfrm>
+          <a:prstGeom prst="rect">
+            <a:avLst/>
+          </a:prstGeom>
+          <a:noFill/>
+        </p:spPr>
+        <p:txBody>
+          <a:bodyPr wrap="square" rtlCol="0">
+            <a:spAutoFit/>
+          </a:bodyPr>
+          <a:lstStyle/>
+          <a:p>
+            <a:r>
+              <a:rPr lang="en-GB" sz="2800" dirty="0"/>
+              <a:t>Script</a:t>
+            </a:r>
+          </a:p>
+        </p:txBody>
+      </p:sp>
+      <p:sp>
+        <p:nvSpPr>
+          <p:cNvPr id="5" name="TextBox 4">
+            <a:extLst>
+              <a:ext uri="{FF2B5EF4-FFF2-40B4-BE49-F238E27FC236}">
+                <a16:creationId xmlns:a16="http://schemas.microsoft.com/office/drawing/2014/main" id="{38D7B4F7-B690-D604-02BE-3AD3223CE50F}"/>
+              </a:ext>
+            </a:extLst>
+          </p:cNvPr>
+          <p:cNvSpPr txBox="1"/>
+          <p:nvPr/>
+        </p:nvSpPr>
+        <p:spPr>
+          <a:xfrm>
+            <a:off x="6181344" y="1395466"/>
+            <a:ext cx="4956048" cy="523220"/>
+          </a:xfrm>
+          <a:prstGeom prst="rect">
+            <a:avLst/>
+          </a:prstGeom>
+          <a:noFill/>
+        </p:spPr>
+        <p:txBody>
+          <a:bodyPr wrap="square" rtlCol="0">
+            <a:spAutoFit/>
+          </a:bodyPr>
+          <a:lstStyle/>
+          <a:p>
+            <a:r>
+              <a:rPr lang="en-GB" sz="2800" dirty="0"/>
+              <a:t>Output</a:t>
+            </a:r>
+          </a:p>
+        </p:txBody>
+      </p:sp>
+      <p:pic>
+        <p:nvPicPr>
+          <p:cNvPr id="7" name="Picture 6" descr="A white background with black text&#10;&#10;Description automatically generated">
+            <a:extLst>
+              <a:ext uri="{FF2B5EF4-FFF2-40B4-BE49-F238E27FC236}">
+                <a16:creationId xmlns:a16="http://schemas.microsoft.com/office/drawing/2014/main" id="{9EE7BAC1-9FCB-3EDE-74E2-D069CA242834}"/>
+              </a:ext>
+            </a:extLst>
+          </p:cNvPr>
+          <p:cNvPicPr>
+            <a:picLocks noChangeAspect="1"/>
+          </p:cNvPicPr>
+          <p:nvPr/>
+        </p:nvPicPr>
+        <p:blipFill>
+          <a:blip r:embed="rId2">
+            <a:extLst>
+              <a:ext uri="{28A0092B-C50C-407E-A947-70E740481C1C}">
+                <a14:useLocalDpi xmlns:a14="http://schemas.microsoft.com/office/drawing/2010/main" val="0"/>
+              </a:ext>
+            </a:extLst>
+          </a:blip>
+          <a:stretch>
+            <a:fillRect/>
+          </a:stretch>
+        </p:blipFill>
+        <p:spPr>
+          <a:xfrm>
+            <a:off x="831850" y="2271736"/>
+            <a:ext cx="4686954" cy="1133633"/>
+          </a:xfrm>
+          <a:prstGeom prst="rect">
+            <a:avLst/>
+          </a:prstGeom>
+        </p:spPr>
+      </p:pic>
+      <p:pic>
+        <p:nvPicPr>
+          <p:cNvPr id="9" name="Picture 8">
+            <a:extLst>
+              <a:ext uri="{FF2B5EF4-FFF2-40B4-BE49-F238E27FC236}">
+                <a16:creationId xmlns:a16="http://schemas.microsoft.com/office/drawing/2014/main" id="{3BC4219B-287D-B11D-6CE3-64B447C46F99}"/>
+              </a:ext>
+            </a:extLst>
+          </p:cNvPr>
+          <p:cNvPicPr>
+            <a:picLocks noChangeAspect="1"/>
+          </p:cNvPicPr>
+          <p:nvPr/>
+        </p:nvPicPr>
+        <p:blipFill>
+          <a:blip r:embed="rId3">
+            <a:extLst>
+              <a:ext uri="{28A0092B-C50C-407E-A947-70E740481C1C}">
+                <a14:useLocalDpi xmlns:a14="http://schemas.microsoft.com/office/drawing/2010/main" val="0"/>
+              </a:ext>
+            </a:extLst>
+          </a:blip>
+          <a:stretch>
+            <a:fillRect/>
+          </a:stretch>
+        </p:blipFill>
+        <p:spPr>
+          <a:xfrm>
+            <a:off x="6089650" y="2271736"/>
+            <a:ext cx="2924583" cy="285790"/>
+          </a:xfrm>
+          <a:prstGeom prst="rect">
+            <a:avLst/>
+          </a:prstGeom>
+        </p:spPr>
+      </p:pic>
+      <p:sp>
+        <p:nvSpPr>
+          <p:cNvPr id="10" name="TextBox 9">
+            <a:extLst>
+              <a:ext uri="{FF2B5EF4-FFF2-40B4-BE49-F238E27FC236}">
+                <a16:creationId xmlns:a16="http://schemas.microsoft.com/office/drawing/2014/main" id="{A17A02CA-D3B9-8E43-9106-1C9EB358F152}"/>
+              </a:ext>
+            </a:extLst>
+          </p:cNvPr>
+          <p:cNvSpPr txBox="1"/>
+          <p:nvPr/>
+        </p:nvSpPr>
+        <p:spPr>
+          <a:xfrm>
+            <a:off x="831850" y="3786846"/>
+            <a:ext cx="9509760" cy="1938992"/>
+          </a:xfrm>
+          <a:prstGeom prst="rect">
+            <a:avLst/>
+          </a:prstGeom>
+          <a:noFill/>
+        </p:spPr>
+        <p:txBody>
+          <a:bodyPr wrap="square" rtlCol="0">
+            <a:spAutoFit/>
+          </a:bodyPr>
+          <a:lstStyle/>
+          <a:p>
+            <a:r>
+              <a:rPr lang="en-GB" sz="2000" dirty="0"/>
+              <a:t>As explained slightly in the prior slide. Try-Except block tries to execute a command and if it cannot execute as intended, the except block activates. The except block only functions if the try block doesn’t work. This example Tries, to prompt the user to input a number, If a number is input, then the except protocols aren’t required thus don’t execute. However if a word, or 0 is input, one of the two except blocks pickup and print a line to present the error more graciously and cleanly.</a:t>
+            </a:r>
+          </a:p>
+        </p:txBody>
+      </p:sp>
+      <p:pic>
+        <p:nvPicPr>
+          <p:cNvPr id="12" name="Picture 11" descr="A close up of a sign&#10;&#10;Description automatically generated">
+            <a:extLst>
+              <a:ext uri="{FF2B5EF4-FFF2-40B4-BE49-F238E27FC236}">
+                <a16:creationId xmlns:a16="http://schemas.microsoft.com/office/drawing/2014/main" id="{FAD6AD5A-23D1-C1CA-5EE6-30E5E8330BED}"/>
+              </a:ext>
+            </a:extLst>
+          </p:cNvPr>
+          <p:cNvPicPr>
+            <a:picLocks noChangeAspect="1"/>
+          </p:cNvPicPr>
+          <p:nvPr/>
+        </p:nvPicPr>
+        <p:blipFill>
+          <a:blip r:embed="rId4">
+            <a:extLst>
+              <a:ext uri="{28A0092B-C50C-407E-A947-70E740481C1C}">
+                <a14:useLocalDpi xmlns:a14="http://schemas.microsoft.com/office/drawing/2010/main" val="0"/>
+              </a:ext>
+            </a:extLst>
+          </a:blip>
+          <a:srcRect b="51613"/>
+          <a:stretch/>
+        </p:blipFill>
+        <p:spPr>
+          <a:xfrm>
+            <a:off x="6084886" y="3218795"/>
+            <a:ext cx="3038899" cy="285790"/>
+          </a:xfrm>
+          <a:prstGeom prst="rect">
+            <a:avLst/>
+          </a:prstGeom>
+        </p:spPr>
+      </p:pic>
+      <p:pic>
+        <p:nvPicPr>
+          <p:cNvPr id="14" name="Picture 13">
+            <a:extLst>
+              <a:ext uri="{FF2B5EF4-FFF2-40B4-BE49-F238E27FC236}">
+                <a16:creationId xmlns:a16="http://schemas.microsoft.com/office/drawing/2014/main" id="{B05A61EA-D090-731F-B829-D7D02CCF8564}"/>
+              </a:ext>
+            </a:extLst>
+          </p:cNvPr>
+          <p:cNvPicPr>
+            <a:picLocks noChangeAspect="1"/>
+          </p:cNvPicPr>
+          <p:nvPr/>
+        </p:nvPicPr>
+        <p:blipFill>
+          <a:blip r:embed="rId5">
+            <a:extLst>
+              <a:ext uri="{28A0092B-C50C-407E-A947-70E740481C1C}">
+                <a14:useLocalDpi xmlns:a14="http://schemas.microsoft.com/office/drawing/2010/main" val="0"/>
+              </a:ext>
+            </a:extLst>
+          </a:blip>
+          <a:stretch>
+            <a:fillRect/>
+          </a:stretch>
+        </p:blipFill>
+        <p:spPr>
+          <a:xfrm>
+            <a:off x="6084886" y="2748264"/>
+            <a:ext cx="2934109" cy="285790"/>
+          </a:xfrm>
+          <a:prstGeom prst="rect">
+            <a:avLst/>
+          </a:prstGeom>
+        </p:spPr>
+      </p:pic>
+    </p:spTree>
+    <p:extLst>
+      <p:ext uri="{BB962C8B-B14F-4D97-AF65-F5344CB8AC3E}">
+        <p14:creationId xmlns:p14="http://schemas.microsoft.com/office/powerpoint/2010/main" val="2631398559"/>
+      </p:ext>
+    </p:extLst>
+  </p:cSld>
+  <p:clrMapOvr>
+    <a:masterClrMapping/>
+  </p:clrMapOvr>
+</p:sld>
+</file>
+
+<file path=ppt/slides/slide9.xml><?xml version="1.0" encoding="utf-8"?>
+<p:sld xmlns:a="http://schemas.openxmlformats.org/drawingml/2006/main" xmlns:r="http://schemas.openxmlformats.org/officeDocument/2006/relationships" xmlns:p="http://schemas.openxmlformats.org/presentationml/2006/main">
+  <p:cSld>
+    <p:spTree>
+      <p:nvGrpSpPr>
+        <p:cNvPr id="1" name=""/>
+        <p:cNvGrpSpPr/>
+        <p:nvPr/>
+      </p:nvGrpSpPr>
+      <p:grpSpPr>
+        <a:xfrm>
+          <a:off x="0" y="0"/>
+          <a:ext cx="0" cy="0"/>
+          <a:chOff x="0" y="0"/>
+          <a:chExt cx="0" cy="0"/>
+        </a:xfrm>
+      </p:grpSpPr>
+      <p:sp>
+        <p:nvSpPr>
+          <p:cNvPr id="2" name="Title 1">
+            <a:extLst>
+              <a:ext uri="{FF2B5EF4-FFF2-40B4-BE49-F238E27FC236}">
+                <a16:creationId xmlns:a16="http://schemas.microsoft.com/office/drawing/2014/main" id="{8FA3C04B-2F25-1EC5-1232-293F705AE012}"/>
+              </a:ext>
+            </a:extLst>
+          </p:cNvPr>
+          <p:cNvSpPr>
+            <a:spLocks noGrp="1"/>
+          </p:cNvSpPr>
+          <p:nvPr>
+            <p:ph type="title"/>
+          </p:nvPr>
+        </p:nvSpPr>
+        <p:spPr>
+          <a:xfrm>
+            <a:off x="838200" y="233331"/>
+            <a:ext cx="10515600" cy="795717"/>
+          </a:xfrm>
+        </p:spPr>
+        <p:txBody>
+          <a:bodyPr>
+            <a:normAutofit/>
+          </a:bodyPr>
+          <a:lstStyle/>
+          <a:p>
+            <a:r>
+              <a:rPr lang="en-GB" sz="4300" dirty="0"/>
+              <a:t>Classes</a:t>
+            </a:r>
+          </a:p>
+        </p:txBody>
+      </p:sp>
+      <p:sp>
+        <p:nvSpPr>
+          <p:cNvPr id="4" name="TextBox 3">
+            <a:extLst>
+              <a:ext uri="{FF2B5EF4-FFF2-40B4-BE49-F238E27FC236}">
+                <a16:creationId xmlns:a16="http://schemas.microsoft.com/office/drawing/2014/main" id="{B48FD785-217E-8574-4CF3-8B32FF1F49EF}"/>
+              </a:ext>
+            </a:extLst>
+          </p:cNvPr>
+          <p:cNvSpPr txBox="1"/>
+          <p:nvPr/>
+        </p:nvSpPr>
+        <p:spPr>
+          <a:xfrm>
+            <a:off x="838200" y="1261872"/>
+            <a:ext cx="3374136" cy="523220"/>
+          </a:xfrm>
+          <a:prstGeom prst="rect">
+            <a:avLst/>
+          </a:prstGeom>
+          <a:noFill/>
+        </p:spPr>
+        <p:txBody>
+          <a:bodyPr wrap="square" rtlCol="0">
+            <a:spAutoFit/>
+          </a:bodyPr>
+          <a:lstStyle/>
+          <a:p>
+            <a:r>
+              <a:rPr lang="en-GB" sz="2800" dirty="0"/>
+              <a:t>Script</a:t>
+            </a:r>
+          </a:p>
+        </p:txBody>
+      </p:sp>
+      <p:sp>
+        <p:nvSpPr>
+          <p:cNvPr id="5" name="TextBox 4">
+            <a:extLst>
+              <a:ext uri="{FF2B5EF4-FFF2-40B4-BE49-F238E27FC236}">
+                <a16:creationId xmlns:a16="http://schemas.microsoft.com/office/drawing/2014/main" id="{75AF856C-1BE0-FC33-AB24-12C12828BC0C}"/>
+              </a:ext>
+            </a:extLst>
+          </p:cNvPr>
+          <p:cNvSpPr txBox="1"/>
+          <p:nvPr/>
+        </p:nvSpPr>
+        <p:spPr>
+          <a:xfrm>
+            <a:off x="6096000" y="1261872"/>
+            <a:ext cx="3203448" cy="523220"/>
+          </a:xfrm>
+          <a:prstGeom prst="rect">
+            <a:avLst/>
+          </a:prstGeom>
+          <a:noFill/>
+        </p:spPr>
+        <p:txBody>
+          <a:bodyPr wrap="square" rtlCol="0">
+            <a:spAutoFit/>
+          </a:bodyPr>
+          <a:lstStyle/>
+          <a:p>
+            <a:r>
+              <a:rPr lang="en-GB" sz="2800" dirty="0"/>
+              <a:t>Output</a:t>
+            </a:r>
+          </a:p>
+        </p:txBody>
+      </p:sp>
+      <p:pic>
+        <p:nvPicPr>
+          <p:cNvPr id="7" name="Picture 6" descr="A computer screen shot of a computer code&#10;&#10;Description automatically generated">
+            <a:extLst>
+              <a:ext uri="{FF2B5EF4-FFF2-40B4-BE49-F238E27FC236}">
+                <a16:creationId xmlns:a16="http://schemas.microsoft.com/office/drawing/2014/main" id="{48DC38B2-4CB5-53AB-14DB-754ACD164C3F}"/>
+              </a:ext>
+            </a:extLst>
+          </p:cNvPr>
+          <p:cNvPicPr>
+            <a:picLocks noChangeAspect="1"/>
+          </p:cNvPicPr>
+          <p:nvPr/>
+        </p:nvPicPr>
+        <p:blipFill>
+          <a:blip r:embed="rId2">
+            <a:extLst>
+              <a:ext uri="{28A0092B-C50C-407E-A947-70E740481C1C}">
+                <a14:useLocalDpi xmlns:a14="http://schemas.microsoft.com/office/drawing/2010/main" val="0"/>
+              </a:ext>
+            </a:extLst>
+          </a:blip>
+          <a:stretch>
+            <a:fillRect/>
+          </a:stretch>
+        </p:blipFill>
+        <p:spPr>
+          <a:xfrm>
+            <a:off x="706726" y="2017915"/>
+            <a:ext cx="5767226" cy="1864927"/>
+          </a:xfrm>
+          <a:prstGeom prst="rect">
+            <a:avLst/>
+          </a:prstGeom>
+        </p:spPr>
+      </p:pic>
+      <p:pic>
+        <p:nvPicPr>
+          <p:cNvPr id="9" name="Picture 8">
+            <a:extLst>
+              <a:ext uri="{FF2B5EF4-FFF2-40B4-BE49-F238E27FC236}">
+                <a16:creationId xmlns:a16="http://schemas.microsoft.com/office/drawing/2014/main" id="{053B210B-F634-A326-958E-50DF6DF6EEA4}"/>
+              </a:ext>
+            </a:extLst>
+          </p:cNvPr>
+          <p:cNvPicPr>
+            <a:picLocks noChangeAspect="1"/>
+          </p:cNvPicPr>
+          <p:nvPr/>
+        </p:nvPicPr>
+        <p:blipFill>
+          <a:blip r:embed="rId3">
+            <a:extLst>
+              <a:ext uri="{28A0092B-C50C-407E-A947-70E740481C1C}">
+                <a14:useLocalDpi xmlns:a14="http://schemas.microsoft.com/office/drawing/2010/main" val="0"/>
+              </a:ext>
+            </a:extLst>
+          </a:blip>
+          <a:stretch>
+            <a:fillRect/>
+          </a:stretch>
+        </p:blipFill>
+        <p:spPr>
+          <a:xfrm>
+            <a:off x="5550211" y="2017916"/>
+            <a:ext cx="5553850" cy="285790"/>
+          </a:xfrm>
+          <a:prstGeom prst="rect">
+            <a:avLst/>
+          </a:prstGeom>
+        </p:spPr>
+      </p:pic>
+      <p:sp>
+        <p:nvSpPr>
+          <p:cNvPr id="12" name="TextBox 11">
+            <a:extLst>
+              <a:ext uri="{FF2B5EF4-FFF2-40B4-BE49-F238E27FC236}">
+                <a16:creationId xmlns:a16="http://schemas.microsoft.com/office/drawing/2014/main" id="{BF053147-C543-EA24-A5E7-4BD9D66C1BF9}"/>
+              </a:ext>
+            </a:extLst>
+          </p:cNvPr>
+          <p:cNvSpPr txBox="1"/>
+          <p:nvPr/>
+        </p:nvSpPr>
+        <p:spPr>
+          <a:xfrm>
+            <a:off x="838200" y="4297680"/>
+            <a:ext cx="10515600" cy="1631216"/>
+          </a:xfrm>
+          <a:prstGeom prst="rect">
+            <a:avLst/>
+          </a:prstGeom>
+          <a:noFill/>
+        </p:spPr>
+        <p:txBody>
+          <a:bodyPr wrap="square" rtlCol="0">
+            <a:spAutoFit/>
+          </a:bodyPr>
+          <a:lstStyle/>
+          <a:p>
+            <a:r>
+              <a:rPr lang="en-GB" sz="2000" dirty="0"/>
+              <a:t>-  Classes are a schematic for creating grouping objects.</a:t>
+            </a:r>
+          </a:p>
+          <a:p>
+            <a:r>
+              <a:rPr lang="en-GB" sz="2000" dirty="0"/>
+              <a:t>- __</a:t>
+            </a:r>
+            <a:r>
+              <a:rPr lang="en-GB" sz="2000" dirty="0" err="1"/>
+              <a:t>init</a:t>
+            </a:r>
+            <a:r>
+              <a:rPr lang="en-GB" sz="2000" dirty="0"/>
+              <a:t>__ is a constructor that </a:t>
+            </a:r>
+            <a:r>
+              <a:rPr lang="en-GB" sz="2000" dirty="0" err="1"/>
+              <a:t>intialises</a:t>
+            </a:r>
+            <a:r>
+              <a:rPr lang="en-GB" sz="2000" dirty="0"/>
+              <a:t> the attributes of the object.</a:t>
+            </a:r>
+          </a:p>
+          <a:p>
+            <a:r>
+              <a:rPr lang="en-GB" sz="2000" dirty="0"/>
+              <a:t>- Objects are the things created from the blueprint of the class, </a:t>
+            </a:r>
+            <a:r>
+              <a:rPr lang="en-GB" sz="2000" dirty="0" err="1"/>
+              <a:t>eg</a:t>
+            </a:r>
+            <a:r>
+              <a:rPr lang="en-GB" sz="2000" dirty="0"/>
+              <a:t> Robo3 is a Robot. Robo3 is the object of the Robot Class</a:t>
+            </a:r>
+          </a:p>
+          <a:p>
+            <a:pPr marL="342900" indent="-342900">
+              <a:buFontTx/>
+              <a:buChar char="-"/>
+            </a:pPr>
+            <a:r>
+              <a:rPr lang="en-GB" sz="2000" dirty="0"/>
+              <a:t>Attributes are things the object has </a:t>
+            </a:r>
+            <a:r>
+              <a:rPr lang="en-GB" sz="2000" dirty="0" err="1"/>
+              <a:t>eg</a:t>
+            </a:r>
+            <a:r>
+              <a:rPr lang="en-GB" sz="2000" dirty="0"/>
+              <a:t>:-  (self, name, colour, etc)</a:t>
+            </a:r>
+          </a:p>
+        </p:txBody>
+      </p:sp>
+    </p:spTree>
+    <p:extLst>
+      <p:ext uri="{BB962C8B-B14F-4D97-AF65-F5344CB8AC3E}">
+        <p14:creationId xmlns:p14="http://schemas.microsoft.com/office/powerpoint/2010/main" val="3857672638"/>
       </p:ext>
     </p:extLst>
   </p:cSld>
@@ -5217,4 +7851,319 @@
     </a:ext>
   </a:extLst>
 </a:theme>
+</file>
+
+<file path=ppt/theme/theme2.xml><?xml version="1.0" encoding="utf-8"?>
+<a:theme xmlns:a="http://schemas.openxmlformats.org/drawingml/2006/main" name="Office Theme">
+  <a:themeElements>
+    <a:clrScheme name="Office">
+      <a:dk1>
+        <a:sysClr val="windowText" lastClr="000000"/>
+      </a:dk1>
+      <a:lt1>
+        <a:sysClr val="window" lastClr="FFFFFF"/>
+      </a:lt1>
+      <a:dk2>
+        <a:srgbClr val="0E2841"/>
+      </a:dk2>
+      <a:lt2>
+        <a:srgbClr val="E8E8E8"/>
+      </a:lt2>
+      <a:accent1>
+        <a:srgbClr val="156082"/>
+      </a:accent1>
+      <a:accent2>
+        <a:srgbClr val="E97132"/>
+      </a:accent2>
+      <a:accent3>
+        <a:srgbClr val="196B24"/>
+      </a:accent3>
+      <a:accent4>
+        <a:srgbClr val="0F9ED5"/>
+      </a:accent4>
+      <a:accent5>
+        <a:srgbClr val="A02B93"/>
+      </a:accent5>
+      <a:accent6>
+        <a:srgbClr val="4EA72E"/>
+      </a:accent6>
+      <a:hlink>
+        <a:srgbClr val="467886"/>
+      </a:hlink>
+      <a:folHlink>
+        <a:srgbClr val="96607D"/>
+      </a:folHlink>
+    </a:clrScheme>
+    <a:fontScheme name="Office">
+      <a:majorFont>
+        <a:latin typeface="Aptos Display" panose="02110004020202020204"/>
+        <a:ea typeface=""/>
+        <a:cs typeface=""/>
+        <a:font script="Jpan" typeface="游ゴシック Light"/>
+        <a:font script="Hang" typeface="맑은 고딕"/>
+        <a:font script="Hans" typeface="等线 Light"/>
+        <a:font script="Hant" typeface="新細明體"/>
+        <a:font script="Arab" typeface="Times New Roman"/>
+        <a:font script="Hebr" typeface="Times New Roman"/>
+        <a:font script="Thai" typeface="Angsana New"/>
+        <a:font script="Ethi" typeface="Nyala"/>
+        <a:font script="Beng" typeface="Vrinda"/>
+        <a:font script="Gujr" typeface="Shruti"/>
+        <a:font script="Khmr" typeface="MoolBoran"/>
+        <a:font script="Knda" typeface="Tunga"/>
+        <a:font script="Guru" typeface="Raavi"/>
+        <a:font script="Cans" typeface="Euphemia"/>
+        <a:font script="Cher" typeface="Plantagenet Cherokee"/>
+        <a:font script="Yiii" typeface="Microsoft Yi Baiti"/>
+        <a:font script="Tibt" typeface="Microsoft Himalaya"/>
+        <a:font script="Thaa" typeface="MV Boli"/>
+        <a:font script="Deva" typeface="Mangal"/>
+        <a:font script="Telu" typeface="Gautami"/>
+        <a:font script="Taml" typeface="Latha"/>
+        <a:font script="Syrc" typeface="Estrangelo Edessa"/>
+        <a:font script="Orya" typeface="Kalinga"/>
+        <a:font script="Mlym" typeface="Kartika"/>
+        <a:font script="Laoo" typeface="DokChampa"/>
+        <a:font script="Sinh" typeface="Iskoola Pota"/>
+        <a:font script="Mong" typeface="Mongolian Baiti"/>
+        <a:font script="Viet" typeface="Times New Roman"/>
+        <a:font script="Uigh" typeface="Microsoft Uighur"/>
+        <a:font script="Geor" typeface="Sylfaen"/>
+        <a:font script="Armn" typeface="Arial"/>
+        <a:font script="Bugi" typeface="Leelawadee UI"/>
+        <a:font script="Bopo" typeface="Microsoft JhengHei"/>
+        <a:font script="Java" typeface="Javanese Text"/>
+        <a:font script="Lisu" typeface="Segoe UI"/>
+        <a:font script="Mymr" typeface="Myanmar Text"/>
+        <a:font script="Nkoo" typeface="Ebrima"/>
+        <a:font script="Olck" typeface="Nirmala UI"/>
+        <a:font script="Osma" typeface="Ebrima"/>
+        <a:font script="Phag" typeface="Phagspa"/>
+        <a:font script="Syrn" typeface="Estrangelo Edessa"/>
+        <a:font script="Syrj" typeface="Estrangelo Edessa"/>
+        <a:font script="Syre" typeface="Estrangelo Edessa"/>
+        <a:font script="Sora" typeface="Nirmala UI"/>
+        <a:font script="Tale" typeface="Microsoft Tai Le"/>
+        <a:font script="Talu" typeface="Microsoft New Tai Lue"/>
+        <a:font script="Tfng" typeface="Ebrima"/>
+      </a:majorFont>
+      <a:minorFont>
+        <a:latin typeface="Aptos" panose="02110004020202020204"/>
+        <a:ea typeface=""/>
+        <a:cs typeface=""/>
+        <a:font script="Jpan" typeface="游ゴシック"/>
+        <a:font script="Hang" typeface="맑은 고딕"/>
+        <a:font script="Hans" typeface="等线"/>
+        <a:font script="Hant" typeface="新細明體"/>
+        <a:font script="Arab" typeface="Arial"/>
+        <a:font script="Hebr" typeface="Arial"/>
+        <a:font script="Thai" typeface="Cordia New"/>
+        <a:font script="Ethi" typeface="Nyala"/>
+        <a:font script="Beng" typeface="Vrinda"/>
+        <a:font script="Gujr" typeface="Shruti"/>
+        <a:font script="Khmr" typeface="DaunPenh"/>
+        <a:font script="Knda" typeface="Tunga"/>
+        <a:font script="Guru" typeface="Raavi"/>
+        <a:font script="Cans" typeface="Euphemia"/>
+        <a:font script="Cher" typeface="Plantagenet Cherokee"/>
+        <a:font script="Yiii" typeface="Microsoft Yi Baiti"/>
+        <a:font script="Tibt" typeface="Microsoft Himalaya"/>
+        <a:font script="Thaa" typeface="MV Boli"/>
+        <a:font script="Deva" typeface="Mangal"/>
+        <a:font script="Telu" typeface="Gautami"/>
+        <a:font script="Taml" typeface="Latha"/>
+        <a:font script="Syrc" typeface="Estrangelo Edessa"/>
+        <a:font script="Orya" typeface="Kalinga"/>
+        <a:font script="Mlym" typeface="Kartika"/>
+        <a:font script="Laoo" typeface="DokChampa"/>
+        <a:font script="Sinh" typeface="Iskoola Pota"/>
+        <a:font script="Mong" typeface="Mongolian Baiti"/>
+        <a:font script="Viet" typeface="Arial"/>
+        <a:font script="Uigh" typeface="Microsoft Uighur"/>
+        <a:font script="Geor" typeface="Sylfaen"/>
+        <a:font script="Armn" typeface="Arial"/>
+        <a:font script="Bugi" typeface="Leelawadee UI"/>
+        <a:font script="Bopo" typeface="Microsoft JhengHei"/>
+        <a:font script="Java" typeface="Javanese Text"/>
+        <a:font script="Lisu" typeface="Segoe UI"/>
+        <a:font script="Mymr" typeface="Myanmar Text"/>
+        <a:font script="Nkoo" typeface="Ebrima"/>
+        <a:font script="Olck" typeface="Nirmala UI"/>
+        <a:font script="Osma" typeface="Ebrima"/>
+        <a:font script="Phag" typeface="Phagspa"/>
+        <a:font script="Syrn" typeface="Estrangelo Edessa"/>
+        <a:font script="Syrj" typeface="Estrangelo Edessa"/>
+        <a:font script="Syre" typeface="Estrangelo Edessa"/>
+        <a:font script="Sora" typeface="Nirmala UI"/>
+        <a:font script="Tale" typeface="Microsoft Tai Le"/>
+        <a:font script="Talu" typeface="Microsoft New Tai Lue"/>
+        <a:font script="Tfng" typeface="Ebrima"/>
+      </a:minorFont>
+    </a:fontScheme>
+    <a:fmtScheme name="Office">
+      <a:fillStyleLst>
+        <a:solidFill>
+          <a:schemeClr val="phClr"/>
+        </a:solidFill>
+        <a:gradFill rotWithShape="1">
+          <a:gsLst>
+            <a:gs pos="0">
+              <a:schemeClr val="phClr">
+                <a:lumMod val="110000"/>
+                <a:satMod val="105000"/>
+                <a:tint val="67000"/>
+              </a:schemeClr>
+            </a:gs>
+            <a:gs pos="50000">
+              <a:schemeClr val="phClr">
+                <a:lumMod val="105000"/>
+                <a:satMod val="103000"/>
+                <a:tint val="73000"/>
+              </a:schemeClr>
+            </a:gs>
+            <a:gs pos="100000">
+              <a:schemeClr val="phClr">
+                <a:lumMod val="105000"/>
+                <a:satMod val="109000"/>
+                <a:tint val="81000"/>
+              </a:schemeClr>
+            </a:gs>
+          </a:gsLst>
+          <a:lin ang="5400000" scaled="0"/>
+        </a:gradFill>
+        <a:gradFill rotWithShape="1">
+          <a:gsLst>
+            <a:gs pos="0">
+              <a:schemeClr val="phClr">
+                <a:satMod val="103000"/>
+                <a:lumMod val="102000"/>
+                <a:tint val="94000"/>
+              </a:schemeClr>
+            </a:gs>
+            <a:gs pos="50000">
+              <a:schemeClr val="phClr">
+                <a:satMod val="110000"/>
+                <a:lumMod val="100000"/>
+                <a:shade val="100000"/>
+              </a:schemeClr>
+            </a:gs>
+            <a:gs pos="100000">
+              <a:schemeClr val="phClr">
+                <a:lumMod val="99000"/>
+                <a:satMod val="120000"/>
+                <a:shade val="78000"/>
+              </a:schemeClr>
+            </a:gs>
+          </a:gsLst>
+          <a:lin ang="5400000" scaled="0"/>
+        </a:gradFill>
+      </a:fillStyleLst>
+      <a:lnStyleLst>
+        <a:ln w="12700" cap="flat" cmpd="sng" algn="ctr">
+          <a:solidFill>
+            <a:schemeClr val="phClr"/>
+          </a:solidFill>
+          <a:prstDash val="solid"/>
+          <a:miter lim="800000"/>
+        </a:ln>
+        <a:ln w="19050" cap="flat" cmpd="sng" algn="ctr">
+          <a:solidFill>
+            <a:schemeClr val="phClr"/>
+          </a:solidFill>
+          <a:prstDash val="solid"/>
+          <a:miter lim="800000"/>
+        </a:ln>
+        <a:ln w="25400" cap="flat" cmpd="sng" algn="ctr">
+          <a:solidFill>
+            <a:schemeClr val="phClr"/>
+          </a:solidFill>
+          <a:prstDash val="solid"/>
+          <a:miter lim="800000"/>
+        </a:ln>
+      </a:lnStyleLst>
+      <a:effectStyleLst>
+        <a:effectStyle>
+          <a:effectLst/>
+        </a:effectStyle>
+        <a:effectStyle>
+          <a:effectLst/>
+        </a:effectStyle>
+        <a:effectStyle>
+          <a:effectLst>
+            <a:outerShdw blurRad="57150" dist="19050" dir="5400000" algn="ctr" rotWithShape="0">
+              <a:srgbClr val="000000">
+                <a:alpha val="63000"/>
+              </a:srgbClr>
+            </a:outerShdw>
+          </a:effectLst>
+        </a:effectStyle>
+      </a:effectStyleLst>
+      <a:bgFillStyleLst>
+        <a:solidFill>
+          <a:schemeClr val="phClr"/>
+        </a:solidFill>
+        <a:solidFill>
+          <a:schemeClr val="phClr">
+            <a:tint val="95000"/>
+            <a:satMod val="170000"/>
+          </a:schemeClr>
+        </a:solidFill>
+        <a:gradFill rotWithShape="1">
+          <a:gsLst>
+            <a:gs pos="0">
+              <a:schemeClr val="phClr">
+                <a:tint val="93000"/>
+                <a:satMod val="150000"/>
+                <a:shade val="98000"/>
+                <a:lumMod val="102000"/>
+              </a:schemeClr>
+            </a:gs>
+            <a:gs pos="50000">
+              <a:schemeClr val="phClr">
+                <a:tint val="98000"/>
+                <a:satMod val="130000"/>
+                <a:shade val="90000"/>
+                <a:lumMod val="103000"/>
+              </a:schemeClr>
+            </a:gs>
+            <a:gs pos="100000">
+              <a:schemeClr val="phClr">
+                <a:shade val="63000"/>
+                <a:satMod val="120000"/>
+              </a:schemeClr>
+            </a:gs>
+          </a:gsLst>
+          <a:lin ang="5400000" scaled="0"/>
+        </a:gradFill>
+      </a:bgFillStyleLst>
+    </a:fmtScheme>
+  </a:themeElements>
+  <a:objectDefaults>
+    <a:lnDef>
+      <a:spPr/>
+      <a:bodyPr/>
+      <a:lstStyle/>
+      <a:style>
+        <a:lnRef idx="2">
+          <a:schemeClr val="accent1"/>
+        </a:lnRef>
+        <a:fillRef idx="0">
+          <a:schemeClr val="accent1"/>
+        </a:fillRef>
+        <a:effectRef idx="1">
+          <a:schemeClr val="accent1"/>
+        </a:effectRef>
+        <a:fontRef idx="minor">
+          <a:schemeClr val="tx1"/>
+        </a:fontRef>
+      </a:style>
+    </a:lnDef>
+  </a:objectDefaults>
+  <a:extraClrSchemeLst/>
+  <a:extLst>
+    <a:ext uri="{05A4C25C-085E-4340-85A3-A5531E510DB2}">
+      <thm15:themeFamily xmlns:thm15="http://schemas.microsoft.com/office/thememl/2012/main" name="Office Theme" id="{2E142A2C-CD16-42D6-873A-C26D2A0506FA}" vid="{1BDDFF52-6CD6-40A5-AB3C-68EB2F1E4D0A}"/>
+    </a:ext>
+  </a:extLst>
+</a:theme>
 </file>
</xml_diff>

<commit_message>
Addition of list tests in W2, completion of PP
</commit_message>
<xml_diff>
--- a/403_Programming/assignments/403IT_Understanding_PP.pptx
+++ b/403_Programming/assignments/403IT_Understanding_PP.pptx
@@ -17,9 +17,9 @@
     <p:sldId id="262" r:id="rId8"/>
     <p:sldId id="263" r:id="rId9"/>
     <p:sldId id="265" r:id="rId10"/>
-    <p:sldId id="264" r:id="rId11"/>
+    <p:sldId id="267" r:id="rId11"/>
     <p:sldId id="266" r:id="rId12"/>
-    <p:sldId id="267" r:id="rId13"/>
+    <p:sldId id="264" r:id="rId13"/>
     <p:sldId id="268" r:id="rId14"/>
   </p:sldIdLst>
   <p:sldSz cx="12192000" cy="6858000"/>
@@ -130,7 +130,7 @@
 <file path=ppt/revisionInfo.xml><?xml version="1.0" encoding="utf-8"?>
 <p1510:revInfo xmlns:a="http://schemas.openxmlformats.org/drawingml/2006/main" xmlns:r="http://schemas.openxmlformats.org/officeDocument/2006/relationships" xmlns:p1510="http://schemas.microsoft.com/office/powerpoint/2015/10/main">
   <p1510:revLst>
-    <p1510:client id="{C7DA60A2-EAD7-4DD0-9773-C83A5B1E6564}" v="66" dt="2025-02-04T12:17:09.844"/>
+    <p1510:client id="{C7DA60A2-EAD7-4DD0-9773-C83A5B1E6564}" v="83" dt="2025-02-05T11:03:08.886"/>
   </p1510:revLst>
 </p1510:revInfo>
 </file>
@@ -140,7 +140,7 @@
   <pc:docChgLst>
     <pc:chgData name="Ocean Graham" userId="c784d4c6-724f-4452-8baf-8c216b3c246d" providerId="ADAL" clId="{C7DA60A2-EAD7-4DD0-9773-C83A5B1E6564}"/>
     <pc:docChg chg="undo custSel addSld delSld modSld sldOrd">
-      <pc:chgData name="Ocean Graham" userId="c784d4c6-724f-4452-8baf-8c216b3c246d" providerId="ADAL" clId="{C7DA60A2-EAD7-4DD0-9773-C83A5B1E6564}" dt="2025-02-04T12:24:48.152" v="6067" actId="21"/>
+      <pc:chgData name="Ocean Graham" userId="c784d4c6-724f-4452-8baf-8c216b3c246d" providerId="ADAL" clId="{C7DA60A2-EAD7-4DD0-9773-C83A5B1E6564}" dt="2025-02-05T11:17:24.866" v="7329" actId="20577"/>
       <pc:docMkLst>
         <pc:docMk/>
       </pc:docMkLst>
@@ -173,14 +173,6 @@
           <pc:docMk/>
           <pc:sldMk cId="1721955384" sldId="257"/>
         </pc:sldMkLst>
-        <pc:spChg chg="add del mod">
-          <ac:chgData name="Ocean Graham" userId="c784d4c6-724f-4452-8baf-8c216b3c246d" providerId="ADAL" clId="{C7DA60A2-EAD7-4DD0-9773-C83A5B1E6564}" dt="2025-02-03T09:57:11.855" v="123" actId="21"/>
-          <ac:spMkLst>
-            <pc:docMk/>
-            <pc:sldMk cId="1721955384" sldId="257"/>
-            <ac:spMk id="2" creationId="{5AE10E48-356B-7BE0-9AF2-ED0D12FFCE4A}"/>
-          </ac:spMkLst>
-        </pc:spChg>
       </pc:sldChg>
       <pc:sldChg chg="addSp delSp modSp new mod">
         <pc:chgData name="Ocean Graham" userId="c784d4c6-724f-4452-8baf-8c216b3c246d" providerId="ADAL" clId="{C7DA60A2-EAD7-4DD0-9773-C83A5B1E6564}" dt="2025-02-03T10:13:32.062" v="654" actId="20577"/>
@@ -196,14 +188,6 @@
             <ac:spMk id="2" creationId="{7FC69603-5320-FE1D-C680-2718F3114D90}"/>
           </ac:spMkLst>
         </pc:spChg>
-        <pc:spChg chg="del mod">
-          <ac:chgData name="Ocean Graham" userId="c784d4c6-724f-4452-8baf-8c216b3c246d" providerId="ADAL" clId="{C7DA60A2-EAD7-4DD0-9773-C83A5B1E6564}" dt="2025-02-03T10:01:40.244" v="224" actId="21"/>
-          <ac:spMkLst>
-            <pc:docMk/>
-            <pc:sldMk cId="4201213143" sldId="257"/>
-            <ac:spMk id="3" creationId="{AA6964AC-4C14-D61A-E857-6603D219C017}"/>
-          </ac:spMkLst>
-        </pc:spChg>
         <pc:spChg chg="add mod">
           <ac:chgData name="Ocean Graham" userId="c784d4c6-724f-4452-8baf-8c216b3c246d" providerId="ADAL" clId="{C7DA60A2-EAD7-4DD0-9773-C83A5B1E6564}" dt="2025-02-03T10:08:42.565" v="466" actId="1076"/>
           <ac:spMkLst>
@@ -228,22 +212,6 @@
             <ac:spMk id="13" creationId="{3DEF69E9-5E61-0CEA-CC2B-1F8057773348}"/>
           </ac:spMkLst>
         </pc:spChg>
-        <pc:picChg chg="add del">
-          <ac:chgData name="Ocean Graham" userId="c784d4c6-724f-4452-8baf-8c216b3c246d" providerId="ADAL" clId="{C7DA60A2-EAD7-4DD0-9773-C83A5B1E6564}" dt="2025-02-03T09:58:31.948" v="146" actId="21"/>
-          <ac:picMkLst>
-            <pc:docMk/>
-            <pc:sldMk cId="4201213143" sldId="257"/>
-            <ac:picMk id="4" creationId="{E4BCF9FB-2803-3DF6-CDD0-3FAA9F52BD1D}"/>
-          </ac:picMkLst>
-        </pc:picChg>
-        <pc:picChg chg="add del mod">
-          <ac:chgData name="Ocean Graham" userId="c784d4c6-724f-4452-8baf-8c216b3c246d" providerId="ADAL" clId="{C7DA60A2-EAD7-4DD0-9773-C83A5B1E6564}" dt="2025-02-03T09:59:08.556" v="151" actId="21"/>
-          <ac:picMkLst>
-            <pc:docMk/>
-            <pc:sldMk cId="4201213143" sldId="257"/>
-            <ac:picMk id="6" creationId="{913C4D54-EF08-EC3F-8655-C1EA171CAF89}"/>
-          </ac:picMkLst>
-        </pc:picChg>
         <pc:picChg chg="add mod">
           <ac:chgData name="Ocean Graham" userId="c784d4c6-724f-4452-8baf-8c216b3c246d" providerId="ADAL" clId="{C7DA60A2-EAD7-4DD0-9773-C83A5B1E6564}" dt="2025-02-03T10:08:28.790" v="463" actId="1076"/>
           <ac:picMkLst>
@@ -275,22 +243,6 @@
             <ac:spMk id="2" creationId="{C4AE7503-2931-7492-4641-BB4ABF451287}"/>
           </ac:spMkLst>
         </pc:spChg>
-        <pc:spChg chg="del mod">
-          <ac:chgData name="Ocean Graham" userId="c784d4c6-724f-4452-8baf-8c216b3c246d" providerId="ADAL" clId="{C7DA60A2-EAD7-4DD0-9773-C83A5B1E6564}" dt="2025-02-03T10:12:03.293" v="516" actId="21"/>
-          <ac:spMkLst>
-            <pc:docMk/>
-            <pc:sldMk cId="4109802382" sldId="258"/>
-            <ac:spMk id="3" creationId="{C243952D-1332-1562-3053-96E811326B5E}"/>
-          </ac:spMkLst>
-        </pc:spChg>
-        <pc:spChg chg="add del mod">
-          <ac:chgData name="Ocean Graham" userId="c784d4c6-724f-4452-8baf-8c216b3c246d" providerId="ADAL" clId="{C7DA60A2-EAD7-4DD0-9773-C83A5B1E6564}" dt="2025-02-03T10:08:52.745" v="470"/>
-          <ac:spMkLst>
-            <pc:docMk/>
-            <pc:sldMk cId="4109802382" sldId="258"/>
-            <ac:spMk id="8" creationId="{96A76563-0F38-4721-E566-475CC74BE3EF}"/>
-          </ac:spMkLst>
-        </pc:spChg>
         <pc:spChg chg="add mod">
           <ac:chgData name="Ocean Graham" userId="c784d4c6-724f-4452-8baf-8c216b3c246d" providerId="ADAL" clId="{C7DA60A2-EAD7-4DD0-9773-C83A5B1E6564}" dt="2025-02-03T10:11:36.054" v="506" actId="1076"/>
           <ac:spMkLst>
@@ -308,14 +260,6 @@
           </ac:spMkLst>
         </pc:spChg>
         <pc:spChg chg="add del mod">
-          <ac:chgData name="Ocean Graham" userId="c784d4c6-724f-4452-8baf-8c216b3c246d" providerId="ADAL" clId="{C7DA60A2-EAD7-4DD0-9773-C83A5B1E6564}" dt="2025-02-03T10:12:19.616" v="520"/>
-          <ac:spMkLst>
-            <pc:docMk/>
-            <pc:sldMk cId="4109802382" sldId="258"/>
-            <ac:spMk id="15" creationId="{0FC8CABD-B3D0-8B22-78CF-3A38FDF9952C}"/>
-          </ac:spMkLst>
-        </pc:spChg>
-        <pc:spChg chg="add del mod">
           <ac:chgData name="Ocean Graham" userId="c784d4c6-724f-4452-8baf-8c216b3c246d" providerId="ADAL" clId="{C7DA60A2-EAD7-4DD0-9773-C83A5B1E6564}" dt="2025-02-03T10:20:47.454" v="1355" actId="14100"/>
           <ac:spMkLst>
             <pc:docMk/>
@@ -323,28 +267,12 @@
             <ac:spMk id="16" creationId="{A15EC1F7-3094-2860-A47E-D1422488AAC9}"/>
           </ac:spMkLst>
         </pc:spChg>
-        <pc:picChg chg="add del mod">
-          <ac:chgData name="Ocean Graham" userId="c784d4c6-724f-4452-8baf-8c216b3c246d" providerId="ADAL" clId="{C7DA60A2-EAD7-4DD0-9773-C83A5B1E6564}" dt="2025-02-03T10:07:31.313" v="458" actId="21"/>
-          <ac:picMkLst>
-            <pc:docMk/>
-            <pc:sldMk cId="4109802382" sldId="258"/>
-            <ac:picMk id="5" creationId="{B479BF9A-55C9-2392-8587-3CCAA835F13E}"/>
-          </ac:picMkLst>
-        </pc:picChg>
         <pc:picChg chg="add mod">
           <ac:chgData name="Ocean Graham" userId="c784d4c6-724f-4452-8baf-8c216b3c246d" providerId="ADAL" clId="{C7DA60A2-EAD7-4DD0-9773-C83A5B1E6564}" dt="2025-02-03T10:19:58.574" v="1353" actId="1076"/>
           <ac:picMkLst>
             <pc:docMk/>
             <pc:sldMk cId="4109802382" sldId="258"/>
             <ac:picMk id="7" creationId="{10AE3A26-2950-B946-2E87-3CA915141AEE}"/>
-          </ac:picMkLst>
-        </pc:picChg>
-        <pc:picChg chg="add del mod">
-          <ac:chgData name="Ocean Graham" userId="c784d4c6-724f-4452-8baf-8c216b3c246d" providerId="ADAL" clId="{C7DA60A2-EAD7-4DD0-9773-C83A5B1E6564}" dt="2025-02-03T10:09:54.185" v="485" actId="21"/>
-          <ac:picMkLst>
-            <pc:docMk/>
-            <pc:sldMk cId="4109802382" sldId="258"/>
-            <ac:picMk id="11" creationId="{EC005EB1-0360-A25B-8E0C-7FCEFB23719D}"/>
           </ac:picMkLst>
         </pc:picChg>
         <pc:picChg chg="add mod">
@@ -370,36 +298,12 @@
             <ac:spMk id="2" creationId="{57CCE081-8151-C5D0-58D2-10898EC02B93}"/>
           </ac:spMkLst>
         </pc:spChg>
-        <pc:spChg chg="del">
-          <ac:chgData name="Ocean Graham" userId="c784d4c6-724f-4452-8baf-8c216b3c246d" providerId="ADAL" clId="{C7DA60A2-EAD7-4DD0-9773-C83A5B1E6564}" dt="2025-02-03T10:36:39.455" v="1399" actId="21"/>
-          <ac:spMkLst>
-            <pc:docMk/>
-            <pc:sldMk cId="2744267306" sldId="259"/>
-            <ac:spMk id="3" creationId="{2E713140-1358-7A24-1AD9-7E7661683616}"/>
-          </ac:spMkLst>
-        </pc:spChg>
-        <pc:spChg chg="add del mod">
-          <ac:chgData name="Ocean Graham" userId="c784d4c6-724f-4452-8baf-8c216b3c246d" providerId="ADAL" clId="{C7DA60A2-EAD7-4DD0-9773-C83A5B1E6564}" dt="2025-02-03T11:07:15.510" v="2038" actId="478"/>
-          <ac:spMkLst>
-            <pc:docMk/>
-            <pc:sldMk cId="2744267306" sldId="259"/>
-            <ac:spMk id="6" creationId="{D22A361D-E644-023D-B934-962143D8E28B}"/>
-          </ac:spMkLst>
-        </pc:spChg>
         <pc:spChg chg="add mod">
           <ac:chgData name="Ocean Graham" userId="c784d4c6-724f-4452-8baf-8c216b3c246d" providerId="ADAL" clId="{C7DA60A2-EAD7-4DD0-9773-C83A5B1E6564}" dt="2025-02-03T10:38:54.918" v="1431" actId="1076"/>
           <ac:spMkLst>
             <pc:docMk/>
             <pc:sldMk cId="2744267306" sldId="259"/>
             <ac:spMk id="11" creationId="{69497B14-E6DA-DE01-7221-26A199DAC7D0}"/>
-          </ac:spMkLst>
-        </pc:spChg>
-        <pc:spChg chg="add del mod">
-          <ac:chgData name="Ocean Graham" userId="c784d4c6-724f-4452-8baf-8c216b3c246d" providerId="ADAL" clId="{C7DA60A2-EAD7-4DD0-9773-C83A5B1E6564}" dt="2025-02-03T10:39:28.814" v="1435" actId="478"/>
-          <ac:spMkLst>
-            <pc:docMk/>
-            <pc:sldMk cId="2744267306" sldId="259"/>
-            <ac:spMk id="12" creationId="{EC88CA62-A7EA-D197-7E97-25438B62DB34}"/>
           </ac:spMkLst>
         </pc:spChg>
         <pc:spChg chg="add mod">
@@ -465,22 +369,6 @@
             <ac:spMk id="3" creationId="{27EF820F-7C10-3AA1-765A-06288BCD64B1}"/>
           </ac:spMkLst>
         </pc:spChg>
-        <pc:spChg chg="del">
-          <ac:chgData name="Ocean Graham" userId="c784d4c6-724f-4452-8baf-8c216b3c246d" providerId="ADAL" clId="{C7DA60A2-EAD7-4DD0-9773-C83A5B1E6564}" dt="2025-02-03T11:05:22.462" v="2012" actId="21"/>
-          <ac:spMkLst>
-            <pc:docMk/>
-            <pc:sldMk cId="1213792337" sldId="260"/>
-            <ac:spMk id="3" creationId="{37B816DB-0BEF-111C-2F34-68FFCE94A1A1}"/>
-          </ac:spMkLst>
-        </pc:spChg>
-        <pc:spChg chg="add del mod">
-          <ac:chgData name="Ocean Graham" userId="c784d4c6-724f-4452-8baf-8c216b3c246d" providerId="ADAL" clId="{C7DA60A2-EAD7-4DD0-9773-C83A5B1E6564}" dt="2025-02-03T11:06:40.224" v="2027" actId="478"/>
-          <ac:spMkLst>
-            <pc:docMk/>
-            <pc:sldMk cId="1213792337" sldId="260"/>
-            <ac:spMk id="8" creationId="{860E1C44-3A67-F6AA-A7FA-1CCFFA5EE906}"/>
-          </ac:spMkLst>
-        </pc:spChg>
         <pc:spChg chg="add mod">
           <ac:chgData name="Ocean Graham" userId="c784d4c6-724f-4452-8baf-8c216b3c246d" providerId="ADAL" clId="{C7DA60A2-EAD7-4DD0-9773-C83A5B1E6564}" dt="2025-02-03T11:07:10.761" v="2037" actId="1076"/>
           <ac:spMkLst>
@@ -505,14 +393,6 @@
             <ac:spMk id="13" creationId="{05A98AB9-BEF3-9CFF-28DF-B40C1BBF460F}"/>
           </ac:spMkLst>
         </pc:spChg>
-        <pc:picChg chg="add del mod">
-          <ac:chgData name="Ocean Graham" userId="c784d4c6-724f-4452-8baf-8c216b3c246d" providerId="ADAL" clId="{C7DA60A2-EAD7-4DD0-9773-C83A5B1E6564}" dt="2025-02-03T11:05:41.928" v="2016" actId="21"/>
-          <ac:picMkLst>
-            <pc:docMk/>
-            <pc:sldMk cId="1213792337" sldId="260"/>
-            <ac:picMk id="5" creationId="{D7C1CEA6-F150-0FF7-93C7-F9C77FA7C971}"/>
-          </ac:picMkLst>
-        </pc:picChg>
         <pc:picChg chg="add mod">
           <ac:chgData name="Ocean Graham" userId="c784d4c6-724f-4452-8baf-8c216b3c246d" providerId="ADAL" clId="{C7DA60A2-EAD7-4DD0-9773-C83A5B1E6564}" dt="2025-02-03T11:07:56.061" v="2049" actId="1076"/>
           <ac:picMkLst>
@@ -774,8 +654,8 @@
           </ac:picMkLst>
         </pc:picChg>
       </pc:sldChg>
-      <pc:sldChg chg="addSp delSp modSp new mod">
-        <pc:chgData name="Ocean Graham" userId="c784d4c6-724f-4452-8baf-8c216b3c246d" providerId="ADAL" clId="{C7DA60A2-EAD7-4DD0-9773-C83A5B1E6564}" dt="2025-02-04T12:22:09.364" v="6032" actId="20577"/>
+      <pc:sldChg chg="addSp delSp modSp new mod ord">
+        <pc:chgData name="Ocean Graham" userId="c784d4c6-724f-4452-8baf-8c216b3c246d" providerId="ADAL" clId="{C7DA60A2-EAD7-4DD0-9773-C83A5B1E6564}" dt="2025-02-05T11:08:05.002" v="7114" actId="20577"/>
         <pc:sldMkLst>
           <pc:docMk/>
           <pc:sldMk cId="292458422" sldId="264"/>
@@ -813,7 +693,7 @@
           </ac:spMkLst>
         </pc:spChg>
         <pc:spChg chg="add mod">
-          <ac:chgData name="Ocean Graham" userId="c784d4c6-724f-4452-8baf-8c216b3c246d" providerId="ADAL" clId="{C7DA60A2-EAD7-4DD0-9773-C83A5B1E6564}" dt="2025-02-04T12:22:09.364" v="6032" actId="20577"/>
+          <ac:chgData name="Ocean Graham" userId="c784d4c6-724f-4452-8baf-8c216b3c246d" providerId="ADAL" clId="{C7DA60A2-EAD7-4DD0-9773-C83A5B1E6564}" dt="2025-02-05T11:08:05.002" v="7114" actId="20577"/>
           <ac:spMkLst>
             <pc:docMk/>
             <pc:sldMk cId="292458422" sldId="264"/>
@@ -916,14 +796,14 @@
           </ac:picMkLst>
         </pc:picChg>
       </pc:sldChg>
-      <pc:sldChg chg="delSp modSp new mod">
-        <pc:chgData name="Ocean Graham" userId="c784d4c6-724f-4452-8baf-8c216b3c246d" providerId="ADAL" clId="{C7DA60A2-EAD7-4DD0-9773-C83A5B1E6564}" dt="2025-02-04T12:24:48.152" v="6067" actId="21"/>
+      <pc:sldChg chg="addSp delSp modSp new mod">
+        <pc:chgData name="Ocean Graham" userId="c784d4c6-724f-4452-8baf-8c216b3c246d" providerId="ADAL" clId="{C7DA60A2-EAD7-4DD0-9773-C83A5B1E6564}" dt="2025-02-05T11:15:19.787" v="7239" actId="20577"/>
         <pc:sldMkLst>
           <pc:docMk/>
           <pc:sldMk cId="3358884233" sldId="266"/>
         </pc:sldMkLst>
         <pc:spChg chg="mod">
-          <ac:chgData name="Ocean Graham" userId="c784d4c6-724f-4452-8baf-8c216b3c246d" providerId="ADAL" clId="{C7DA60A2-EAD7-4DD0-9773-C83A5B1E6564}" dt="2025-02-04T12:23:39.380" v="6044" actId="1076"/>
+          <ac:chgData name="Ocean Graham" userId="c784d4c6-724f-4452-8baf-8c216b3c246d" providerId="ADAL" clId="{C7DA60A2-EAD7-4DD0-9773-C83A5B1E6564}" dt="2025-02-05T08:51:33.891" v="6133" actId="1076"/>
           <ac:spMkLst>
             <pc:docMk/>
             <pc:sldMk cId="3358884233" sldId="266"/>
@@ -938,19 +818,75 @@
             <ac:spMk id="3" creationId="{058E6F45-6057-CD72-B13C-8322367B83D1}"/>
           </ac:spMkLst>
         </pc:spChg>
+        <pc:spChg chg="add mod">
+          <ac:chgData name="Ocean Graham" userId="c784d4c6-724f-4452-8baf-8c216b3c246d" providerId="ADAL" clId="{C7DA60A2-EAD7-4DD0-9773-C83A5B1E6564}" dt="2025-02-05T08:51:38.186" v="6134" actId="1076"/>
+          <ac:spMkLst>
+            <pc:docMk/>
+            <pc:sldMk cId="3358884233" sldId="266"/>
+            <ac:spMk id="3" creationId="{B35C317D-AF30-7D3D-3B65-A4EA03709BF5}"/>
+          </ac:spMkLst>
+        </pc:spChg>
+        <pc:spChg chg="add mod">
+          <ac:chgData name="Ocean Graham" userId="c784d4c6-724f-4452-8baf-8c216b3c246d" providerId="ADAL" clId="{C7DA60A2-EAD7-4DD0-9773-C83A5B1E6564}" dt="2025-02-05T08:51:39.763" v="6135" actId="1076"/>
+          <ac:spMkLst>
+            <pc:docMk/>
+            <pc:sldMk cId="3358884233" sldId="266"/>
+            <ac:spMk id="4" creationId="{E92842E2-06BF-95AB-4F0C-B80B8AD7B528}"/>
+          </ac:spMkLst>
+        </pc:spChg>
+        <pc:spChg chg="add del mod">
+          <ac:chgData name="Ocean Graham" userId="c784d4c6-724f-4452-8baf-8c216b3c246d" providerId="ADAL" clId="{C7DA60A2-EAD7-4DD0-9773-C83A5B1E6564}" dt="2025-02-05T09:20:28.043" v="6530"/>
+          <ac:spMkLst>
+            <pc:docMk/>
+            <pc:sldMk cId="3358884233" sldId="266"/>
+            <ac:spMk id="5" creationId="{F2147124-7F6D-D088-A5D3-04D03B9F9100}"/>
+          </ac:spMkLst>
+        </pc:spChg>
+        <pc:spChg chg="add mod">
+          <ac:chgData name="Ocean Graham" userId="c784d4c6-724f-4452-8baf-8c216b3c246d" providerId="ADAL" clId="{C7DA60A2-EAD7-4DD0-9773-C83A5B1E6564}" dt="2025-02-05T11:15:19.787" v="7239" actId="20577"/>
+          <ac:spMkLst>
+            <pc:docMk/>
+            <pc:sldMk cId="3358884233" sldId="266"/>
+            <ac:spMk id="6" creationId="{21E40AE7-A021-9E87-3015-8CC16C40F29A}"/>
+          </ac:spMkLst>
+        </pc:spChg>
+        <pc:picChg chg="add mod">
+          <ac:chgData name="Ocean Graham" userId="c784d4c6-724f-4452-8baf-8c216b3c246d" providerId="ADAL" clId="{C7DA60A2-EAD7-4DD0-9773-C83A5B1E6564}" dt="2025-02-05T10:57:41.434" v="6925" actId="1076"/>
+          <ac:picMkLst>
+            <pc:docMk/>
+            <pc:sldMk cId="3358884233" sldId="266"/>
+            <ac:picMk id="8" creationId="{C8167366-C2EA-8369-2BAD-7AFBC85FC765}"/>
+          </ac:picMkLst>
+        </pc:picChg>
+        <pc:picChg chg="add mod">
+          <ac:chgData name="Ocean Graham" userId="c784d4c6-724f-4452-8baf-8c216b3c246d" providerId="ADAL" clId="{C7DA60A2-EAD7-4DD0-9773-C83A5B1E6564}" dt="2025-02-05T10:57:35.258" v="6923" actId="1076"/>
+          <ac:picMkLst>
+            <pc:docMk/>
+            <pc:sldMk cId="3358884233" sldId="266"/>
+            <ac:picMk id="10" creationId="{BA0037E8-8DF3-F97E-A090-67AA4EB67EE0}"/>
+          </ac:picMkLst>
+        </pc:picChg>
       </pc:sldChg>
-      <pc:sldChg chg="delSp modSp new mod">
-        <pc:chgData name="Ocean Graham" userId="c784d4c6-724f-4452-8baf-8c216b3c246d" providerId="ADAL" clId="{C7DA60A2-EAD7-4DD0-9773-C83A5B1E6564}" dt="2025-02-04T12:24:45.810" v="6066" actId="21"/>
+      <pc:sldChg chg="addSp delSp modSp new mod ord">
+        <pc:chgData name="Ocean Graham" userId="c784d4c6-724f-4452-8baf-8c216b3c246d" providerId="ADAL" clId="{C7DA60A2-EAD7-4DD0-9773-C83A5B1E6564}" dt="2025-02-05T11:07:10.610" v="7053" actId="20577"/>
         <pc:sldMkLst>
           <pc:docMk/>
           <pc:sldMk cId="2499244716" sldId="267"/>
         </pc:sldMkLst>
         <pc:spChg chg="mod">
-          <ac:chgData name="Ocean Graham" userId="c784d4c6-724f-4452-8baf-8c216b3c246d" providerId="ADAL" clId="{C7DA60A2-EAD7-4DD0-9773-C83A5B1E6564}" dt="2025-02-04T12:24:05.204" v="6050" actId="1076"/>
+          <ac:chgData name="Ocean Graham" userId="c784d4c6-724f-4452-8baf-8c216b3c246d" providerId="ADAL" clId="{C7DA60A2-EAD7-4DD0-9773-C83A5B1E6564}" dt="2025-02-05T08:49:50.683" v="6087" actId="1076"/>
           <ac:spMkLst>
             <pc:docMk/>
             <pc:sldMk cId="2499244716" sldId="267"/>
             <ac:spMk id="2" creationId="{13D60BB3-0713-D28C-F3A7-508B1F0B273C}"/>
+          </ac:spMkLst>
+        </pc:spChg>
+        <pc:spChg chg="add mod">
+          <ac:chgData name="Ocean Graham" userId="c784d4c6-724f-4452-8baf-8c216b3c246d" providerId="ADAL" clId="{C7DA60A2-EAD7-4DD0-9773-C83A5B1E6564}" dt="2025-02-05T08:49:56.043" v="6088" actId="1076"/>
+          <ac:spMkLst>
+            <pc:docMk/>
+            <pc:sldMk cId="2499244716" sldId="267"/>
+            <ac:spMk id="3" creationId="{42C8CA03-0805-FC8F-C8D3-10B9E73805CD}"/>
           </ac:spMkLst>
         </pc:spChg>
         <pc:spChg chg="del">
@@ -961,19 +897,67 @@
             <ac:spMk id="3" creationId="{D40C4666-1C40-854F-670E-CE57C3CDA52F}"/>
           </ac:spMkLst>
         </pc:spChg>
+        <pc:spChg chg="add mod">
+          <ac:chgData name="Ocean Graham" userId="c784d4c6-724f-4452-8baf-8c216b3c246d" providerId="ADAL" clId="{C7DA60A2-EAD7-4DD0-9773-C83A5B1E6564}" dt="2025-02-05T08:49:57.946" v="6089" actId="1076"/>
+          <ac:spMkLst>
+            <pc:docMk/>
+            <pc:sldMk cId="2499244716" sldId="267"/>
+            <ac:spMk id="4" creationId="{E2BE28D1-68B1-02CE-F037-EFF95268C5D0}"/>
+          </ac:spMkLst>
+        </pc:spChg>
+        <pc:spChg chg="add mod">
+          <ac:chgData name="Ocean Graham" userId="c784d4c6-724f-4452-8baf-8c216b3c246d" providerId="ADAL" clId="{C7DA60A2-EAD7-4DD0-9773-C83A5B1E6564}" dt="2025-02-05T11:07:10.610" v="7053" actId="20577"/>
+          <ac:spMkLst>
+            <pc:docMk/>
+            <pc:sldMk cId="2499244716" sldId="267"/>
+            <ac:spMk id="5" creationId="{03575191-1B43-6486-9893-E17A154DDDA4}"/>
+          </ac:spMkLst>
+        </pc:spChg>
+        <pc:picChg chg="add mod">
+          <ac:chgData name="Ocean Graham" userId="c784d4c6-724f-4452-8baf-8c216b3c246d" providerId="ADAL" clId="{C7DA60A2-EAD7-4DD0-9773-C83A5B1E6564}" dt="2025-02-05T09:14:44.803" v="6384" actId="14100"/>
+          <ac:picMkLst>
+            <pc:docMk/>
+            <pc:sldMk cId="2499244716" sldId="267"/>
+            <ac:picMk id="7" creationId="{4EE8EECF-B3FB-098A-B417-68B3A41430CF}"/>
+          </ac:picMkLst>
+        </pc:picChg>
+        <pc:picChg chg="add mod modCrop">
+          <ac:chgData name="Ocean Graham" userId="c784d4c6-724f-4452-8baf-8c216b3c246d" providerId="ADAL" clId="{C7DA60A2-EAD7-4DD0-9773-C83A5B1E6564}" dt="2025-02-05T09:14:31.818" v="6381" actId="1076"/>
+          <ac:picMkLst>
+            <pc:docMk/>
+            <pc:sldMk cId="2499244716" sldId="267"/>
+            <ac:picMk id="9" creationId="{7859E8E0-6409-183C-C07D-0ED99592D649}"/>
+          </ac:picMkLst>
+        </pc:picChg>
+        <pc:picChg chg="add mod">
+          <ac:chgData name="Ocean Graham" userId="c784d4c6-724f-4452-8baf-8c216b3c246d" providerId="ADAL" clId="{C7DA60A2-EAD7-4DD0-9773-C83A5B1E6564}" dt="2025-02-05T09:14:35.293" v="6382" actId="14100"/>
+          <ac:picMkLst>
+            <pc:docMk/>
+            <pc:sldMk cId="2499244716" sldId="267"/>
+            <ac:picMk id="11" creationId="{93BDEB04-5D24-74F9-127A-D62EDD32D6A0}"/>
+          </ac:picMkLst>
+        </pc:picChg>
       </pc:sldChg>
-      <pc:sldChg chg="delSp modSp new mod">
-        <pc:chgData name="Ocean Graham" userId="c784d4c6-724f-4452-8baf-8c216b3c246d" providerId="ADAL" clId="{C7DA60A2-EAD7-4DD0-9773-C83A5B1E6564}" dt="2025-02-04T12:24:42.751" v="6065" actId="21"/>
+      <pc:sldChg chg="addSp delSp modSp new mod">
+        <pc:chgData name="Ocean Graham" userId="c784d4c6-724f-4452-8baf-8c216b3c246d" providerId="ADAL" clId="{C7DA60A2-EAD7-4DD0-9773-C83A5B1E6564}" dt="2025-02-05T11:17:24.866" v="7329" actId="20577"/>
         <pc:sldMkLst>
           <pc:docMk/>
           <pc:sldMk cId="3942598934" sldId="268"/>
         </pc:sldMkLst>
         <pc:spChg chg="mod">
-          <ac:chgData name="Ocean Graham" userId="c784d4c6-724f-4452-8baf-8c216b3c246d" providerId="ADAL" clId="{C7DA60A2-EAD7-4DD0-9773-C83A5B1E6564}" dt="2025-02-04T12:24:33.275" v="6064" actId="1076"/>
+          <ac:chgData name="Ocean Graham" userId="c784d4c6-724f-4452-8baf-8c216b3c246d" providerId="ADAL" clId="{C7DA60A2-EAD7-4DD0-9773-C83A5B1E6564}" dt="2025-02-05T08:50:16.323" v="6092" actId="1076"/>
           <ac:spMkLst>
             <pc:docMk/>
             <pc:sldMk cId="3942598934" sldId="268"/>
             <ac:spMk id="2" creationId="{26E06AB0-37BC-95D4-F6CD-D462531CFF3D}"/>
+          </ac:spMkLst>
+        </pc:spChg>
+        <pc:spChg chg="add mod">
+          <ac:chgData name="Ocean Graham" userId="c784d4c6-724f-4452-8baf-8c216b3c246d" providerId="ADAL" clId="{C7DA60A2-EAD7-4DD0-9773-C83A5B1E6564}" dt="2025-02-05T08:50:58.771" v="6121" actId="20577"/>
+          <ac:spMkLst>
+            <pc:docMk/>
+            <pc:sldMk cId="3942598934" sldId="268"/>
+            <ac:spMk id="3" creationId="{659DE5BA-3AE6-8DD8-CF29-3202B9760309}"/>
           </ac:spMkLst>
         </pc:spChg>
         <pc:spChg chg="del">
@@ -984,6 +968,38 @@
             <ac:spMk id="3" creationId="{BC10C015-19BE-BBF6-DB7A-C036579B7DE7}"/>
           </ac:spMkLst>
         </pc:spChg>
+        <pc:spChg chg="add mod">
+          <ac:chgData name="Ocean Graham" userId="c784d4c6-724f-4452-8baf-8c216b3c246d" providerId="ADAL" clId="{C7DA60A2-EAD7-4DD0-9773-C83A5B1E6564}" dt="2025-02-05T08:51:18.803" v="6131" actId="1076"/>
+          <ac:spMkLst>
+            <pc:docMk/>
+            <pc:sldMk cId="3942598934" sldId="268"/>
+            <ac:spMk id="4" creationId="{A110040F-5E78-DCCF-6D17-AA64CC7AB311}"/>
+          </ac:spMkLst>
+        </pc:spChg>
+        <pc:spChg chg="add mod">
+          <ac:chgData name="Ocean Graham" userId="c784d4c6-724f-4452-8baf-8c216b3c246d" providerId="ADAL" clId="{C7DA60A2-EAD7-4DD0-9773-C83A5B1E6564}" dt="2025-02-05T11:17:24.866" v="7329" actId="20577"/>
+          <ac:spMkLst>
+            <pc:docMk/>
+            <pc:sldMk cId="3942598934" sldId="268"/>
+            <ac:spMk id="5" creationId="{87C2DB42-8774-41A8-BC50-B334EF255201}"/>
+          </ac:spMkLst>
+        </pc:spChg>
+        <pc:picChg chg="add mod">
+          <ac:chgData name="Ocean Graham" userId="c784d4c6-724f-4452-8baf-8c216b3c246d" providerId="ADAL" clId="{C7DA60A2-EAD7-4DD0-9773-C83A5B1E6564}" dt="2025-02-05T11:02:56.133" v="6931" actId="14100"/>
+          <ac:picMkLst>
+            <pc:docMk/>
+            <pc:sldMk cId="3942598934" sldId="268"/>
+            <ac:picMk id="7" creationId="{522F9F82-7AF4-918B-B412-71835A234D80}"/>
+          </ac:picMkLst>
+        </pc:picChg>
+        <pc:picChg chg="add mod">
+          <ac:chgData name="Ocean Graham" userId="c784d4c6-724f-4452-8baf-8c216b3c246d" providerId="ADAL" clId="{C7DA60A2-EAD7-4DD0-9773-C83A5B1E6564}" dt="2025-02-05T11:03:24.627" v="6935" actId="14100"/>
+          <ac:picMkLst>
+            <pc:docMk/>
+            <pc:sldMk cId="3942598934" sldId="268"/>
+            <ac:picMk id="9" creationId="{C5FDADFB-391B-1D70-D89C-B029C19EB3F6}"/>
+          </ac:picMkLst>
+        </pc:picChg>
       </pc:sldChg>
     </pc:docChg>
   </pc:docChgLst>
@@ -1072,7 +1088,7 @@
           <a:p>
             <a:fld id="{116C4C18-9B89-4B9A-B59A-E7B597238EE5}" type="datetimeFigureOut">
               <a:rPr lang="en-GB" smtClean="0"/>
-              <a:t>04/02/2025</a:t>
+              <a:t>05/02/2025</a:t>
             </a:fld>
             <a:endParaRPr lang="en-GB"/>
           </a:p>
@@ -1570,7 +1586,7 @@
           <a:p>
             <a:fld id="{A0236FAB-00C9-42EF-951A-8214ABE11C79}" type="datetimeFigureOut">
               <a:rPr lang="en-GB" smtClean="0"/>
-              <a:t>04/02/2025</a:t>
+              <a:t>05/02/2025</a:t>
             </a:fld>
             <a:endParaRPr lang="en-GB"/>
           </a:p>
@@ -1768,7 +1784,7 @@
           <a:p>
             <a:fld id="{A0236FAB-00C9-42EF-951A-8214ABE11C79}" type="datetimeFigureOut">
               <a:rPr lang="en-GB" smtClean="0"/>
-              <a:t>04/02/2025</a:t>
+              <a:t>05/02/2025</a:t>
             </a:fld>
             <a:endParaRPr lang="en-GB"/>
           </a:p>
@@ -1976,7 +1992,7 @@
           <a:p>
             <a:fld id="{A0236FAB-00C9-42EF-951A-8214ABE11C79}" type="datetimeFigureOut">
               <a:rPr lang="en-GB" smtClean="0"/>
-              <a:t>04/02/2025</a:t>
+              <a:t>05/02/2025</a:t>
             </a:fld>
             <a:endParaRPr lang="en-GB"/>
           </a:p>
@@ -2174,7 +2190,7 @@
           <a:p>
             <a:fld id="{A0236FAB-00C9-42EF-951A-8214ABE11C79}" type="datetimeFigureOut">
               <a:rPr lang="en-GB" smtClean="0"/>
-              <a:t>04/02/2025</a:t>
+              <a:t>05/02/2025</a:t>
             </a:fld>
             <a:endParaRPr lang="en-GB"/>
           </a:p>
@@ -2449,7 +2465,7 @@
           <a:p>
             <a:fld id="{A0236FAB-00C9-42EF-951A-8214ABE11C79}" type="datetimeFigureOut">
               <a:rPr lang="en-GB" smtClean="0"/>
-              <a:t>04/02/2025</a:t>
+              <a:t>05/02/2025</a:t>
             </a:fld>
             <a:endParaRPr lang="en-GB"/>
           </a:p>
@@ -2714,7 +2730,7 @@
           <a:p>
             <a:fld id="{A0236FAB-00C9-42EF-951A-8214ABE11C79}" type="datetimeFigureOut">
               <a:rPr lang="en-GB" smtClean="0"/>
-              <a:t>04/02/2025</a:t>
+              <a:t>05/02/2025</a:t>
             </a:fld>
             <a:endParaRPr lang="en-GB"/>
           </a:p>
@@ -3126,7 +3142,7 @@
           <a:p>
             <a:fld id="{A0236FAB-00C9-42EF-951A-8214ABE11C79}" type="datetimeFigureOut">
               <a:rPr lang="en-GB" smtClean="0"/>
-              <a:t>04/02/2025</a:t>
+              <a:t>05/02/2025</a:t>
             </a:fld>
             <a:endParaRPr lang="en-GB"/>
           </a:p>
@@ -3267,7 +3283,7 @@
           <a:p>
             <a:fld id="{A0236FAB-00C9-42EF-951A-8214ABE11C79}" type="datetimeFigureOut">
               <a:rPr lang="en-GB" smtClean="0"/>
-              <a:t>04/02/2025</a:t>
+              <a:t>05/02/2025</a:t>
             </a:fld>
             <a:endParaRPr lang="en-GB"/>
           </a:p>
@@ -3380,7 +3396,7 @@
           <a:p>
             <a:fld id="{A0236FAB-00C9-42EF-951A-8214ABE11C79}" type="datetimeFigureOut">
               <a:rPr lang="en-GB" smtClean="0"/>
-              <a:t>04/02/2025</a:t>
+              <a:t>05/02/2025</a:t>
             </a:fld>
             <a:endParaRPr lang="en-GB"/>
           </a:p>
@@ -3691,7 +3707,7 @@
           <a:p>
             <a:fld id="{A0236FAB-00C9-42EF-951A-8214ABE11C79}" type="datetimeFigureOut">
               <a:rPr lang="en-GB" smtClean="0"/>
-              <a:t>04/02/2025</a:t>
+              <a:t>05/02/2025</a:t>
             </a:fld>
             <a:endParaRPr lang="en-GB"/>
           </a:p>
@@ -3979,7 +3995,7 @@
           <a:p>
             <a:fld id="{A0236FAB-00C9-42EF-951A-8214ABE11C79}" type="datetimeFigureOut">
               <a:rPr lang="en-GB" smtClean="0"/>
-              <a:t>04/02/2025</a:t>
+              <a:t>05/02/2025</a:t>
             </a:fld>
             <a:endParaRPr lang="en-GB"/>
           </a:p>
@@ -4220,7 +4236,7 @@
           <a:p>
             <a:fld id="{A0236FAB-00C9-42EF-951A-8214ABE11C79}" type="datetimeFigureOut">
               <a:rPr lang="en-GB" smtClean="0"/>
-              <a:t>04/02/2025</a:t>
+              <a:t>05/02/2025</a:t>
             </a:fld>
             <a:endParaRPr lang="en-GB"/>
           </a:p>
@@ -4767,7 +4783,7 @@
           <p:cNvPr id="2" name="Title 1">
             <a:extLst>
               <a:ext uri="{FF2B5EF4-FFF2-40B4-BE49-F238E27FC236}">
-                <a16:creationId xmlns:a16="http://schemas.microsoft.com/office/drawing/2014/main" id="{66F611B0-10AE-C392-D95E-015081CD2662}"/>
+                <a16:creationId xmlns:a16="http://schemas.microsoft.com/office/drawing/2014/main" id="{13D60BB3-0713-D28C-F3A7-508B1F0B273C}"/>
               </a:ext>
             </a:extLst>
           </p:cNvPr>
@@ -4780,8 +4796,8 @@
         </p:nvSpPr>
         <p:spPr>
           <a:xfrm>
-            <a:off x="838200" y="292419"/>
-            <a:ext cx="10515600" cy="786574"/>
+            <a:off x="844550" y="-140677"/>
+            <a:ext cx="10515600" cy="1215771"/>
           </a:xfrm>
         </p:spPr>
         <p:txBody>
@@ -4792,17 +4808,17 @@
           <a:p>
             <a:r>
               <a:rPr lang="en-GB" sz="4300" dirty="0"/>
-              <a:t>Lists</a:t>
-            </a:r>
-          </a:p>
-        </p:txBody>
-      </p:sp>
-      <p:sp>
-        <p:nvSpPr>
-          <p:cNvPr id="4" name="TextBox 3">
-            <a:extLst>
-              <a:ext uri="{FF2B5EF4-FFF2-40B4-BE49-F238E27FC236}">
-                <a16:creationId xmlns:a16="http://schemas.microsoft.com/office/drawing/2014/main" id="{344C945F-4504-76BE-DD9D-52FD433C6092}"/>
+              <a:t>Set</a:t>
+            </a:r>
+          </a:p>
+        </p:txBody>
+      </p:sp>
+      <p:sp>
+        <p:nvSpPr>
+          <p:cNvPr id="3" name="TextBox 2">
+            <a:extLst>
+              <a:ext uri="{FF2B5EF4-FFF2-40B4-BE49-F238E27FC236}">
+                <a16:creationId xmlns:a16="http://schemas.microsoft.com/office/drawing/2014/main" id="{42C8CA03-0805-FC8F-C8D3-10B9E73805CD}"/>
               </a:ext>
             </a:extLst>
           </p:cNvPr>
@@ -4811,8 +4827,8 @@
         </p:nvSpPr>
         <p:spPr>
           <a:xfrm>
-            <a:off x="838200" y="1298448"/>
-            <a:ext cx="3337560" cy="523220"/>
+            <a:off x="844550" y="1392702"/>
+            <a:ext cx="4008804" cy="534572"/>
           </a:xfrm>
           <a:prstGeom prst="rect">
             <a:avLst/>
@@ -4834,10 +4850,10 @@
       </p:sp>
       <p:sp>
         <p:nvSpPr>
-          <p:cNvPr id="5" name="TextBox 4">
-            <a:extLst>
-              <a:ext uri="{FF2B5EF4-FFF2-40B4-BE49-F238E27FC236}">
-                <a16:creationId xmlns:a16="http://schemas.microsoft.com/office/drawing/2014/main" id="{74597ECA-2801-F899-3ED9-B92FF61948B1}"/>
+          <p:cNvPr id="4" name="TextBox 3">
+            <a:extLst>
+              <a:ext uri="{FF2B5EF4-FFF2-40B4-BE49-F238E27FC236}">
+                <a16:creationId xmlns:a16="http://schemas.microsoft.com/office/drawing/2014/main" id="{E2BE28D1-68B1-02CE-F037-EFF95268C5D0}"/>
               </a:ext>
             </a:extLst>
           </p:cNvPr>
@@ -4846,8 +4862,8 @@
         </p:nvSpPr>
         <p:spPr>
           <a:xfrm>
-            <a:off x="6096000" y="1298448"/>
-            <a:ext cx="5605272" cy="523220"/>
+            <a:off x="6096000" y="1404054"/>
+            <a:ext cx="4032738" cy="523220"/>
           </a:xfrm>
           <a:prstGeom prst="rect">
             <a:avLst/>
@@ -4867,12 +4883,77 @@
           </a:p>
         </p:txBody>
       </p:sp>
+      <p:sp>
+        <p:nvSpPr>
+          <p:cNvPr id="5" name="TextBox 4">
+            <a:extLst>
+              <a:ext uri="{FF2B5EF4-FFF2-40B4-BE49-F238E27FC236}">
+                <a16:creationId xmlns:a16="http://schemas.microsoft.com/office/drawing/2014/main" id="{03575191-1B43-6486-9893-E17A154DDDA4}"/>
+              </a:ext>
+            </a:extLst>
+          </p:cNvPr>
+          <p:cNvSpPr txBox="1"/>
+          <p:nvPr/>
+        </p:nvSpPr>
+        <p:spPr>
+          <a:xfrm>
+            <a:off x="844550" y="4190489"/>
+            <a:ext cx="10677379" cy="2246769"/>
+          </a:xfrm>
+          <a:prstGeom prst="rect">
+            <a:avLst/>
+          </a:prstGeom>
+          <a:noFill/>
+        </p:spPr>
+        <p:txBody>
+          <a:bodyPr wrap="square" rtlCol="0">
+            <a:spAutoFit/>
+          </a:bodyPr>
+          <a:lstStyle/>
+          <a:p>
+            <a:r>
+              <a:rPr lang="en-GB" sz="2000" dirty="0"/>
+              <a:t>Sets are one of the 4 types of data storage.</a:t>
+            </a:r>
+          </a:p>
+          <a:p>
+            <a:r>
+              <a:rPr lang="en-GB" sz="2000" dirty="0"/>
+              <a:t>They are unordered, unindexed (meaning they are randomised, and each key has no assignment)</a:t>
+            </a:r>
+          </a:p>
+          <a:p>
+            <a:r>
+              <a:rPr lang="en-GB" sz="2000" dirty="0"/>
+              <a:t>do not allow duplicate elements</a:t>
+            </a:r>
+          </a:p>
+          <a:p>
+            <a:r>
+              <a:rPr lang="en-GB" sz="2000" dirty="0"/>
+              <a:t>Sets are written with { }</a:t>
+            </a:r>
+          </a:p>
+          <a:p>
+            <a:r>
+              <a:rPr lang="en-GB" sz="2000" dirty="0"/>
+              <a:t>This would be better suited for storing a load that doesn’t require an order.</a:t>
+            </a:r>
+          </a:p>
+          <a:p>
+            <a:endParaRPr lang="en-GB" sz="2000" dirty="0"/>
+          </a:p>
+          <a:p>
+            <a:endParaRPr lang="en-GB" sz="2000" dirty="0"/>
+          </a:p>
+        </p:txBody>
+      </p:sp>
       <p:pic>
         <p:nvPicPr>
-          <p:cNvPr id="7" name="Picture 6" descr="A white background with blue text&#10;&#10;Description automatically generated">
-            <a:extLst>
-              <a:ext uri="{FF2B5EF4-FFF2-40B4-BE49-F238E27FC236}">
-                <a16:creationId xmlns:a16="http://schemas.microsoft.com/office/drawing/2014/main" id="{19D5864A-2488-1F2D-C6EB-121D11294562}"/>
+          <p:cNvPr id="7" name="Picture 6">
+            <a:extLst>
+              <a:ext uri="{FF2B5EF4-FFF2-40B4-BE49-F238E27FC236}">
+                <a16:creationId xmlns:a16="http://schemas.microsoft.com/office/drawing/2014/main" id="{4EE8EECF-B3FB-098A-B417-68B3A41430CF}"/>
               </a:ext>
             </a:extLst>
           </p:cNvPr>
@@ -4895,8 +4976,8 @@
         </p:blipFill>
         <p:spPr>
           <a:xfrm>
-            <a:off x="6096000" y="2041123"/>
-            <a:ext cx="3829584" cy="1657581"/>
+            <a:off x="239545" y="2290714"/>
+            <a:ext cx="5533082" cy="534571"/>
           </a:xfrm>
           <a:prstGeom prst="rect">
             <a:avLst/>
@@ -4905,10 +4986,10 @@
       </p:pic>
       <p:pic>
         <p:nvPicPr>
-          <p:cNvPr id="9" name="Picture 8" descr="A screenshot of a computer&#10;&#10;Description automatically generated">
-            <a:extLst>
-              <a:ext uri="{FF2B5EF4-FFF2-40B4-BE49-F238E27FC236}">
-                <a16:creationId xmlns:a16="http://schemas.microsoft.com/office/drawing/2014/main" id="{469590BE-9C6A-015D-F1BC-248F0393F51C}"/>
+          <p:cNvPr id="9" name="Picture 8">
+            <a:extLst>
+              <a:ext uri="{FF2B5EF4-FFF2-40B4-BE49-F238E27FC236}">
+                <a16:creationId xmlns:a16="http://schemas.microsoft.com/office/drawing/2014/main" id="{7859E8E0-6409-183C-C07D-0ED99592D649}"/>
               </a:ext>
             </a:extLst>
           </p:cNvPr>
@@ -4925,77 +5006,59 @@
               </a:ext>
             </a:extLst>
           </a:blip>
+          <a:srcRect l="-639" t="20164" r="639" b="-20164"/>
+          <a:stretch/>
+        </p:blipFill>
+        <p:spPr>
+          <a:xfrm>
+            <a:off x="5992533" y="2309534"/>
+            <a:ext cx="5746502" cy="357978"/>
+          </a:xfrm>
+          <a:prstGeom prst="rect">
+            <a:avLst/>
+          </a:prstGeom>
+        </p:spPr>
+      </p:pic>
+      <p:pic>
+        <p:nvPicPr>
+          <p:cNvPr id="11" name="Picture 10">
+            <a:extLst>
+              <a:ext uri="{FF2B5EF4-FFF2-40B4-BE49-F238E27FC236}">
+                <a16:creationId xmlns:a16="http://schemas.microsoft.com/office/drawing/2014/main" id="{93BDEB04-5D24-74F9-127A-D62EDD32D6A0}"/>
+              </a:ext>
+            </a:extLst>
+          </p:cNvPr>
+          <p:cNvPicPr>
+            <a:picLocks noChangeAspect="1"/>
+          </p:cNvPicPr>
+          <p:nvPr/>
+        </p:nvPicPr>
+        <p:blipFill>
+          <a:blip r:embed="rId4">
+            <a:extLst>
+              <a:ext uri="{28A0092B-C50C-407E-A947-70E740481C1C}">
+                <a14:useLocalDpi xmlns:a14="http://schemas.microsoft.com/office/drawing/2010/main" val="0"/>
+              </a:ext>
+            </a:extLst>
+          </a:blip>
           <a:stretch>
             <a:fillRect/>
           </a:stretch>
         </p:blipFill>
         <p:spPr>
           <a:xfrm>
-            <a:off x="435863" y="2041123"/>
-            <a:ext cx="5419904" cy="2995210"/>
+            <a:off x="6074213" y="2763666"/>
+            <a:ext cx="5645833" cy="286106"/>
           </a:xfrm>
           <a:prstGeom prst="rect">
             <a:avLst/>
           </a:prstGeom>
         </p:spPr>
       </p:pic>
-      <p:sp>
-        <p:nvSpPr>
-          <p:cNvPr id="10" name="TextBox 9">
-            <a:extLst>
-              <a:ext uri="{FF2B5EF4-FFF2-40B4-BE49-F238E27FC236}">
-                <a16:creationId xmlns:a16="http://schemas.microsoft.com/office/drawing/2014/main" id="{2D76A1BE-BE26-5FFB-3899-7287F9867EB6}"/>
-              </a:ext>
-            </a:extLst>
-          </p:cNvPr>
-          <p:cNvSpPr txBox="1"/>
-          <p:nvPr/>
-        </p:nvSpPr>
-        <p:spPr>
-          <a:xfrm>
-            <a:off x="2503932" y="4240125"/>
-            <a:ext cx="8622792" cy="1323439"/>
-          </a:xfrm>
-          <a:prstGeom prst="rect">
-            <a:avLst/>
-          </a:prstGeom>
-          <a:noFill/>
-        </p:spPr>
-        <p:txBody>
-          <a:bodyPr wrap="square" rtlCol="0">
-            <a:spAutoFit/>
-          </a:bodyPr>
-          <a:lstStyle/>
-          <a:p>
-            <a:r>
-              <a:rPr lang="en-GB" sz="2000" dirty="0"/>
-              <a:t>Lists are one of the 4 ways to store data. </a:t>
-            </a:r>
-          </a:p>
-          <a:p>
-            <a:r>
-              <a:rPr lang="en-GB" sz="2000" dirty="0"/>
-              <a:t>Lists are used to store multiple items in 1 variable.</a:t>
-            </a:r>
-          </a:p>
-          <a:p>
-            <a:r>
-              <a:rPr lang="en-GB" sz="2000" dirty="0"/>
-              <a:t>They are used as opposed to others as they are changeable and indexed.</a:t>
-            </a:r>
-          </a:p>
-          <a:p>
-            <a:r>
-              <a:rPr lang="en-GB" sz="2000" dirty="0"/>
-              <a:t>Lists use square brackets [ ] </a:t>
-            </a:r>
-          </a:p>
-        </p:txBody>
-      </p:sp>
     </p:spTree>
     <p:extLst>
       <p:ext uri="{BB962C8B-B14F-4D97-AF65-F5344CB8AC3E}">
-        <p14:creationId xmlns:p14="http://schemas.microsoft.com/office/powerpoint/2010/main" val="292458422"/>
+        <p14:creationId xmlns:p14="http://schemas.microsoft.com/office/powerpoint/2010/main" val="2499244716"/>
       </p:ext>
     </p:extLst>
   </p:cSld>
@@ -5040,7 +5103,7 @@
         </p:nvSpPr>
         <p:spPr>
           <a:xfrm>
-            <a:off x="831850" y="219456"/>
+            <a:off x="838200" y="239150"/>
             <a:ext cx="10515600" cy="914019"/>
           </a:xfrm>
         </p:spPr>
@@ -5057,6 +5120,207 @@
           </a:p>
         </p:txBody>
       </p:sp>
+      <p:sp>
+        <p:nvSpPr>
+          <p:cNvPr id="3" name="TextBox 2">
+            <a:extLst>
+              <a:ext uri="{FF2B5EF4-FFF2-40B4-BE49-F238E27FC236}">
+                <a16:creationId xmlns:a16="http://schemas.microsoft.com/office/drawing/2014/main" id="{B35C317D-AF30-7D3D-3B65-A4EA03709BF5}"/>
+              </a:ext>
+            </a:extLst>
+          </p:cNvPr>
+          <p:cNvSpPr txBox="1"/>
+          <p:nvPr/>
+        </p:nvSpPr>
+        <p:spPr>
+          <a:xfrm>
+            <a:off x="838200" y="1463040"/>
+            <a:ext cx="2875671" cy="523220"/>
+          </a:xfrm>
+          <a:prstGeom prst="rect">
+            <a:avLst/>
+          </a:prstGeom>
+          <a:noFill/>
+        </p:spPr>
+        <p:txBody>
+          <a:bodyPr wrap="square" rtlCol="0">
+            <a:spAutoFit/>
+          </a:bodyPr>
+          <a:lstStyle/>
+          <a:p>
+            <a:r>
+              <a:rPr lang="en-GB" sz="2800" dirty="0"/>
+              <a:t>Script</a:t>
+            </a:r>
+          </a:p>
+        </p:txBody>
+      </p:sp>
+      <p:sp>
+        <p:nvSpPr>
+          <p:cNvPr id="4" name="TextBox 3">
+            <a:extLst>
+              <a:ext uri="{FF2B5EF4-FFF2-40B4-BE49-F238E27FC236}">
+                <a16:creationId xmlns:a16="http://schemas.microsoft.com/office/drawing/2014/main" id="{E92842E2-06BF-95AB-4F0C-B80B8AD7B528}"/>
+              </a:ext>
+            </a:extLst>
+          </p:cNvPr>
+          <p:cNvSpPr txBox="1"/>
+          <p:nvPr/>
+        </p:nvSpPr>
+        <p:spPr>
+          <a:xfrm>
+            <a:off x="6096000" y="1463040"/>
+            <a:ext cx="3601330" cy="523220"/>
+          </a:xfrm>
+          <a:prstGeom prst="rect">
+            <a:avLst/>
+          </a:prstGeom>
+          <a:noFill/>
+        </p:spPr>
+        <p:txBody>
+          <a:bodyPr wrap="square" rtlCol="0">
+            <a:spAutoFit/>
+          </a:bodyPr>
+          <a:lstStyle/>
+          <a:p>
+            <a:r>
+              <a:rPr lang="en-GB" sz="2800" dirty="0"/>
+              <a:t>Output</a:t>
+            </a:r>
+          </a:p>
+        </p:txBody>
+      </p:sp>
+      <p:sp>
+        <p:nvSpPr>
+          <p:cNvPr id="6" name="TextBox 5">
+            <a:extLst>
+              <a:ext uri="{FF2B5EF4-FFF2-40B4-BE49-F238E27FC236}">
+                <a16:creationId xmlns:a16="http://schemas.microsoft.com/office/drawing/2014/main" id="{21E40AE7-A021-9E87-3015-8CC16C40F29A}"/>
+              </a:ext>
+            </a:extLst>
+          </p:cNvPr>
+          <p:cNvSpPr txBox="1"/>
+          <p:nvPr/>
+        </p:nvSpPr>
+        <p:spPr>
+          <a:xfrm>
+            <a:off x="838200" y="3429000"/>
+            <a:ext cx="10233074" cy="1631216"/>
+          </a:xfrm>
+          <a:prstGeom prst="rect">
+            <a:avLst/>
+          </a:prstGeom>
+          <a:noFill/>
+        </p:spPr>
+        <p:txBody>
+          <a:bodyPr wrap="square" rtlCol="0">
+            <a:spAutoFit/>
+          </a:bodyPr>
+          <a:lstStyle/>
+          <a:p>
+            <a:r>
+              <a:rPr lang="en-GB" sz="2000" dirty="0"/>
+              <a:t>Tuples are one of the 4 data stores</a:t>
+            </a:r>
+          </a:p>
+          <a:p>
+            <a:r>
+              <a:rPr lang="en-GB" sz="2000" dirty="0"/>
+              <a:t>They are unchanging, ordered and indexed</a:t>
+            </a:r>
+          </a:p>
+          <a:p>
+            <a:r>
+              <a:rPr lang="en-GB" sz="2000" dirty="0"/>
+              <a:t>They allow duplicates</a:t>
+            </a:r>
+          </a:p>
+          <a:p>
+            <a:r>
+              <a:rPr lang="en-GB" sz="2000" dirty="0"/>
+              <a:t>The are written with ( )</a:t>
+            </a:r>
+          </a:p>
+          <a:p>
+            <a:r>
+              <a:rPr lang="en-GB" sz="2000" dirty="0"/>
+              <a:t>Tuple are suited for efficiency as they are faster than other stores due to being immutable</a:t>
+            </a:r>
+          </a:p>
+        </p:txBody>
+      </p:sp>
+      <p:pic>
+        <p:nvPicPr>
+          <p:cNvPr id="8" name="Picture 7">
+            <a:extLst>
+              <a:ext uri="{FF2B5EF4-FFF2-40B4-BE49-F238E27FC236}">
+                <a16:creationId xmlns:a16="http://schemas.microsoft.com/office/drawing/2014/main" id="{C8167366-C2EA-8369-2BAD-7AFBC85FC765}"/>
+              </a:ext>
+            </a:extLst>
+          </p:cNvPr>
+          <p:cNvPicPr>
+            <a:picLocks noChangeAspect="1"/>
+          </p:cNvPicPr>
+          <p:nvPr/>
+        </p:nvPicPr>
+        <p:blipFill>
+          <a:blip r:embed="rId2">
+            <a:extLst>
+              <a:ext uri="{28A0092B-C50C-407E-A947-70E740481C1C}">
+                <a14:useLocalDpi xmlns:a14="http://schemas.microsoft.com/office/drawing/2010/main" val="0"/>
+              </a:ext>
+            </a:extLst>
+          </a:blip>
+          <a:stretch>
+            <a:fillRect/>
+          </a:stretch>
+        </p:blipFill>
+        <p:spPr>
+          <a:xfrm>
+            <a:off x="123266" y="2293777"/>
+            <a:ext cx="5972734" cy="465763"/>
+          </a:xfrm>
+          <a:prstGeom prst="rect">
+            <a:avLst/>
+          </a:prstGeom>
+        </p:spPr>
+      </p:pic>
+      <p:pic>
+        <p:nvPicPr>
+          <p:cNvPr id="10" name="Picture 9">
+            <a:extLst>
+              <a:ext uri="{FF2B5EF4-FFF2-40B4-BE49-F238E27FC236}">
+                <a16:creationId xmlns:a16="http://schemas.microsoft.com/office/drawing/2014/main" id="{BA0037E8-8DF3-F97E-A090-67AA4EB67EE0}"/>
+              </a:ext>
+            </a:extLst>
+          </p:cNvPr>
+          <p:cNvPicPr>
+            <a:picLocks noChangeAspect="1"/>
+          </p:cNvPicPr>
+          <p:nvPr/>
+        </p:nvPicPr>
+        <p:blipFill>
+          <a:blip r:embed="rId3">
+            <a:extLst>
+              <a:ext uri="{28A0092B-C50C-407E-A947-70E740481C1C}">
+                <a14:useLocalDpi xmlns:a14="http://schemas.microsoft.com/office/drawing/2010/main" val="0"/>
+              </a:ext>
+            </a:extLst>
+          </a:blip>
+          <a:stretch>
+            <a:fillRect/>
+          </a:stretch>
+        </p:blipFill>
+        <p:spPr>
+          <a:xfrm>
+            <a:off x="6096000" y="2256053"/>
+            <a:ext cx="5093747" cy="270606"/>
+          </a:xfrm>
+          <a:prstGeom prst="rect">
+            <a:avLst/>
+          </a:prstGeom>
+        </p:spPr>
+      </p:pic>
     </p:spTree>
     <p:extLst>
       <p:ext uri="{BB962C8B-B14F-4D97-AF65-F5344CB8AC3E}">
@@ -5092,7 +5356,7 @@
           <p:cNvPr id="2" name="Title 1">
             <a:extLst>
               <a:ext uri="{FF2B5EF4-FFF2-40B4-BE49-F238E27FC236}">
-                <a16:creationId xmlns:a16="http://schemas.microsoft.com/office/drawing/2014/main" id="{13D60BB3-0713-D28C-F3A7-508B1F0B273C}"/>
+                <a16:creationId xmlns:a16="http://schemas.microsoft.com/office/drawing/2014/main" id="{66F611B0-10AE-C392-D95E-015081CD2662}"/>
               </a:ext>
             </a:extLst>
           </p:cNvPr>
@@ -5105,8 +5369,8 @@
         </p:nvSpPr>
         <p:spPr>
           <a:xfrm>
-            <a:off x="831850" y="0"/>
-            <a:ext cx="10515600" cy="1215771"/>
+            <a:off x="838200" y="292419"/>
+            <a:ext cx="10515600" cy="786574"/>
           </a:xfrm>
         </p:spPr>
         <p:txBody>
@@ -5117,7 +5381,208 @@
           <a:p>
             <a:r>
               <a:rPr lang="en-GB" sz="4300" dirty="0"/>
-              <a:t>Set</a:t>
+              <a:t>Lists</a:t>
+            </a:r>
+          </a:p>
+        </p:txBody>
+      </p:sp>
+      <p:sp>
+        <p:nvSpPr>
+          <p:cNvPr id="4" name="TextBox 3">
+            <a:extLst>
+              <a:ext uri="{FF2B5EF4-FFF2-40B4-BE49-F238E27FC236}">
+                <a16:creationId xmlns:a16="http://schemas.microsoft.com/office/drawing/2014/main" id="{344C945F-4504-76BE-DD9D-52FD433C6092}"/>
+              </a:ext>
+            </a:extLst>
+          </p:cNvPr>
+          <p:cNvSpPr txBox="1"/>
+          <p:nvPr/>
+        </p:nvSpPr>
+        <p:spPr>
+          <a:xfrm>
+            <a:off x="838200" y="1298448"/>
+            <a:ext cx="3337560" cy="523220"/>
+          </a:xfrm>
+          <a:prstGeom prst="rect">
+            <a:avLst/>
+          </a:prstGeom>
+          <a:noFill/>
+        </p:spPr>
+        <p:txBody>
+          <a:bodyPr wrap="square" rtlCol="0">
+            <a:spAutoFit/>
+          </a:bodyPr>
+          <a:lstStyle/>
+          <a:p>
+            <a:r>
+              <a:rPr lang="en-GB" sz="2800" dirty="0"/>
+              <a:t>Script</a:t>
+            </a:r>
+          </a:p>
+        </p:txBody>
+      </p:sp>
+      <p:sp>
+        <p:nvSpPr>
+          <p:cNvPr id="5" name="TextBox 4">
+            <a:extLst>
+              <a:ext uri="{FF2B5EF4-FFF2-40B4-BE49-F238E27FC236}">
+                <a16:creationId xmlns:a16="http://schemas.microsoft.com/office/drawing/2014/main" id="{74597ECA-2801-F899-3ED9-B92FF61948B1}"/>
+              </a:ext>
+            </a:extLst>
+          </p:cNvPr>
+          <p:cNvSpPr txBox="1"/>
+          <p:nvPr/>
+        </p:nvSpPr>
+        <p:spPr>
+          <a:xfrm>
+            <a:off x="6096000" y="1298448"/>
+            <a:ext cx="5605272" cy="523220"/>
+          </a:xfrm>
+          <a:prstGeom prst="rect">
+            <a:avLst/>
+          </a:prstGeom>
+          <a:noFill/>
+        </p:spPr>
+        <p:txBody>
+          <a:bodyPr wrap="square" rtlCol="0">
+            <a:spAutoFit/>
+          </a:bodyPr>
+          <a:lstStyle/>
+          <a:p>
+            <a:r>
+              <a:rPr lang="en-GB" sz="2800" dirty="0"/>
+              <a:t>Output</a:t>
+            </a:r>
+          </a:p>
+        </p:txBody>
+      </p:sp>
+      <p:pic>
+        <p:nvPicPr>
+          <p:cNvPr id="7" name="Picture 6" descr="A white background with blue text&#10;&#10;Description automatically generated">
+            <a:extLst>
+              <a:ext uri="{FF2B5EF4-FFF2-40B4-BE49-F238E27FC236}">
+                <a16:creationId xmlns:a16="http://schemas.microsoft.com/office/drawing/2014/main" id="{19D5864A-2488-1F2D-C6EB-121D11294562}"/>
+              </a:ext>
+            </a:extLst>
+          </p:cNvPr>
+          <p:cNvPicPr>
+            <a:picLocks noChangeAspect="1"/>
+          </p:cNvPicPr>
+          <p:nvPr/>
+        </p:nvPicPr>
+        <p:blipFill>
+          <a:blip r:embed="rId2">
+            <a:extLst>
+              <a:ext uri="{28A0092B-C50C-407E-A947-70E740481C1C}">
+                <a14:useLocalDpi xmlns:a14="http://schemas.microsoft.com/office/drawing/2010/main" val="0"/>
+              </a:ext>
+            </a:extLst>
+          </a:blip>
+          <a:stretch>
+            <a:fillRect/>
+          </a:stretch>
+        </p:blipFill>
+        <p:spPr>
+          <a:xfrm>
+            <a:off x="6096000" y="2041123"/>
+            <a:ext cx="3829584" cy="1657581"/>
+          </a:xfrm>
+          <a:prstGeom prst="rect">
+            <a:avLst/>
+          </a:prstGeom>
+        </p:spPr>
+      </p:pic>
+      <p:pic>
+        <p:nvPicPr>
+          <p:cNvPr id="9" name="Picture 8" descr="A screenshot of a computer&#10;&#10;Description automatically generated">
+            <a:extLst>
+              <a:ext uri="{FF2B5EF4-FFF2-40B4-BE49-F238E27FC236}">
+                <a16:creationId xmlns:a16="http://schemas.microsoft.com/office/drawing/2014/main" id="{469590BE-9C6A-015D-F1BC-248F0393F51C}"/>
+              </a:ext>
+            </a:extLst>
+          </p:cNvPr>
+          <p:cNvPicPr>
+            <a:picLocks noChangeAspect="1"/>
+          </p:cNvPicPr>
+          <p:nvPr/>
+        </p:nvPicPr>
+        <p:blipFill>
+          <a:blip r:embed="rId3">
+            <a:extLst>
+              <a:ext uri="{28A0092B-C50C-407E-A947-70E740481C1C}">
+                <a14:useLocalDpi xmlns:a14="http://schemas.microsoft.com/office/drawing/2010/main" val="0"/>
+              </a:ext>
+            </a:extLst>
+          </a:blip>
+          <a:stretch>
+            <a:fillRect/>
+          </a:stretch>
+        </p:blipFill>
+        <p:spPr>
+          <a:xfrm>
+            <a:off x="435863" y="2041123"/>
+            <a:ext cx="5419904" cy="2995210"/>
+          </a:xfrm>
+          <a:prstGeom prst="rect">
+            <a:avLst/>
+          </a:prstGeom>
+        </p:spPr>
+      </p:pic>
+      <p:sp>
+        <p:nvSpPr>
+          <p:cNvPr id="10" name="TextBox 9">
+            <a:extLst>
+              <a:ext uri="{FF2B5EF4-FFF2-40B4-BE49-F238E27FC236}">
+                <a16:creationId xmlns:a16="http://schemas.microsoft.com/office/drawing/2014/main" id="{2D76A1BE-BE26-5FFB-3899-7287F9867EB6}"/>
+              </a:ext>
+            </a:extLst>
+          </p:cNvPr>
+          <p:cNvSpPr txBox="1"/>
+          <p:nvPr/>
+        </p:nvSpPr>
+        <p:spPr>
+          <a:xfrm>
+            <a:off x="2506980" y="4374613"/>
+            <a:ext cx="8622792" cy="1631216"/>
+          </a:xfrm>
+          <a:prstGeom prst="rect">
+            <a:avLst/>
+          </a:prstGeom>
+          <a:noFill/>
+        </p:spPr>
+        <p:txBody>
+          <a:bodyPr wrap="square" rtlCol="0">
+            <a:spAutoFit/>
+          </a:bodyPr>
+          <a:lstStyle/>
+          <a:p>
+            <a:r>
+              <a:rPr lang="en-GB" sz="2000" dirty="0"/>
+              <a:t>Lists are one of the 4 ways to store data. </a:t>
+            </a:r>
+          </a:p>
+          <a:p>
+            <a:r>
+              <a:rPr lang="en-GB" sz="2000" dirty="0"/>
+              <a:t>They are used as opposed to others as they are changeable and indexed.</a:t>
+            </a:r>
+          </a:p>
+          <a:p>
+            <a:r>
+              <a:rPr lang="en-GB" sz="2000" dirty="0"/>
+              <a:t>They allow duplicated elements.</a:t>
+            </a:r>
+          </a:p>
+          <a:p>
+            <a:r>
+              <a:rPr lang="en-GB" sz="2000" dirty="0"/>
+              <a:t>Lists use square brackets [ ] </a:t>
+            </a:r>
+          </a:p>
+          <a:p>
+            <a:r>
+              <a:rPr lang="en-GB" sz="2000" dirty="0"/>
+              <a:t>Suited for ordered collections</a:t>
             </a:r>
           </a:p>
         </p:txBody>
@@ -5125,7 +5590,7 @@
     </p:spTree>
     <p:extLst>
       <p:ext uri="{BB962C8B-B14F-4D97-AF65-F5344CB8AC3E}">
-        <p14:creationId xmlns:p14="http://schemas.microsoft.com/office/powerpoint/2010/main" val="2499244716"/>
+        <p14:creationId xmlns:p14="http://schemas.microsoft.com/office/powerpoint/2010/main" val="292458422"/>
       </p:ext>
     </p:extLst>
   </p:cSld>
@@ -5170,7 +5635,7 @@
         </p:nvSpPr>
         <p:spPr>
           <a:xfrm>
-            <a:off x="831850" y="302196"/>
+            <a:off x="838200" y="203722"/>
             <a:ext cx="10515600" cy="932307"/>
           </a:xfrm>
         </p:spPr>
@@ -5187,6 +5652,203 @@
           </a:p>
         </p:txBody>
       </p:sp>
+      <p:sp>
+        <p:nvSpPr>
+          <p:cNvPr id="3" name="TextBox 2">
+            <a:extLst>
+              <a:ext uri="{FF2B5EF4-FFF2-40B4-BE49-F238E27FC236}">
+                <a16:creationId xmlns:a16="http://schemas.microsoft.com/office/drawing/2014/main" id="{659DE5BA-3AE6-8DD8-CF29-3202B9760309}"/>
+              </a:ext>
+            </a:extLst>
+          </p:cNvPr>
+          <p:cNvSpPr txBox="1"/>
+          <p:nvPr/>
+        </p:nvSpPr>
+        <p:spPr>
+          <a:xfrm>
+            <a:off x="838200" y="1406769"/>
+            <a:ext cx="3776003" cy="523220"/>
+          </a:xfrm>
+          <a:prstGeom prst="rect">
+            <a:avLst/>
+          </a:prstGeom>
+          <a:noFill/>
+        </p:spPr>
+        <p:txBody>
+          <a:bodyPr wrap="square" rtlCol="0">
+            <a:spAutoFit/>
+          </a:bodyPr>
+          <a:lstStyle/>
+          <a:p>
+            <a:r>
+              <a:rPr lang="en-GB" sz="2800" dirty="0"/>
+              <a:t>Script</a:t>
+            </a:r>
+          </a:p>
+        </p:txBody>
+      </p:sp>
+      <p:sp>
+        <p:nvSpPr>
+          <p:cNvPr id="4" name="TextBox 3">
+            <a:extLst>
+              <a:ext uri="{FF2B5EF4-FFF2-40B4-BE49-F238E27FC236}">
+                <a16:creationId xmlns:a16="http://schemas.microsoft.com/office/drawing/2014/main" id="{A110040F-5E78-DCCF-6D17-AA64CC7AB311}"/>
+              </a:ext>
+            </a:extLst>
+          </p:cNvPr>
+          <p:cNvSpPr txBox="1"/>
+          <p:nvPr/>
+        </p:nvSpPr>
+        <p:spPr>
+          <a:xfrm>
+            <a:off x="6096000" y="1406769"/>
+            <a:ext cx="4515730" cy="523220"/>
+          </a:xfrm>
+          <a:prstGeom prst="rect">
+            <a:avLst/>
+          </a:prstGeom>
+          <a:noFill/>
+        </p:spPr>
+        <p:txBody>
+          <a:bodyPr wrap="square" rtlCol="0">
+            <a:spAutoFit/>
+          </a:bodyPr>
+          <a:lstStyle/>
+          <a:p>
+            <a:r>
+              <a:rPr lang="en-GB" sz="2800" dirty="0"/>
+              <a:t>Output</a:t>
+            </a:r>
+          </a:p>
+        </p:txBody>
+      </p:sp>
+      <p:sp>
+        <p:nvSpPr>
+          <p:cNvPr id="5" name="TextBox 4">
+            <a:extLst>
+              <a:ext uri="{FF2B5EF4-FFF2-40B4-BE49-F238E27FC236}">
+                <a16:creationId xmlns:a16="http://schemas.microsoft.com/office/drawing/2014/main" id="{87C2DB42-8774-41A8-BC50-B334EF255201}"/>
+              </a:ext>
+            </a:extLst>
+          </p:cNvPr>
+          <p:cNvSpPr txBox="1"/>
+          <p:nvPr/>
+        </p:nvSpPr>
+        <p:spPr>
+          <a:xfrm>
+            <a:off x="1111346" y="4378822"/>
+            <a:ext cx="7540283" cy="1015663"/>
+          </a:xfrm>
+          <a:prstGeom prst="rect">
+            <a:avLst/>
+          </a:prstGeom>
+          <a:noFill/>
+        </p:spPr>
+        <p:txBody>
+          <a:bodyPr wrap="square" rtlCol="0">
+            <a:spAutoFit/>
+          </a:bodyPr>
+          <a:lstStyle/>
+          <a:p>
+            <a:r>
+              <a:rPr lang="en-GB" sz="2000" dirty="0" err="1"/>
+              <a:t>Dictionarys</a:t>
+            </a:r>
+            <a:r>
+              <a:rPr lang="en-GB" sz="2000" dirty="0"/>
+              <a:t> are the final of the 4 data stores</a:t>
+            </a:r>
+          </a:p>
+          <a:p>
+            <a:r>
+              <a:rPr lang="en-GB" sz="2000" dirty="0"/>
+              <a:t>They are ordered, changeable but don’t allow duplicates</a:t>
+            </a:r>
+          </a:p>
+          <a:p>
+            <a:r>
+              <a:rPr lang="en-GB" sz="2000" dirty="0" err="1"/>
+              <a:t>Dictionarys</a:t>
+            </a:r>
+            <a:r>
+              <a:rPr lang="en-GB" sz="2000" dirty="0"/>
+              <a:t> are suited for Key Value storing and Cataloguing data.</a:t>
+            </a:r>
+          </a:p>
+        </p:txBody>
+      </p:sp>
+      <p:pic>
+        <p:nvPicPr>
+          <p:cNvPr id="7" name="Picture 6" descr="A computer code with green text&#10;&#10;Description automatically generated">
+            <a:extLst>
+              <a:ext uri="{FF2B5EF4-FFF2-40B4-BE49-F238E27FC236}">
+                <a16:creationId xmlns:a16="http://schemas.microsoft.com/office/drawing/2014/main" id="{522F9F82-7AF4-918B-B412-71835A234D80}"/>
+              </a:ext>
+            </a:extLst>
+          </p:cNvPr>
+          <p:cNvPicPr>
+            <a:picLocks noChangeAspect="1"/>
+          </p:cNvPicPr>
+          <p:nvPr/>
+        </p:nvPicPr>
+        <p:blipFill>
+          <a:blip r:embed="rId2">
+            <a:extLst>
+              <a:ext uri="{28A0092B-C50C-407E-A947-70E740481C1C}">
+                <a14:useLocalDpi xmlns:a14="http://schemas.microsoft.com/office/drawing/2010/main" val="0"/>
+              </a:ext>
+            </a:extLst>
+          </a:blip>
+          <a:stretch>
+            <a:fillRect/>
+          </a:stretch>
+        </p:blipFill>
+        <p:spPr>
+          <a:xfrm>
+            <a:off x="838200" y="2200729"/>
+            <a:ext cx="2707105" cy="1659193"/>
+          </a:xfrm>
+          <a:prstGeom prst="rect">
+            <a:avLst/>
+          </a:prstGeom>
+        </p:spPr>
+      </p:pic>
+      <p:pic>
+        <p:nvPicPr>
+          <p:cNvPr id="9" name="Picture 8">
+            <a:extLst>
+              <a:ext uri="{FF2B5EF4-FFF2-40B4-BE49-F238E27FC236}">
+                <a16:creationId xmlns:a16="http://schemas.microsoft.com/office/drawing/2014/main" id="{C5FDADFB-391B-1D70-D89C-B029C19EB3F6}"/>
+              </a:ext>
+            </a:extLst>
+          </p:cNvPr>
+          <p:cNvPicPr>
+            <a:picLocks noChangeAspect="1"/>
+          </p:cNvPicPr>
+          <p:nvPr/>
+        </p:nvPicPr>
+        <p:blipFill>
+          <a:blip r:embed="rId3">
+            <a:extLst>
+              <a:ext uri="{28A0092B-C50C-407E-A947-70E740481C1C}">
+                <a14:useLocalDpi xmlns:a14="http://schemas.microsoft.com/office/drawing/2010/main" val="0"/>
+              </a:ext>
+            </a:extLst>
+          </a:blip>
+          <a:stretch>
+            <a:fillRect/>
+          </a:stretch>
+        </p:blipFill>
+        <p:spPr>
+          <a:xfrm>
+            <a:off x="4881488" y="2213173"/>
+            <a:ext cx="6267775" cy="266006"/>
+          </a:xfrm>
+          <a:prstGeom prst="rect">
+            <a:avLst/>
+          </a:prstGeom>
+        </p:spPr>
+      </p:pic>
     </p:spTree>
     <p:extLst>
       <p:ext uri="{BB962C8B-B14F-4D97-AF65-F5344CB8AC3E}">

</xml_diff>